<commit_message>
add logo and footer
</commit_message>
<xml_diff>
--- a/quantum_walks_project_v4.pptx
+++ b/quantum_walks_project_v4.pptx
@@ -137,7 +137,7 @@
 <file path=ppt/revisionInfo.xml><?xml version="1.0" encoding="utf-8"?>
 <p1510:revInfo xmlns:a="http://schemas.openxmlformats.org/drawingml/2006/main" xmlns:r="http://schemas.openxmlformats.org/officeDocument/2006/relationships" xmlns:p1510="http://schemas.microsoft.com/office/powerpoint/2015/10/main">
   <p1510:revLst>
-    <p1510:client id="{062F9CD9-FB25-403D-9A82-D3F541407AE9}" v="49" dt="2025-08-08T15:27:03.036"/>
+    <p1510:client id="{062F9CD9-FB25-403D-9A82-D3F541407AE9}" v="147" dt="2025-08-10T16:44:57.894"/>
   </p1510:revLst>
 </p1510:revInfo>
 </file>
@@ -172,22 +172,6 @@
           <pc:docMk/>
           <pc:sldMk cId="0" sldId="257"/>
         </pc:sldMkLst>
-        <pc:spChg chg="add mod">
-          <ac:chgData name="Yevgeny Menaker" userId="cf90ab60ec4b5844" providerId="LiveId" clId="{ACAC1771-F09D-4340-9DD5-6153187C3B4B}" dt="2025-08-07T12:45:07.873" v="3" actId="34807"/>
-          <ac:spMkLst>
-            <pc:docMk/>
-            <pc:sldMk cId="0" sldId="257"/>
-            <ac:spMk id="2" creationId="{43898C3B-29D5-0AEB-CEC5-D98162F45376}"/>
-          </ac:spMkLst>
-        </pc:spChg>
-        <pc:spChg chg="del mod">
-          <ac:chgData name="Yevgeny Menaker" userId="cf90ab60ec4b5844" providerId="LiveId" clId="{ACAC1771-F09D-4340-9DD5-6153187C3B4B}" dt="2025-08-07T12:44:31.705" v="2"/>
-          <ac:spMkLst>
-            <pc:docMk/>
-            <pc:sldMk cId="0" sldId="257"/>
-            <ac:spMk id="220" creationId="{00000000-0000-0000-0000-000000000000}"/>
-          </ac:spMkLst>
-        </pc:spChg>
       </pc:sldChg>
       <pc:sldChg chg="addSp delSp modSp mod">
         <pc:chgData name="Yevgeny Menaker" userId="cf90ab60ec4b5844" providerId="LiveId" clId="{ACAC1771-F09D-4340-9DD5-6153187C3B4B}" dt="2025-08-07T15:39:58.655" v="2549" actId="20577"/>
@@ -195,36 +179,12 @@
           <pc:docMk/>
           <pc:sldMk cId="0" sldId="258"/>
         </pc:sldMkLst>
-        <pc:spChg chg="add del mod">
-          <ac:chgData name="Yevgeny Menaker" userId="cf90ab60ec4b5844" providerId="LiveId" clId="{ACAC1771-F09D-4340-9DD5-6153187C3B4B}" dt="2025-08-07T12:52:31.095" v="273"/>
-          <ac:spMkLst>
-            <pc:docMk/>
-            <pc:sldMk cId="0" sldId="258"/>
-            <ac:spMk id="4" creationId="{DFF21A4D-E982-3A4A-28A8-7480E7EC87CD}"/>
-          </ac:spMkLst>
-        </pc:spChg>
         <pc:spChg chg="add mod">
           <ac:chgData name="Yevgeny Menaker" userId="cf90ab60ec4b5844" providerId="LiveId" clId="{ACAC1771-F09D-4340-9DD5-6153187C3B4B}" dt="2025-08-07T15:39:58.655" v="2549" actId="20577"/>
           <ac:spMkLst>
             <pc:docMk/>
             <pc:sldMk cId="0" sldId="258"/>
             <ac:spMk id="5" creationId="{BE06072E-F959-9860-E461-C7498C09FD53}"/>
-          </ac:spMkLst>
-        </pc:spChg>
-        <pc:spChg chg="add">
-          <ac:chgData name="Yevgeny Menaker" userId="cf90ab60ec4b5844" providerId="LiveId" clId="{ACAC1771-F09D-4340-9DD5-6153187C3B4B}" dt="2025-08-07T12:54:38.286" v="277"/>
-          <ac:spMkLst>
-            <pc:docMk/>
-            <pc:sldMk cId="0" sldId="258"/>
-            <ac:spMk id="6" creationId="{6D1B9E48-8FD4-A44B-09EA-5CE091485581}"/>
-          </ac:spMkLst>
-        </pc:spChg>
-        <pc:spChg chg="del">
-          <ac:chgData name="Yevgeny Menaker" userId="cf90ab60ec4b5844" providerId="LiveId" clId="{ACAC1771-F09D-4340-9DD5-6153187C3B4B}" dt="2025-08-07T12:50:34.830" v="260" actId="931"/>
-          <ac:spMkLst>
-            <pc:docMk/>
-            <pc:sldMk cId="0" sldId="258"/>
-            <ac:spMk id="222" creationId="{00000000-0000-0000-0000-000000000000}"/>
           </ac:spMkLst>
         </pc:spChg>
         <pc:picChg chg="add mod">
@@ -273,14 +233,6 @@
             <ac:spMk id="225" creationId="{00000000-0000-0000-0000-000000000000}"/>
           </ac:spMkLst>
         </pc:spChg>
-        <pc:spChg chg="del">
-          <ac:chgData name="Yevgeny Menaker" userId="cf90ab60ec4b5844" providerId="LiveId" clId="{ACAC1771-F09D-4340-9DD5-6153187C3B4B}" dt="2025-08-07T12:59:02.139" v="502" actId="22"/>
-          <ac:spMkLst>
-            <pc:docMk/>
-            <pc:sldMk cId="0" sldId="260"/>
-            <ac:spMk id="226" creationId="{00000000-0000-0000-0000-000000000000}"/>
-          </ac:spMkLst>
-        </pc:spChg>
         <pc:picChg chg="add mod ord">
           <ac:chgData name="Yevgeny Menaker" userId="cf90ab60ec4b5844" providerId="LiveId" clId="{ACAC1771-F09D-4340-9DD5-6153187C3B4B}" dt="2025-08-07T15:43:46.470" v="2589" actId="14100"/>
           <ac:picMkLst>
@@ -318,14 +270,6 @@
             <pc:docMk/>
             <pc:sldMk cId="0" sldId="261"/>
             <ac:spMk id="227" creationId="{00000000-0000-0000-0000-000000000000}"/>
-          </ac:spMkLst>
-        </pc:spChg>
-        <pc:spChg chg="del">
-          <ac:chgData name="Yevgeny Menaker" userId="cf90ab60ec4b5844" providerId="LiveId" clId="{ACAC1771-F09D-4340-9DD5-6153187C3B4B}" dt="2025-08-07T13:13:51.526" v="585" actId="931"/>
-          <ac:spMkLst>
-            <pc:docMk/>
-            <pc:sldMk cId="0" sldId="261"/>
-            <ac:spMk id="228" creationId="{00000000-0000-0000-0000-000000000000}"/>
           </ac:spMkLst>
         </pc:spChg>
         <pc:picChg chg="add mod">
@@ -398,22 +342,6 @@
             <ac:spMk id="8" creationId="{AB97F963-C60B-FAFA-E863-7928D3E8CDA6}"/>
           </ac:spMkLst>
         </pc:spChg>
-        <pc:spChg chg="add del mod">
-          <ac:chgData name="Yevgeny Menaker" userId="cf90ab60ec4b5844" providerId="LiveId" clId="{ACAC1771-F09D-4340-9DD5-6153187C3B4B}" dt="2025-08-07T14:17:23.193" v="1621" actId="478"/>
-          <ac:spMkLst>
-            <pc:docMk/>
-            <pc:sldMk cId="0" sldId="263"/>
-            <ac:spMk id="9" creationId="{B397F9F7-8E4E-EAF5-788D-DCDC0CEAA881}"/>
-          </ac:spMkLst>
-        </pc:spChg>
-        <pc:spChg chg="add del mod">
-          <ac:chgData name="Yevgeny Menaker" userId="cf90ab60ec4b5844" providerId="LiveId" clId="{ACAC1771-F09D-4340-9DD5-6153187C3B4B}" dt="2025-08-07T14:17:21.079" v="1620" actId="21"/>
-          <ac:spMkLst>
-            <pc:docMk/>
-            <pc:sldMk cId="0" sldId="263"/>
-            <ac:spMk id="10" creationId="{AE42DD81-9E69-AE50-4B2D-E51048E1B210}"/>
-          </ac:spMkLst>
-        </pc:spChg>
         <pc:spChg chg="add mod">
           <ac:chgData name="Yevgeny Menaker" userId="cf90ab60ec4b5844" providerId="LiveId" clId="{ACAC1771-F09D-4340-9DD5-6153187C3B4B}" dt="2025-08-07T14:18:57.329" v="1736" actId="14100"/>
           <ac:spMkLst>
@@ -430,28 +358,12 @@
             <ac:spMk id="231" creationId="{00000000-0000-0000-0000-000000000000}"/>
           </ac:spMkLst>
         </pc:spChg>
-        <pc:spChg chg="del">
-          <ac:chgData name="Yevgeny Menaker" userId="cf90ab60ec4b5844" providerId="LiveId" clId="{ACAC1771-F09D-4340-9DD5-6153187C3B4B}" dt="2025-08-07T13:31:32.893" v="840" actId="931"/>
-          <ac:spMkLst>
-            <pc:docMk/>
-            <pc:sldMk cId="0" sldId="263"/>
-            <ac:spMk id="232" creationId="{00000000-0000-0000-0000-000000000000}"/>
-          </ac:spMkLst>
-        </pc:spChg>
         <pc:picChg chg="add mod">
           <ac:chgData name="Yevgeny Menaker" userId="cf90ab60ec4b5844" providerId="LiveId" clId="{ACAC1771-F09D-4340-9DD5-6153187C3B4B}" dt="2025-08-07T14:19:14.057" v="1740" actId="14100"/>
           <ac:picMkLst>
             <pc:docMk/>
             <pc:sldMk cId="0" sldId="263"/>
             <ac:picMk id="3" creationId="{F7C0FE9D-9626-000A-64E9-BFC38C611D64}"/>
-          </ac:picMkLst>
-        </pc:picChg>
-        <pc:picChg chg="add del mod">
-          <ac:chgData name="Yevgeny Menaker" userId="cf90ab60ec4b5844" providerId="LiveId" clId="{ACAC1771-F09D-4340-9DD5-6153187C3B4B}" dt="2025-08-07T14:17:21.079" v="1620" actId="21"/>
-          <ac:picMkLst>
-            <pc:docMk/>
-            <pc:sldMk cId="0" sldId="263"/>
-            <ac:picMk id="5" creationId="{5E829B63-A58E-601E-8E0B-12730A778241}"/>
           </ac:picMkLst>
         </pc:picChg>
         <pc:picChg chg="add mod">
@@ -483,14 +395,6 @@
             <pc:docMk/>
             <pc:sldMk cId="0" sldId="264"/>
             <ac:spMk id="233" creationId="{00000000-0000-0000-0000-000000000000}"/>
-          </ac:spMkLst>
-        </pc:spChg>
-        <pc:spChg chg="del">
-          <ac:chgData name="Yevgeny Menaker" userId="cf90ab60ec4b5844" providerId="LiveId" clId="{ACAC1771-F09D-4340-9DD5-6153187C3B4B}" dt="2025-08-07T13:40:35.308" v="1006" actId="478"/>
-          <ac:spMkLst>
-            <pc:docMk/>
-            <pc:sldMk cId="0" sldId="264"/>
-            <ac:spMk id="234" creationId="{00000000-0000-0000-0000-000000000000}"/>
           </ac:spMkLst>
         </pc:spChg>
         <pc:picChg chg="add mod">
@@ -548,30 +452,6 @@
             <ac:spMk id="235" creationId="{00000000-0000-0000-0000-000000000000}"/>
           </ac:spMkLst>
         </pc:spChg>
-        <pc:spChg chg="del">
-          <ac:chgData name="Yevgeny Menaker" userId="cf90ab60ec4b5844" providerId="LiveId" clId="{ACAC1771-F09D-4340-9DD5-6153187C3B4B}" dt="2025-08-07T13:44:12.397" v="1065" actId="478"/>
-          <ac:spMkLst>
-            <pc:docMk/>
-            <pc:sldMk cId="0" sldId="265"/>
-            <ac:spMk id="236" creationId="{00000000-0000-0000-0000-000000000000}"/>
-          </ac:spMkLst>
-        </pc:spChg>
-        <pc:picChg chg="add mod">
-          <ac:chgData name="Yevgeny Menaker" userId="cf90ab60ec4b5844" providerId="LiveId" clId="{ACAC1771-F09D-4340-9DD5-6153187C3B4B}" dt="2025-08-07T13:44:54.390" v="1076" actId="1076"/>
-          <ac:picMkLst>
-            <pc:docMk/>
-            <pc:sldMk cId="0" sldId="265"/>
-            <ac:picMk id="3" creationId="{05DE2371-B314-394A-4AAB-4C5A4BFFEC72}"/>
-          </ac:picMkLst>
-        </pc:picChg>
-        <pc:picChg chg="add mod">
-          <ac:chgData name="Yevgeny Menaker" userId="cf90ab60ec4b5844" providerId="LiveId" clId="{ACAC1771-F09D-4340-9DD5-6153187C3B4B}" dt="2025-08-07T13:45:00.616" v="1078" actId="14100"/>
-          <ac:picMkLst>
-            <pc:docMk/>
-            <pc:sldMk cId="0" sldId="265"/>
-            <ac:picMk id="5" creationId="{D988F6FE-E7CA-502D-C6F0-C06E7D3ADBB2}"/>
-          </ac:picMkLst>
-        </pc:picChg>
       </pc:sldChg>
       <pc:sldChg chg="addSp delSp modSp mod setBg">
         <pc:chgData name="Yevgeny Menaker" userId="cf90ab60ec4b5844" providerId="LiveId" clId="{ACAC1771-F09D-4340-9DD5-6153187C3B4B}" dt="2025-08-07T15:47:46.281" v="2689" actId="20577"/>
@@ -579,14 +459,6 @@
           <pc:docMk/>
           <pc:sldMk cId="0" sldId="266"/>
         </pc:sldMkLst>
-        <pc:spChg chg="add del mod">
-          <ac:chgData name="Yevgeny Menaker" userId="cf90ab60ec4b5844" providerId="LiveId" clId="{ACAC1771-F09D-4340-9DD5-6153187C3B4B}" dt="2025-08-07T13:47:36.123" v="1095" actId="478"/>
-          <ac:spMkLst>
-            <pc:docMk/>
-            <pc:sldMk cId="0" sldId="266"/>
-            <ac:spMk id="2" creationId="{AB70AF22-26D9-4917-5482-8096B27C302E}"/>
-          </ac:spMkLst>
-        </pc:spChg>
         <pc:spChg chg="mod">
           <ac:chgData name="Yevgeny Menaker" userId="cf90ab60ec4b5844" providerId="LiveId" clId="{ACAC1771-F09D-4340-9DD5-6153187C3B4B}" dt="2025-08-07T13:46:38.114" v="1085"/>
           <ac:spMkLst>
@@ -633,14 +505,6 @@
             <ac:spMk id="3" creationId="{3FAB9AC4-1098-05A5-D102-672F57A67E57}"/>
           </ac:spMkLst>
         </pc:spChg>
-        <pc:spChg chg="add mod">
-          <ac:chgData name="Yevgeny Menaker" userId="cf90ab60ec4b5844" providerId="LiveId" clId="{ACAC1771-F09D-4340-9DD5-6153187C3B4B}" dt="2025-08-07T12:45:52.924" v="22"/>
-          <ac:spMkLst>
-            <pc:docMk/>
-            <pc:sldMk cId="576253988" sldId="268"/>
-            <ac:spMk id="4" creationId="{F1DB745F-8074-0888-D5B0-596EDB3BF1E1}"/>
-          </ac:spMkLst>
-        </pc:spChg>
       </pc:sldChg>
       <pc:sldChg chg="addSp delSp modSp new mod">
         <pc:chgData name="Yevgeny Menaker" userId="cf90ab60ec4b5844" providerId="LiveId" clId="{ACAC1771-F09D-4340-9DD5-6153187C3B4B}" dt="2025-08-07T15:45:09.515" v="2598" actId="20577"/>
@@ -654,14 +518,6 @@
             <pc:docMk/>
             <pc:sldMk cId="3979091466" sldId="269"/>
             <ac:spMk id="2" creationId="{8AEC4B5B-5D80-5017-1AD0-B92C4F2D8446}"/>
-          </ac:spMkLst>
-        </pc:spChg>
-        <pc:spChg chg="del">
-          <ac:chgData name="Yevgeny Menaker" userId="cf90ab60ec4b5844" providerId="LiveId" clId="{ACAC1771-F09D-4340-9DD5-6153187C3B4B}" dt="2025-08-07T14:19:40.477" v="1742" actId="478"/>
-          <ac:spMkLst>
-            <pc:docMk/>
-            <pc:sldMk cId="3979091466" sldId="269"/>
-            <ac:spMk id="3" creationId="{8F95E4BF-75BD-72BC-A815-264FC181296E}"/>
           </ac:spMkLst>
         </pc:spChg>
         <pc:spChg chg="add mod">
@@ -717,22 +573,6 @@
             <pc:docMk/>
             <pc:sldMk cId="901845363" sldId="270"/>
             <ac:spMk id="2" creationId="{6D6232E4-A32C-87DA-97BD-4FE2BDDB627A}"/>
-          </ac:spMkLst>
-        </pc:spChg>
-        <pc:spChg chg="del">
-          <ac:chgData name="Yevgeny Menaker" userId="cf90ab60ec4b5844" providerId="LiveId" clId="{ACAC1771-F09D-4340-9DD5-6153187C3B4B}" dt="2025-08-07T14:54:27.556" v="2221" actId="478"/>
-          <ac:spMkLst>
-            <pc:docMk/>
-            <pc:sldMk cId="901845363" sldId="270"/>
-            <ac:spMk id="3" creationId="{5CCAF0F8-E8D7-97A0-3868-C301F79E8499}"/>
-          </ac:spMkLst>
-        </pc:spChg>
-        <pc:spChg chg="add del">
-          <ac:chgData name="Yevgeny Menaker" userId="cf90ab60ec4b5844" providerId="LiveId" clId="{ACAC1771-F09D-4340-9DD5-6153187C3B4B}" dt="2025-08-07T15:20:26.563" v="2288" actId="22"/>
-          <ac:spMkLst>
-            <pc:docMk/>
-            <pc:sldMk cId="901845363" sldId="270"/>
-            <ac:spMk id="17" creationId="{0B303C5D-CDC0-1422-2EFE-891B9F1FECF1}"/>
           </ac:spMkLst>
         </pc:spChg>
         <pc:spChg chg="add mod">
@@ -796,260 +636,180 @@
   </pc:docChgLst>
   <pc:docChgLst>
     <pc:chgData name="Yevgeny Menaker" userId="cf90ab60ec4b5844" providerId="LiveId" clId="{062F9CD9-FB25-403D-9A82-D3F541407AE9}"/>
-    <pc:docChg chg="custSel addSld modSld">
-      <pc:chgData name="Yevgeny Menaker" userId="cf90ab60ec4b5844" providerId="LiveId" clId="{062F9CD9-FB25-403D-9A82-D3F541407AE9}" dt="2025-08-08T19:49:30.918" v="825" actId="14100"/>
+    <pc:docChg chg="undo custSel addSld modSld addMainMaster delMainMaster modMainMaster">
+      <pc:chgData name="Yevgeny Menaker" userId="cf90ab60ec4b5844" providerId="LiveId" clId="{062F9CD9-FB25-403D-9A82-D3F541407AE9}" dt="2025-08-10T16:47:42.701" v="2685" actId="404"/>
       <pc:docMkLst>
         <pc:docMk/>
       </pc:docMkLst>
-      <pc:sldChg chg="addSp delSp modSp mod modTransition delAnim modAnim modNotesTx">
-        <pc:chgData name="Yevgeny Menaker" userId="cf90ab60ec4b5844" providerId="LiveId" clId="{062F9CD9-FB25-403D-9A82-D3F541407AE9}" dt="2025-08-08T19:49:30.918" v="825" actId="14100"/>
+      <pc:sldChg chg="addSp delSp modSp mod modTransition modClrScheme delAnim modAnim chgLayout modNotesTx">
+        <pc:chgData name="Yevgeny Menaker" userId="cf90ab60ec4b5844" providerId="LiveId" clId="{062F9CD9-FB25-403D-9A82-D3F541407AE9}" dt="2025-08-10T16:45:26.807" v="2663" actId="478"/>
         <pc:sldMkLst>
           <pc:docMk/>
           <pc:sldMk cId="0" sldId="256"/>
         </pc:sldMkLst>
-        <pc:spChg chg="mod">
-          <ac:chgData name="Yevgeny Menaker" userId="cf90ab60ec4b5844" providerId="LiveId" clId="{062F9CD9-FB25-403D-9A82-D3F541407AE9}" dt="2025-08-08T19:49:30.918" v="825" actId="14100"/>
+        <pc:spChg chg="del">
+          <ac:chgData name="Yevgeny Menaker" userId="cf90ab60ec4b5844" providerId="LiveId" clId="{062F9CD9-FB25-403D-9A82-D3F541407AE9}" dt="2025-08-10T16:44:38.193" v="2660" actId="478"/>
+          <ac:spMkLst>
+            <pc:docMk/>
+            <pc:sldMk cId="0" sldId="256"/>
+            <ac:spMk id="5" creationId="{B65DC7ED-C2A6-FA48-B262-71D9F0B36949}"/>
+          </ac:spMkLst>
+        </pc:spChg>
+        <pc:spChg chg="del mod ord">
+          <ac:chgData name="Yevgeny Menaker" userId="cf90ab60ec4b5844" providerId="LiveId" clId="{062F9CD9-FB25-403D-9A82-D3F541407AE9}" dt="2025-08-10T16:45:26.807" v="2663" actId="478"/>
+          <ac:spMkLst>
+            <pc:docMk/>
+            <pc:sldMk cId="0" sldId="256"/>
+            <ac:spMk id="6" creationId="{DE85E291-CC91-BEAE-3240-96ACCAD29B41}"/>
+          </ac:spMkLst>
+        </pc:spChg>
+        <pc:spChg chg="mod ord">
+          <ac:chgData name="Yevgeny Menaker" userId="cf90ab60ec4b5844" providerId="LiveId" clId="{062F9CD9-FB25-403D-9A82-D3F541407AE9}" dt="2025-08-10T16:45:19.091" v="2662" actId="700"/>
           <ac:spMkLst>
             <pc:docMk/>
             <pc:sldMk cId="0" sldId="256"/>
             <ac:spMk id="217" creationId="{00000000-0000-0000-0000-000000000000}"/>
           </ac:spMkLst>
         </pc:spChg>
+        <pc:spChg chg="mod">
+          <ac:chgData name="Yevgeny Menaker" userId="cf90ab60ec4b5844" providerId="LiveId" clId="{062F9CD9-FB25-403D-9A82-D3F541407AE9}" dt="2025-08-10T16:45:19.091" v="2662" actId="700"/>
+          <ac:spMkLst>
+            <pc:docMk/>
+            <pc:sldMk cId="0" sldId="256"/>
+            <ac:spMk id="218" creationId="{00000000-0000-0000-0000-000000000000}"/>
+          </ac:spMkLst>
+        </pc:spChg>
         <pc:picChg chg="add del mod">
-          <ac:chgData name="Yevgeny Menaker" userId="cf90ab60ec4b5844" providerId="LiveId" clId="{062F9CD9-FB25-403D-9A82-D3F541407AE9}" dt="2025-08-08T15:04:02.263" v="754"/>
+          <ac:chgData name="Yevgeny Menaker" userId="cf90ab60ec4b5844" providerId="LiveId" clId="{062F9CD9-FB25-403D-9A82-D3F541407AE9}" dt="2025-08-10T16:28:53.760" v="2477" actId="478"/>
           <ac:picMkLst>
             <pc:docMk/>
             <pc:sldMk cId="0" sldId="256"/>
-            <ac:picMk id="4" creationId="{3D246F84-8670-14F9-5A44-56BF45F4EBA5}"/>
+            <ac:picMk id="3" creationId="{D3FD8D97-474C-509A-4518-D5D9136893E0}"/>
+          </ac:picMkLst>
+        </pc:picChg>
+        <pc:picChg chg="add del mod">
+          <ac:chgData name="Yevgeny Menaker" userId="cf90ab60ec4b5844" providerId="LiveId" clId="{062F9CD9-FB25-403D-9A82-D3F541407AE9}" dt="2025-08-09T11:43:16.567" v="2345"/>
+          <ac:picMkLst>
+            <pc:docMk/>
+            <pc:sldMk cId="0" sldId="256"/>
+            <ac:picMk id="4" creationId="{021DBACF-B8B2-CD6A-4DE8-3BD2F2A3A576}"/>
+          </ac:picMkLst>
+        </pc:picChg>
+        <pc:picChg chg="add mod">
+          <ac:chgData name="Yevgeny Menaker" userId="cf90ab60ec4b5844" providerId="LiveId" clId="{062F9CD9-FB25-403D-9A82-D3F541407AE9}" dt="2025-08-10T16:29:01.556" v="2479" actId="1076"/>
+          <ac:picMkLst>
+            <pc:docMk/>
+            <pc:sldMk cId="0" sldId="256"/>
+            <ac:picMk id="4" creationId="{6C91CEA8-8353-E1ED-3027-3587FBE9E1AB}"/>
+          </ac:picMkLst>
+        </pc:picChg>
+        <pc:picChg chg="add del mod">
+          <ac:chgData name="Yevgeny Menaker" userId="cf90ab60ec4b5844" providerId="LiveId" clId="{062F9CD9-FB25-403D-9A82-D3F541407AE9}" dt="2025-08-09T11:50:59.047" v="2349"/>
+          <ac:picMkLst>
+            <pc:docMk/>
+            <pc:sldMk cId="0" sldId="256"/>
+            <ac:picMk id="5" creationId="{C1AB68F9-90E6-7BCD-F1EF-611674C88296}"/>
           </ac:picMkLst>
         </pc:picChg>
         <pc:picChg chg="add del mod ord">
-          <ac:chgData name="Yevgeny Menaker" userId="cf90ab60ec4b5844" providerId="LiveId" clId="{062F9CD9-FB25-403D-9A82-D3F541407AE9}" dt="2025-08-08T15:04:36.178" v="755"/>
+          <ac:chgData name="Yevgeny Menaker" userId="cf90ab60ec4b5844" providerId="LiveId" clId="{062F9CD9-FB25-403D-9A82-D3F541407AE9}" dt="2025-08-09T11:51:10.690" v="2350"/>
           <ac:picMkLst>
             <pc:docMk/>
             <pc:sldMk cId="0" sldId="256"/>
-            <ac:picMk id="7" creationId="{718A140C-9F90-FD5A-A6AA-1F73F7D35BE8}"/>
+            <ac:picMk id="11" creationId="{E3472ACE-87EF-D46C-76E4-FCA6E0B5704E}"/>
           </ac:picMkLst>
         </pc:picChg>
         <pc:picChg chg="add del mod">
-          <ac:chgData name="Yevgeny Menaker" userId="cf90ab60ec4b5844" providerId="LiveId" clId="{062F9CD9-FB25-403D-9A82-D3F541407AE9}" dt="2025-08-08T15:05:51.859" v="757"/>
+          <ac:chgData name="Yevgeny Menaker" userId="cf90ab60ec4b5844" providerId="LiveId" clId="{062F9CD9-FB25-403D-9A82-D3F541407AE9}" dt="2025-08-09T11:51:31.425" v="2352"/>
           <ac:picMkLst>
             <pc:docMk/>
             <pc:sldMk cId="0" sldId="256"/>
-            <ac:picMk id="8" creationId="{24DAF787-E463-01C8-EFBD-41FAA622C9FA}"/>
+            <ac:picMk id="12" creationId="{648201A1-3F74-230E-4409-834A72097226}"/>
           </ac:picMkLst>
         </pc:picChg>
         <pc:picChg chg="add del mod ord">
-          <ac:chgData name="Yevgeny Menaker" userId="cf90ab60ec4b5844" providerId="LiveId" clId="{062F9CD9-FB25-403D-9A82-D3F541407AE9}" dt="2025-08-08T15:06:20.146" v="758"/>
+          <ac:chgData name="Yevgeny Menaker" userId="cf90ab60ec4b5844" providerId="LiveId" clId="{062F9CD9-FB25-403D-9A82-D3F541407AE9}" dt="2025-08-09T11:51:35.691" v="2353"/>
           <ac:picMkLst>
             <pc:docMk/>
             <pc:sldMk cId="0" sldId="256"/>
-            <ac:picMk id="11" creationId="{6ECFD327-269D-4F8B-BA84-DC1677E2BF00}"/>
+            <ac:picMk id="15" creationId="{4D89AFA5-A537-2F03-E1AB-6E1F4336E33E}"/>
           </ac:picMkLst>
         </pc:picChg>
         <pc:picChg chg="add del mod">
-          <ac:chgData name="Yevgeny Menaker" userId="cf90ab60ec4b5844" providerId="LiveId" clId="{062F9CD9-FB25-403D-9A82-D3F541407AE9}" dt="2025-08-08T15:06:57.194" v="760"/>
+          <ac:chgData name="Yevgeny Menaker" userId="cf90ab60ec4b5844" providerId="LiveId" clId="{062F9CD9-FB25-403D-9A82-D3F541407AE9}" dt="2025-08-09T11:56:02.082" v="2355"/>
           <ac:picMkLst>
             <pc:docMk/>
             <pc:sldMk cId="0" sldId="256"/>
-            <ac:picMk id="12" creationId="{EA54ADCF-4EE3-7ADA-0812-58595933BBA1}"/>
+            <ac:picMk id="16" creationId="{5A04F71F-F501-9007-3DB9-1A98113D15FE}"/>
           </ac:picMkLst>
         </pc:picChg>
         <pc:picChg chg="add del mod ord">
-          <ac:chgData name="Yevgeny Menaker" userId="cf90ab60ec4b5844" providerId="LiveId" clId="{062F9CD9-FB25-403D-9A82-D3F541407AE9}" dt="2025-08-08T15:07:08.247" v="761"/>
+          <ac:chgData name="Yevgeny Menaker" userId="cf90ab60ec4b5844" providerId="LiveId" clId="{062F9CD9-FB25-403D-9A82-D3F541407AE9}" dt="2025-08-09T11:58:04.683" v="2356"/>
           <ac:picMkLst>
             <pc:docMk/>
             <pc:sldMk cId="0" sldId="256"/>
-            <ac:picMk id="15" creationId="{3D3A9D83-1192-76D1-6138-DCE3C56986F3}"/>
+            <ac:picMk id="20" creationId="{5652F61D-63ED-D007-115D-23D7A2D90F65}"/>
           </ac:picMkLst>
         </pc:picChg>
         <pc:picChg chg="add del mod">
-          <ac:chgData name="Yevgeny Menaker" userId="cf90ab60ec4b5844" providerId="LiveId" clId="{062F9CD9-FB25-403D-9A82-D3F541407AE9}" dt="2025-08-08T15:07:17.069" v="763"/>
+          <ac:chgData name="Yevgeny Menaker" userId="cf90ab60ec4b5844" providerId="LiveId" clId="{062F9CD9-FB25-403D-9A82-D3F541407AE9}" dt="2025-08-09T12:11:53.688" v="2390"/>
           <ac:picMkLst>
             <pc:docMk/>
             <pc:sldMk cId="0" sldId="256"/>
-            <ac:picMk id="16" creationId="{FA6B0285-699F-69A5-8183-9E3FE51FAA3E}"/>
+            <ac:picMk id="21" creationId="{199836D9-9FBB-4060-E29D-F18A047DA57C}"/>
           </ac:picMkLst>
         </pc:picChg>
         <pc:picChg chg="add del mod ord">
-          <ac:chgData name="Yevgeny Menaker" userId="cf90ab60ec4b5844" providerId="LiveId" clId="{062F9CD9-FB25-403D-9A82-D3F541407AE9}" dt="2025-08-08T15:07:42.695" v="764"/>
+          <ac:chgData name="Yevgeny Menaker" userId="cf90ab60ec4b5844" providerId="LiveId" clId="{062F9CD9-FB25-403D-9A82-D3F541407AE9}" dt="2025-08-09T12:12:17.240" v="2391"/>
           <ac:picMkLst>
             <pc:docMk/>
             <pc:sldMk cId="0" sldId="256"/>
-            <ac:picMk id="19" creationId="{CE06DC5C-E15A-2DD4-0E9F-A1B88FB74DED}"/>
+            <ac:picMk id="24" creationId="{D4BECFDD-2C6E-0F93-8D13-3979BA1979B4}"/>
           </ac:picMkLst>
         </pc:picChg>
         <pc:picChg chg="add del mod">
-          <ac:chgData name="Yevgeny Menaker" userId="cf90ab60ec4b5844" providerId="LiveId" clId="{062F9CD9-FB25-403D-9A82-D3F541407AE9}" dt="2025-08-08T15:09:00.465" v="766"/>
+          <ac:chgData name="Yevgeny Menaker" userId="cf90ab60ec4b5844" providerId="LiveId" clId="{062F9CD9-FB25-403D-9A82-D3F541407AE9}" dt="2025-08-09T12:12:20.191" v="2393"/>
           <ac:picMkLst>
             <pc:docMk/>
             <pc:sldMk cId="0" sldId="256"/>
-            <ac:picMk id="20" creationId="{BCC7D4C6-B9AA-4EFE-4D0B-87C981C61FB3}"/>
+            <ac:picMk id="25" creationId="{C45A2169-ED09-F2FB-9045-6A34A1DCAA43}"/>
           </ac:picMkLst>
         </pc:picChg>
         <pc:picChg chg="add del mod ord">
-          <ac:chgData name="Yevgeny Menaker" userId="cf90ab60ec4b5844" providerId="LiveId" clId="{062F9CD9-FB25-403D-9A82-D3F541407AE9}" dt="2025-08-08T15:09:33.103" v="767"/>
+          <ac:chgData name="Yevgeny Menaker" userId="cf90ab60ec4b5844" providerId="LiveId" clId="{062F9CD9-FB25-403D-9A82-D3F541407AE9}" dt="2025-08-09T12:14:22.381" v="2394"/>
           <ac:picMkLst>
             <pc:docMk/>
             <pc:sldMk cId="0" sldId="256"/>
-            <ac:picMk id="24" creationId="{64277174-FB91-56C5-3F47-ED6CAFD39BCB}"/>
+            <ac:picMk id="28" creationId="{4FD93402-336E-3E8D-77D5-F11283293028}"/>
           </ac:picMkLst>
         </pc:picChg>
         <pc:picChg chg="add del mod">
-          <ac:chgData name="Yevgeny Menaker" userId="cf90ab60ec4b5844" providerId="LiveId" clId="{062F9CD9-FB25-403D-9A82-D3F541407AE9}" dt="2025-08-08T15:10:02.133" v="769"/>
+          <ac:chgData name="Yevgeny Menaker" userId="cf90ab60ec4b5844" providerId="LiveId" clId="{062F9CD9-FB25-403D-9A82-D3F541407AE9}" dt="2025-08-09T12:14:26.377" v="2399"/>
           <ac:picMkLst>
             <pc:docMk/>
             <pc:sldMk cId="0" sldId="256"/>
-            <ac:picMk id="25" creationId="{AEBD07A6-EA79-6563-8147-4721273E66F8}"/>
+            <ac:picMk id="29" creationId="{06B68F83-DFC0-6815-B9F1-C8AF696EA280}"/>
           </ac:picMkLst>
         </pc:picChg>
         <pc:picChg chg="add del mod ord">
-          <ac:chgData name="Yevgeny Menaker" userId="cf90ab60ec4b5844" providerId="LiveId" clId="{062F9CD9-FB25-403D-9A82-D3F541407AE9}" dt="2025-08-08T15:10:06.777" v="770"/>
+          <ac:chgData name="Yevgeny Menaker" userId="cf90ab60ec4b5844" providerId="LiveId" clId="{062F9CD9-FB25-403D-9A82-D3F541407AE9}" dt="2025-08-09T12:19:01.771" v="2400"/>
           <ac:picMkLst>
             <pc:docMk/>
             <pc:sldMk cId="0" sldId="256"/>
-            <ac:picMk id="28" creationId="{D3ED512F-1C28-5AC2-F72A-87BF45241A30}"/>
+            <ac:picMk id="30" creationId="{D9E54742-09DB-2751-9784-DEF03A458770}"/>
           </ac:picMkLst>
         </pc:picChg>
         <pc:picChg chg="add del mod">
-          <ac:chgData name="Yevgeny Menaker" userId="cf90ab60ec4b5844" providerId="LiveId" clId="{062F9CD9-FB25-403D-9A82-D3F541407AE9}" dt="2025-08-08T15:10:14.044" v="772"/>
+          <ac:chgData name="Yevgeny Menaker" userId="cf90ab60ec4b5844" providerId="LiveId" clId="{062F9CD9-FB25-403D-9A82-D3F541407AE9}" dt="2025-08-10T16:26:02.962" v="2416" actId="478"/>
           <ac:picMkLst>
             <pc:docMk/>
             <pc:sldMk cId="0" sldId="256"/>
-            <ac:picMk id="29" creationId="{ADE6E56B-7787-B80D-F3C2-C8949B5A9456}"/>
-          </ac:picMkLst>
-        </pc:picChg>
-        <pc:picChg chg="add del mod ord">
-          <ac:chgData name="Yevgeny Menaker" userId="cf90ab60ec4b5844" providerId="LiveId" clId="{062F9CD9-FB25-403D-9A82-D3F541407AE9}" dt="2025-08-08T15:10:43.872" v="773"/>
-          <ac:picMkLst>
-            <pc:docMk/>
-            <pc:sldMk cId="0" sldId="256"/>
-            <ac:picMk id="32" creationId="{08CE51F6-48B3-73C3-F89D-7917BC67399F}"/>
-          </ac:picMkLst>
-        </pc:picChg>
-        <pc:picChg chg="add del mod">
-          <ac:chgData name="Yevgeny Menaker" userId="cf90ab60ec4b5844" providerId="LiveId" clId="{062F9CD9-FB25-403D-9A82-D3F541407AE9}" dt="2025-08-08T15:10:52.114" v="775"/>
-          <ac:picMkLst>
-            <pc:docMk/>
-            <pc:sldMk cId="0" sldId="256"/>
-            <ac:picMk id="33" creationId="{1A4F887F-1A84-9346-3ECF-ECEE2F1AADE0}"/>
-          </ac:picMkLst>
-        </pc:picChg>
-        <pc:picChg chg="add del mod ord">
-          <ac:chgData name="Yevgeny Menaker" userId="cf90ab60ec4b5844" providerId="LiveId" clId="{062F9CD9-FB25-403D-9A82-D3F541407AE9}" dt="2025-08-08T15:11:05.896" v="776"/>
-          <ac:picMkLst>
-            <pc:docMk/>
-            <pc:sldMk cId="0" sldId="256"/>
-            <ac:picMk id="36" creationId="{951B96DF-53D2-60E0-7DB1-9A3149684F55}"/>
-          </ac:picMkLst>
-        </pc:picChg>
-        <pc:picChg chg="add del mod">
-          <ac:chgData name="Yevgeny Menaker" userId="cf90ab60ec4b5844" providerId="LiveId" clId="{062F9CD9-FB25-403D-9A82-D3F541407AE9}" dt="2025-08-08T15:11:08.290" v="778"/>
-          <ac:picMkLst>
-            <pc:docMk/>
-            <pc:sldMk cId="0" sldId="256"/>
-            <ac:picMk id="37" creationId="{426A5E6F-2E13-46C3-1604-D10E4E61CE62}"/>
-          </ac:picMkLst>
-        </pc:picChg>
-        <pc:picChg chg="add del mod ord">
-          <ac:chgData name="Yevgeny Menaker" userId="cf90ab60ec4b5844" providerId="LiveId" clId="{062F9CD9-FB25-403D-9A82-D3F541407AE9}" dt="2025-08-08T15:11:17.171" v="779"/>
-          <ac:picMkLst>
-            <pc:docMk/>
-            <pc:sldMk cId="0" sldId="256"/>
-            <ac:picMk id="40" creationId="{79F339A1-2FBE-C685-4F39-5B0F54A51644}"/>
-          </ac:picMkLst>
-        </pc:picChg>
-        <pc:picChg chg="add del mod">
-          <ac:chgData name="Yevgeny Menaker" userId="cf90ab60ec4b5844" providerId="LiveId" clId="{062F9CD9-FB25-403D-9A82-D3F541407AE9}" dt="2025-08-08T15:11:20.765" v="781"/>
-          <ac:picMkLst>
-            <pc:docMk/>
-            <pc:sldMk cId="0" sldId="256"/>
-            <ac:picMk id="41" creationId="{9661039D-44E1-77BE-F461-579B241F3250}"/>
-          </ac:picMkLst>
-        </pc:picChg>
-        <pc:picChg chg="add del mod ord">
-          <ac:chgData name="Yevgeny Menaker" userId="cf90ab60ec4b5844" providerId="LiveId" clId="{062F9CD9-FB25-403D-9A82-D3F541407AE9}" dt="2025-08-08T15:11:35.914" v="782"/>
-          <ac:picMkLst>
-            <pc:docMk/>
-            <pc:sldMk cId="0" sldId="256"/>
-            <ac:picMk id="44" creationId="{FCF9E303-C134-5B5C-AADA-0F65E5A2CF15}"/>
-          </ac:picMkLst>
-        </pc:picChg>
-        <pc:picChg chg="add del mod">
-          <ac:chgData name="Yevgeny Menaker" userId="cf90ab60ec4b5844" providerId="LiveId" clId="{062F9CD9-FB25-403D-9A82-D3F541407AE9}" dt="2025-08-08T15:11:46.833" v="784"/>
-          <ac:picMkLst>
-            <pc:docMk/>
-            <pc:sldMk cId="0" sldId="256"/>
-            <ac:picMk id="45" creationId="{C6AB3CCD-382C-9FE6-ED73-DF1118B1A69E}"/>
-          </ac:picMkLst>
-        </pc:picChg>
-        <pc:picChg chg="add del mod ord">
-          <ac:chgData name="Yevgeny Menaker" userId="cf90ab60ec4b5844" providerId="LiveId" clId="{062F9CD9-FB25-403D-9A82-D3F541407AE9}" dt="2025-08-08T15:12:10.866" v="785"/>
-          <ac:picMkLst>
-            <pc:docMk/>
-            <pc:sldMk cId="0" sldId="256"/>
-            <ac:picMk id="48" creationId="{2D323FBC-DA59-656A-2446-B96FA2B32A1E}"/>
-          </ac:picMkLst>
-        </pc:picChg>
-        <pc:picChg chg="add del mod">
-          <ac:chgData name="Yevgeny Menaker" userId="cf90ab60ec4b5844" providerId="LiveId" clId="{062F9CD9-FB25-403D-9A82-D3F541407AE9}" dt="2025-08-08T15:12:36.789" v="787"/>
-          <ac:picMkLst>
-            <pc:docMk/>
-            <pc:sldMk cId="0" sldId="256"/>
-            <ac:picMk id="49" creationId="{D4154C21-F753-EF77-5D86-0F74E5D65616}"/>
-          </ac:picMkLst>
-        </pc:picChg>
-        <pc:picChg chg="add del mod ord">
-          <ac:chgData name="Yevgeny Menaker" userId="cf90ab60ec4b5844" providerId="LiveId" clId="{062F9CD9-FB25-403D-9A82-D3F541407AE9}" dt="2025-08-08T15:12:59.180" v="788"/>
-          <ac:picMkLst>
-            <pc:docMk/>
-            <pc:sldMk cId="0" sldId="256"/>
-            <ac:picMk id="52" creationId="{C14021AA-6602-8194-44FB-44410A4F2607}"/>
-          </ac:picMkLst>
-        </pc:picChg>
-        <pc:picChg chg="add del mod">
-          <ac:chgData name="Yevgeny Menaker" userId="cf90ab60ec4b5844" providerId="LiveId" clId="{062F9CD9-FB25-403D-9A82-D3F541407AE9}" dt="2025-08-08T15:13:11.849" v="790"/>
-          <ac:picMkLst>
-            <pc:docMk/>
-            <pc:sldMk cId="0" sldId="256"/>
-            <ac:picMk id="53" creationId="{BC5FA45E-3EF5-4D1C-3F32-255DDE74B883}"/>
-          </ac:picMkLst>
-        </pc:picChg>
-        <pc:picChg chg="add del mod ord">
-          <ac:chgData name="Yevgeny Menaker" userId="cf90ab60ec4b5844" providerId="LiveId" clId="{062F9CD9-FB25-403D-9A82-D3F541407AE9}" dt="2025-08-08T15:13:38.526" v="791"/>
-          <ac:picMkLst>
-            <pc:docMk/>
-            <pc:sldMk cId="0" sldId="256"/>
-            <ac:picMk id="56" creationId="{C17D34D2-45D8-0EB2-6E55-A143E5DA33F2}"/>
-          </ac:picMkLst>
-        </pc:picChg>
-        <pc:picChg chg="add del mod">
-          <ac:chgData name="Yevgeny Menaker" userId="cf90ab60ec4b5844" providerId="LiveId" clId="{062F9CD9-FB25-403D-9A82-D3F541407AE9}" dt="2025-08-08T15:13:57.079" v="793"/>
-          <ac:picMkLst>
-            <pc:docMk/>
-            <pc:sldMk cId="0" sldId="256"/>
-            <ac:picMk id="57" creationId="{08EAD0D4-10C9-A9D3-2770-6A28212F7F73}"/>
-          </ac:picMkLst>
-        </pc:picChg>
-        <pc:picChg chg="add del mod ord">
-          <ac:chgData name="Yevgeny Menaker" userId="cf90ab60ec4b5844" providerId="LiveId" clId="{062F9CD9-FB25-403D-9A82-D3F541407AE9}" dt="2025-08-08T15:14:22.608" v="794"/>
-          <ac:picMkLst>
-            <pc:docMk/>
-            <pc:sldMk cId="0" sldId="256"/>
-            <ac:picMk id="60" creationId="{376A1DD9-11B6-8AA7-5552-51DAD77A87E2}"/>
-          </ac:picMkLst>
-        </pc:picChg>
-        <pc:picChg chg="add del mod">
-          <ac:chgData name="Yevgeny Menaker" userId="cf90ab60ec4b5844" providerId="LiveId" clId="{062F9CD9-FB25-403D-9A82-D3F541407AE9}" dt="2025-08-08T16:05:19.303" v="807" actId="478"/>
-          <ac:picMkLst>
-            <pc:docMk/>
-            <pc:sldMk cId="0" sldId="256"/>
-            <ac:picMk id="61" creationId="{34D4F70F-A993-A7B8-9194-25E9C78EB2F8}"/>
+            <ac:picMk id="31" creationId="{6F118A95-1804-5549-F137-D6541CD4D953}"/>
           </ac:picMkLst>
         </pc:picChg>
       </pc:sldChg>
-      <pc:sldChg chg="addSp delSp modSp mod delAnim modNotesTx">
-        <pc:chgData name="Yevgeny Menaker" userId="cf90ab60ec4b5844" providerId="LiveId" clId="{062F9CD9-FB25-403D-9A82-D3F541407AE9}" dt="2025-08-08T16:05:27.092" v="808" actId="478"/>
+      <pc:sldChg chg="addSp delSp modSp mod modTransition delAnim modAnim modNotesTx">
+        <pc:chgData name="Yevgeny Menaker" userId="cf90ab60ec4b5844" providerId="LiveId" clId="{062F9CD9-FB25-403D-9A82-D3F541407AE9}" dt="2025-08-10T16:29:23" v="2495"/>
         <pc:sldMkLst>
           <pc:docMk/>
           <pc:sldMk cId="0" sldId="258"/>
@@ -1071,16 +831,88 @@
           </ac:spMkLst>
         </pc:spChg>
         <pc:picChg chg="add del mod">
-          <ac:chgData name="Yevgeny Menaker" userId="cf90ab60ec4b5844" providerId="LiveId" clId="{062F9CD9-FB25-403D-9A82-D3F541407AE9}" dt="2025-08-08T16:05:27.092" v="808" actId="478"/>
+          <ac:chgData name="Yevgeny Menaker" userId="cf90ab60ec4b5844" providerId="LiveId" clId="{062F9CD9-FB25-403D-9A82-D3F541407AE9}" dt="2025-08-10T16:29:22.113" v="2494" actId="478"/>
           <ac:picMkLst>
             <pc:docMk/>
             <pc:sldMk cId="0" sldId="258"/>
-            <ac:picMk id="7" creationId="{0E504490-368B-F3F8-75F7-513A1F3A904E}"/>
+            <ac:picMk id="2" creationId="{4B9BA44F-E5D5-A7D9-6C54-8D3BC5C27B03}"/>
+          </ac:picMkLst>
+        </pc:picChg>
+        <pc:picChg chg="add del mod">
+          <ac:chgData name="Yevgeny Menaker" userId="cf90ab60ec4b5844" providerId="LiveId" clId="{062F9CD9-FB25-403D-9A82-D3F541407AE9}" dt="2025-08-09T11:45:03.333" v="2346"/>
+          <ac:picMkLst>
+            <pc:docMk/>
+            <pc:sldMk cId="0" sldId="258"/>
+            <ac:picMk id="2" creationId="{70132752-4291-02EF-8CA4-2FA0152C75E2}"/>
+          </ac:picMkLst>
+        </pc:picChg>
+        <pc:picChg chg="add mod">
+          <ac:chgData name="Yevgeny Menaker" userId="cf90ab60ec4b5844" providerId="LiveId" clId="{062F9CD9-FB25-403D-9A82-D3F541407AE9}" dt="2025-08-10T16:29:23" v="2495"/>
+          <ac:picMkLst>
+            <pc:docMk/>
+            <pc:sldMk cId="0" sldId="258"/>
+            <ac:picMk id="4" creationId="{00971688-3B64-DC4C-3655-06B69C4C3C75}"/>
+          </ac:picMkLst>
+        </pc:picChg>
+        <pc:picChg chg="add del mod">
+          <ac:chgData name="Yevgeny Menaker" userId="cf90ab60ec4b5844" providerId="LiveId" clId="{062F9CD9-FB25-403D-9A82-D3F541407AE9}" dt="2025-08-09T11:50:59.047" v="2349"/>
+          <ac:picMkLst>
+            <pc:docMk/>
+            <pc:sldMk cId="0" sldId="258"/>
+            <ac:picMk id="4" creationId="{1A66C410-BEFE-C7DE-2090-FC0ABCBE0E9C}"/>
+          </ac:picMkLst>
+        </pc:picChg>
+        <pc:picChg chg="add del mod ord">
+          <ac:chgData name="Yevgeny Menaker" userId="cf90ab60ec4b5844" providerId="LiveId" clId="{062F9CD9-FB25-403D-9A82-D3F541407AE9}" dt="2025-08-09T11:58:04.683" v="2356"/>
+          <ac:picMkLst>
+            <pc:docMk/>
+            <pc:sldMk cId="0" sldId="258"/>
+            <ac:picMk id="8" creationId="{4DC2BEB7-D426-A6C4-5C46-C4769A6C0D44}"/>
+          </ac:picMkLst>
+        </pc:picChg>
+        <pc:picChg chg="add del mod">
+          <ac:chgData name="Yevgeny Menaker" userId="cf90ab60ec4b5844" providerId="LiveId" clId="{062F9CD9-FB25-403D-9A82-D3F541407AE9}" dt="2025-08-09T12:11:53.688" v="2390"/>
+          <ac:picMkLst>
+            <pc:docMk/>
+            <pc:sldMk cId="0" sldId="258"/>
+            <ac:picMk id="9" creationId="{287DE63B-02E8-4A26-117A-3AC55FFCF24E}"/>
+          </ac:picMkLst>
+        </pc:picChg>
+        <pc:picChg chg="add del mod ord">
+          <ac:chgData name="Yevgeny Menaker" userId="cf90ab60ec4b5844" providerId="LiveId" clId="{062F9CD9-FB25-403D-9A82-D3F541407AE9}" dt="2025-08-09T12:14:22.381" v="2394"/>
+          <ac:picMkLst>
+            <pc:docMk/>
+            <pc:sldMk cId="0" sldId="258"/>
+            <ac:picMk id="10" creationId="{25773413-B103-BDC7-BEB0-F4A8BD70EA92}"/>
+          </ac:picMkLst>
+        </pc:picChg>
+        <pc:picChg chg="add del mod">
+          <ac:chgData name="Yevgeny Menaker" userId="cf90ab60ec4b5844" providerId="LiveId" clId="{062F9CD9-FB25-403D-9A82-D3F541407AE9}" dt="2025-08-09T12:14:26.377" v="2399"/>
+          <ac:picMkLst>
+            <pc:docMk/>
+            <pc:sldMk cId="0" sldId="258"/>
+            <ac:picMk id="11" creationId="{3E0963F4-B4E2-5F7C-4EE5-7740B28658E3}"/>
+          </ac:picMkLst>
+        </pc:picChg>
+        <pc:picChg chg="add del mod ord">
+          <ac:chgData name="Yevgeny Menaker" userId="cf90ab60ec4b5844" providerId="LiveId" clId="{062F9CD9-FB25-403D-9A82-D3F541407AE9}" dt="2025-08-09T12:19:01.771" v="2400"/>
+          <ac:picMkLst>
+            <pc:docMk/>
+            <pc:sldMk cId="0" sldId="258"/>
+            <ac:picMk id="12" creationId="{B19F5F5D-A650-65AC-6247-150C20B51103}"/>
+          </ac:picMkLst>
+        </pc:picChg>
+        <pc:picChg chg="add del mod">
+          <ac:chgData name="Yevgeny Menaker" userId="cf90ab60ec4b5844" providerId="LiveId" clId="{062F9CD9-FB25-403D-9A82-D3F541407AE9}" dt="2025-08-10T16:26:06.266" v="2417" actId="478"/>
+          <ac:picMkLst>
+            <pc:docMk/>
+            <pc:sldMk cId="0" sldId="258"/>
+            <ac:picMk id="13" creationId="{E56A79A7-ACFD-39BA-15ED-0BC741F6BBBA}"/>
           </ac:picMkLst>
         </pc:picChg>
       </pc:sldChg>
-      <pc:sldChg chg="addSp delSp modSp mod delAnim modNotesTx">
-        <pc:chgData name="Yevgeny Menaker" userId="cf90ab60ec4b5844" providerId="LiveId" clId="{062F9CD9-FB25-403D-9A82-D3F541407AE9}" dt="2025-08-08T16:05:32.487" v="809" actId="478"/>
+      <pc:sldChg chg="addSp delSp modSp mod modTransition delAnim modAnim modNotesTx">
+        <pc:chgData name="Yevgeny Menaker" userId="cf90ab60ec4b5844" providerId="LiveId" clId="{062F9CD9-FB25-403D-9A82-D3F541407AE9}" dt="2025-08-10T16:29:27.311" v="2497"/>
         <pc:sldMkLst>
           <pc:docMk/>
           <pc:sldMk cId="0" sldId="260"/>
@@ -1094,22 +926,78 @@
           </ac:spMkLst>
         </pc:spChg>
         <pc:picChg chg="add del mod">
-          <ac:chgData name="Yevgeny Menaker" userId="cf90ab60ec4b5844" providerId="LiveId" clId="{062F9CD9-FB25-403D-9A82-D3F541407AE9}" dt="2025-08-08T16:05:32.487" v="809" actId="478"/>
+          <ac:chgData name="Yevgeny Menaker" userId="cf90ab60ec4b5844" providerId="LiveId" clId="{062F9CD9-FB25-403D-9A82-D3F541407AE9}" dt="2025-08-10T16:29:26.535" v="2496" actId="478"/>
           <ac:picMkLst>
             <pc:docMk/>
             <pc:sldMk cId="0" sldId="260"/>
-            <ac:picMk id="9" creationId="{B43F9796-B17F-B492-D05D-9D6648BABE38}"/>
+            <ac:picMk id="5" creationId="{84AF41E5-0677-DC40-770B-F02EA3C9CCBA}"/>
+          </ac:picMkLst>
+        </pc:picChg>
+        <pc:picChg chg="add del mod">
+          <ac:chgData name="Yevgeny Menaker" userId="cf90ab60ec4b5844" providerId="LiveId" clId="{062F9CD9-FB25-403D-9A82-D3F541407AE9}" dt="2025-08-09T11:58:04.683" v="2356"/>
+          <ac:picMkLst>
+            <pc:docMk/>
+            <pc:sldMk cId="0" sldId="260"/>
+            <ac:picMk id="5" creationId="{DBAB8921-374B-7DD4-EA36-C2282E7DEE41}"/>
+          </ac:picMkLst>
+        </pc:picChg>
+        <pc:picChg chg="add mod">
+          <ac:chgData name="Yevgeny Menaker" userId="cf90ab60ec4b5844" providerId="LiveId" clId="{062F9CD9-FB25-403D-9A82-D3F541407AE9}" dt="2025-08-10T16:29:27.311" v="2497"/>
+          <ac:picMkLst>
+            <pc:docMk/>
+            <pc:sldMk cId="0" sldId="260"/>
+            <ac:picMk id="7" creationId="{30D71D0F-54B5-44AC-9E79-AD0067525B4C}"/>
+          </ac:picMkLst>
+        </pc:picChg>
+        <pc:picChg chg="add del mod">
+          <ac:chgData name="Yevgeny Menaker" userId="cf90ab60ec4b5844" providerId="LiveId" clId="{062F9CD9-FB25-403D-9A82-D3F541407AE9}" dt="2025-08-09T12:11:53.688" v="2390"/>
+          <ac:picMkLst>
+            <pc:docMk/>
+            <pc:sldMk cId="0" sldId="260"/>
+            <ac:picMk id="7" creationId="{ED431AE4-A264-0BA2-1A1F-49B23B955954}"/>
+          </ac:picMkLst>
+        </pc:picChg>
+        <pc:picChg chg="add del mod ord">
+          <ac:chgData name="Yevgeny Menaker" userId="cf90ab60ec4b5844" providerId="LiveId" clId="{062F9CD9-FB25-403D-9A82-D3F541407AE9}" dt="2025-08-09T12:14:22.381" v="2394"/>
+          <ac:picMkLst>
+            <pc:docMk/>
+            <pc:sldMk cId="0" sldId="260"/>
+            <ac:picMk id="8" creationId="{6C593D2D-1462-45A3-028E-F24DEF2ABED0}"/>
+          </ac:picMkLst>
+        </pc:picChg>
+        <pc:picChg chg="add del mod">
+          <ac:chgData name="Yevgeny Menaker" userId="cf90ab60ec4b5844" providerId="LiveId" clId="{062F9CD9-FB25-403D-9A82-D3F541407AE9}" dt="2025-08-09T12:14:26.377" v="2399"/>
+          <ac:picMkLst>
+            <pc:docMk/>
+            <pc:sldMk cId="0" sldId="260"/>
+            <ac:picMk id="9" creationId="{0AF365FE-0AB5-4971-7773-FC0F940F4B0F}"/>
+          </ac:picMkLst>
+        </pc:picChg>
+        <pc:picChg chg="add del mod ord">
+          <ac:chgData name="Yevgeny Menaker" userId="cf90ab60ec4b5844" providerId="LiveId" clId="{062F9CD9-FB25-403D-9A82-D3F541407AE9}" dt="2025-08-09T12:19:01.771" v="2400"/>
+          <ac:picMkLst>
+            <pc:docMk/>
+            <pc:sldMk cId="0" sldId="260"/>
+            <ac:picMk id="10" creationId="{10BF5E7B-4EBA-488B-8ECD-154BF9C1D7F3}"/>
+          </ac:picMkLst>
+        </pc:picChg>
+        <pc:picChg chg="add del mod">
+          <ac:chgData name="Yevgeny Menaker" userId="cf90ab60ec4b5844" providerId="LiveId" clId="{062F9CD9-FB25-403D-9A82-D3F541407AE9}" dt="2025-08-10T16:26:10.681" v="2418" actId="478"/>
+          <ac:picMkLst>
+            <pc:docMk/>
+            <pc:sldMk cId="0" sldId="260"/>
+            <ac:picMk id="11" creationId="{2086030E-4B8C-3E2E-2EA4-F3C6D352CF15}"/>
           </ac:picMkLst>
         </pc:picChg>
       </pc:sldChg>
-      <pc:sldChg chg="addSp delSp modSp mod delAnim modNotesTx">
-        <pc:chgData name="Yevgeny Menaker" userId="cf90ab60ec4b5844" providerId="LiveId" clId="{062F9CD9-FB25-403D-9A82-D3F541407AE9}" dt="2025-08-08T16:05:36.604" v="810" actId="478"/>
+      <pc:sldChg chg="addSp delSp modSp mod modTransition delAnim modAnim modNotesTx">
+        <pc:chgData name="Yevgeny Menaker" userId="cf90ab60ec4b5844" providerId="LiveId" clId="{062F9CD9-FB25-403D-9A82-D3F541407AE9}" dt="2025-08-10T16:47:42.701" v="2685" actId="404"/>
         <pc:sldMkLst>
           <pc:docMk/>
           <pc:sldMk cId="0" sldId="261"/>
         </pc:sldMkLst>
         <pc:spChg chg="mod">
-          <ac:chgData name="Yevgeny Menaker" userId="cf90ab60ec4b5844" providerId="LiveId" clId="{062F9CD9-FB25-403D-9A82-D3F541407AE9}" dt="2025-08-08T12:43:49.832" v="69" actId="20577"/>
+          <ac:chgData name="Yevgeny Menaker" userId="cf90ab60ec4b5844" providerId="LiveId" clId="{062F9CD9-FB25-403D-9A82-D3F541407AE9}" dt="2025-08-10T16:41:22.837" v="2551" actId="14100"/>
           <ac:spMkLst>
             <pc:docMk/>
             <pc:sldMk cId="0" sldId="261"/>
@@ -1117,7 +1005,15 @@
           </ac:spMkLst>
         </pc:spChg>
         <pc:spChg chg="mod">
-          <ac:chgData name="Yevgeny Menaker" userId="cf90ab60ec4b5844" providerId="LiveId" clId="{062F9CD9-FB25-403D-9A82-D3F541407AE9}" dt="2025-08-08T13:19:21.560" v="468" actId="1036"/>
+          <ac:chgData name="Yevgeny Menaker" userId="cf90ab60ec4b5844" providerId="LiveId" clId="{062F9CD9-FB25-403D-9A82-D3F541407AE9}" dt="2025-08-10T16:47:42.701" v="2685" actId="404"/>
+          <ac:spMkLst>
+            <pc:docMk/>
+            <pc:sldMk cId="0" sldId="261"/>
+            <ac:spMk id="9" creationId="{4FBEEA59-16F3-3DAF-FE62-388C590CB7AD}"/>
+          </ac:spMkLst>
+        </pc:spChg>
+        <pc:spChg chg="mod">
+          <ac:chgData name="Yevgeny Menaker" userId="cf90ab60ec4b5844" providerId="LiveId" clId="{062F9CD9-FB25-403D-9A82-D3F541407AE9}" dt="2025-08-10T16:40:45.848" v="2513" actId="404"/>
           <ac:spMkLst>
             <pc:docMk/>
             <pc:sldMk cId="0" sldId="261"/>
@@ -1125,20 +1021,164 @@
           </ac:spMkLst>
         </pc:spChg>
         <pc:picChg chg="add del mod">
-          <ac:chgData name="Yevgeny Menaker" userId="cf90ab60ec4b5844" providerId="LiveId" clId="{062F9CD9-FB25-403D-9A82-D3F541407AE9}" dt="2025-08-08T16:05:36.604" v="810" actId="478"/>
+          <ac:chgData name="Yevgeny Menaker" userId="cf90ab60ec4b5844" providerId="LiveId" clId="{062F9CD9-FB25-403D-9A82-D3F541407AE9}" dt="2025-08-09T11:58:04.683" v="2356"/>
           <ac:picMkLst>
             <pc:docMk/>
             <pc:sldMk cId="0" sldId="261"/>
-            <ac:picMk id="7" creationId="{B3A387D8-183E-C6C3-C248-F57BCD8D8219}"/>
+            <ac:picMk id="2" creationId="{6B6E330A-8137-F788-A0F6-31BA2BE1D448}"/>
+          </ac:picMkLst>
+        </pc:picChg>
+        <pc:picChg chg="add del mod">
+          <ac:chgData name="Yevgeny Menaker" userId="cf90ab60ec4b5844" providerId="LiveId" clId="{062F9CD9-FB25-403D-9A82-D3F541407AE9}" dt="2025-08-10T16:29:31.396" v="2498" actId="478"/>
+          <ac:picMkLst>
+            <pc:docMk/>
+            <pc:sldMk cId="0" sldId="261"/>
+            <ac:picMk id="2" creationId="{7145374D-D546-4A36-FF40-2F5FAF466F77}"/>
+          </ac:picMkLst>
+        </pc:picChg>
+        <pc:picChg chg="add mod">
+          <ac:chgData name="Yevgeny Menaker" userId="cf90ab60ec4b5844" providerId="LiveId" clId="{062F9CD9-FB25-403D-9A82-D3F541407AE9}" dt="2025-08-10T16:29:32.260" v="2499"/>
+          <ac:picMkLst>
+            <pc:docMk/>
+            <pc:sldMk cId="0" sldId="261"/>
+            <ac:picMk id="5" creationId="{A3777C46-E55E-4FDF-1627-1A8C160C1AA1}"/>
+          </ac:picMkLst>
+        </pc:picChg>
+        <pc:picChg chg="add del mod">
+          <ac:chgData name="Yevgeny Menaker" userId="cf90ab60ec4b5844" providerId="LiveId" clId="{062F9CD9-FB25-403D-9A82-D3F541407AE9}" dt="2025-08-09T11:58:17.399" v="2358"/>
+          <ac:picMkLst>
+            <pc:docMk/>
+            <pc:sldMk cId="0" sldId="261"/>
+            <ac:picMk id="5" creationId="{B1062EA2-FDA6-F2E5-9A39-CEA93EC82BAD}"/>
+          </ac:picMkLst>
+        </pc:picChg>
+        <pc:picChg chg="mod">
+          <ac:chgData name="Yevgeny Menaker" userId="cf90ab60ec4b5844" providerId="LiveId" clId="{062F9CD9-FB25-403D-9A82-D3F541407AE9}" dt="2025-08-10T16:41:30.548" v="2553" actId="1036"/>
+          <ac:picMkLst>
+            <pc:docMk/>
+            <pc:sldMk cId="0" sldId="261"/>
+            <ac:picMk id="6" creationId="{421CE206-C606-CE6A-B277-77805C291090}"/>
+          </ac:picMkLst>
+        </pc:picChg>
+        <pc:picChg chg="mod">
+          <ac:chgData name="Yevgeny Menaker" userId="cf90ab60ec4b5844" providerId="LiveId" clId="{062F9CD9-FB25-403D-9A82-D3F541407AE9}" dt="2025-08-10T16:41:45.627" v="2600" actId="1037"/>
+          <ac:picMkLst>
+            <pc:docMk/>
+            <pc:sldMk cId="0" sldId="261"/>
+            <ac:picMk id="8" creationId="{DD76B971-4E6D-C7BE-5B1C-325808CF364D}"/>
+          </ac:picMkLst>
+        </pc:picChg>
+        <pc:picChg chg="add del mod ord">
+          <ac:chgData name="Yevgeny Menaker" userId="cf90ab60ec4b5844" providerId="LiveId" clId="{062F9CD9-FB25-403D-9A82-D3F541407AE9}" dt="2025-08-09T11:58:34.375" v="2359"/>
+          <ac:picMkLst>
+            <pc:docMk/>
+            <pc:sldMk cId="0" sldId="261"/>
+            <ac:picMk id="10" creationId="{B0682A5D-A1F9-575F-FC5A-83F4CFB509B9}"/>
+          </ac:picMkLst>
+        </pc:picChg>
+        <pc:picChg chg="add del mod">
+          <ac:chgData name="Yevgeny Menaker" userId="cf90ab60ec4b5844" providerId="LiveId" clId="{062F9CD9-FB25-403D-9A82-D3F541407AE9}" dt="2025-08-09T11:58:37.356" v="2361"/>
+          <ac:picMkLst>
+            <pc:docMk/>
+            <pc:sldMk cId="0" sldId="261"/>
+            <ac:picMk id="11" creationId="{051A5B9E-73D3-6B63-7710-C0C637E8731E}"/>
+          </ac:picMkLst>
+        </pc:picChg>
+        <pc:picChg chg="add del mod ord">
+          <ac:chgData name="Yevgeny Menaker" userId="cf90ab60ec4b5844" providerId="LiveId" clId="{062F9CD9-FB25-403D-9A82-D3F541407AE9}" dt="2025-08-09T11:59:07.187" v="2362"/>
+          <ac:picMkLst>
+            <pc:docMk/>
+            <pc:sldMk cId="0" sldId="261"/>
+            <ac:picMk id="14" creationId="{C6B361E8-E3BA-FD66-470D-91678A7CEF73}"/>
+          </ac:picMkLst>
+        </pc:picChg>
+        <pc:picChg chg="add del mod">
+          <ac:chgData name="Yevgeny Menaker" userId="cf90ab60ec4b5844" providerId="LiveId" clId="{062F9CD9-FB25-403D-9A82-D3F541407AE9}" dt="2025-08-09T11:59:16.836" v="2364"/>
+          <ac:picMkLst>
+            <pc:docMk/>
+            <pc:sldMk cId="0" sldId="261"/>
+            <ac:picMk id="15" creationId="{7F9230F4-6427-356E-F0F3-FFEC412A93E1}"/>
+          </ac:picMkLst>
+        </pc:picChg>
+        <pc:picChg chg="add del mod ord">
+          <ac:chgData name="Yevgeny Menaker" userId="cf90ab60ec4b5844" providerId="LiveId" clId="{062F9CD9-FB25-403D-9A82-D3F541407AE9}" dt="2025-08-09T11:59:44.138" v="2365"/>
+          <ac:picMkLst>
+            <pc:docMk/>
+            <pc:sldMk cId="0" sldId="261"/>
+            <ac:picMk id="18" creationId="{6C4F7214-4419-A41C-4B61-80F6ACB1C164}"/>
+          </ac:picMkLst>
+        </pc:picChg>
+        <pc:picChg chg="add del mod">
+          <ac:chgData name="Yevgeny Menaker" userId="cf90ab60ec4b5844" providerId="LiveId" clId="{062F9CD9-FB25-403D-9A82-D3F541407AE9}" dt="2025-08-09T11:59:50.927" v="2367"/>
+          <ac:picMkLst>
+            <pc:docMk/>
+            <pc:sldMk cId="0" sldId="261"/>
+            <ac:picMk id="19" creationId="{2A544AD1-C4F5-F43C-C5E8-45717FBEE003}"/>
+          </ac:picMkLst>
+        </pc:picChg>
+        <pc:picChg chg="add del mod ord">
+          <ac:chgData name="Yevgeny Menaker" userId="cf90ab60ec4b5844" providerId="LiveId" clId="{062F9CD9-FB25-403D-9A82-D3F541407AE9}" dt="2025-08-09T12:00:16.345" v="2368"/>
+          <ac:picMkLst>
+            <pc:docMk/>
+            <pc:sldMk cId="0" sldId="261"/>
+            <ac:picMk id="22" creationId="{30B641FE-6CE1-4EF3-0747-3A66C72E92CC}"/>
+          </ac:picMkLst>
+        </pc:picChg>
+        <pc:picChg chg="add del mod">
+          <ac:chgData name="Yevgeny Menaker" userId="cf90ab60ec4b5844" providerId="LiveId" clId="{062F9CD9-FB25-403D-9A82-D3F541407AE9}" dt="2025-08-09T12:11:53.688" v="2390"/>
+          <ac:picMkLst>
+            <pc:docMk/>
+            <pc:sldMk cId="0" sldId="261"/>
+            <ac:picMk id="23" creationId="{B5C1BDB4-53C6-6DE9-4883-95547A589FDE}"/>
+          </ac:picMkLst>
+        </pc:picChg>
+        <pc:picChg chg="add del mod ord">
+          <ac:chgData name="Yevgeny Menaker" userId="cf90ab60ec4b5844" providerId="LiveId" clId="{062F9CD9-FB25-403D-9A82-D3F541407AE9}" dt="2025-08-09T12:14:22.381" v="2394"/>
+          <ac:picMkLst>
+            <pc:docMk/>
+            <pc:sldMk cId="0" sldId="261"/>
+            <ac:picMk id="26" creationId="{ECDDFC1F-3E2A-FC22-5BF6-DB40E34CD4B9}"/>
+          </ac:picMkLst>
+        </pc:picChg>
+        <pc:picChg chg="add del mod">
+          <ac:chgData name="Yevgeny Menaker" userId="cf90ab60ec4b5844" providerId="LiveId" clId="{062F9CD9-FB25-403D-9A82-D3F541407AE9}" dt="2025-08-09T12:14:26.377" v="2399"/>
+          <ac:picMkLst>
+            <pc:docMk/>
+            <pc:sldMk cId="0" sldId="261"/>
+            <ac:picMk id="27" creationId="{4266B80F-1FA3-3280-2925-012511D33A13}"/>
+          </ac:picMkLst>
+        </pc:picChg>
+        <pc:picChg chg="add del mod ord">
+          <ac:chgData name="Yevgeny Menaker" userId="cf90ab60ec4b5844" providerId="LiveId" clId="{062F9CD9-FB25-403D-9A82-D3F541407AE9}" dt="2025-08-09T12:19:01.771" v="2400"/>
+          <ac:picMkLst>
+            <pc:docMk/>
+            <pc:sldMk cId="0" sldId="261"/>
+            <ac:picMk id="30" creationId="{B4517426-CAC6-CA1F-4E24-147189D2CBE7}"/>
+          </ac:picMkLst>
+        </pc:picChg>
+        <pc:picChg chg="add del mod">
+          <ac:chgData name="Yevgeny Menaker" userId="cf90ab60ec4b5844" providerId="LiveId" clId="{062F9CD9-FB25-403D-9A82-D3F541407AE9}" dt="2025-08-10T16:26:14.485" v="2419" actId="478"/>
+          <ac:picMkLst>
+            <pc:docMk/>
+            <pc:sldMk cId="0" sldId="261"/>
+            <ac:picMk id="31" creationId="{B8A4A3B1-5F27-B291-D21F-F2589F65EAA7}"/>
           </ac:picMkLst>
         </pc:picChg>
       </pc:sldChg>
-      <pc:sldChg chg="addSp delSp modSp mod delAnim modNotesTx">
-        <pc:chgData name="Yevgeny Menaker" userId="cf90ab60ec4b5844" providerId="LiveId" clId="{062F9CD9-FB25-403D-9A82-D3F541407AE9}" dt="2025-08-08T16:05:41.004" v="811" actId="478"/>
+      <pc:sldChg chg="addSp delSp modSp mod modTransition delAnim modAnim modNotesTx">
+        <pc:chgData name="Yevgeny Menaker" userId="cf90ab60ec4b5844" providerId="LiveId" clId="{062F9CD9-FB25-403D-9A82-D3F541407AE9}" dt="2025-08-10T16:47:34.518" v="2684" actId="404"/>
         <pc:sldMkLst>
           <pc:docMk/>
           <pc:sldMk cId="0" sldId="262"/>
         </pc:sldMkLst>
+        <pc:spChg chg="mod">
+          <ac:chgData name="Yevgeny Menaker" userId="cf90ab60ec4b5844" providerId="LiveId" clId="{062F9CD9-FB25-403D-9A82-D3F541407AE9}" dt="2025-08-10T16:47:34.518" v="2684" actId="404"/>
+          <ac:spMkLst>
+            <pc:docMk/>
+            <pc:sldMk cId="0" sldId="262"/>
+            <ac:spMk id="6" creationId="{EE7688D6-814B-EB94-85EA-CC09E31FF3D2}"/>
+          </ac:spMkLst>
+        </pc:spChg>
         <pc:spChg chg="mod">
           <ac:chgData name="Yevgeny Menaker" userId="cf90ab60ec4b5844" providerId="LiveId" clId="{062F9CD9-FB25-403D-9A82-D3F541407AE9}" dt="2025-08-08T13:18:05.128" v="430" actId="14100"/>
           <ac:spMkLst>
@@ -1155,37 +1195,77 @@
             <ac:spMk id="230" creationId="{00000000-0000-0000-0000-000000000000}"/>
           </ac:spMkLst>
         </pc:spChg>
+        <pc:picChg chg="add mod">
+          <ac:chgData name="Yevgeny Menaker" userId="cf90ab60ec4b5844" providerId="LiveId" clId="{062F9CD9-FB25-403D-9A82-D3F541407AE9}" dt="2025-08-10T16:30:03.019" v="2502" actId="1076"/>
+          <ac:picMkLst>
+            <pc:docMk/>
+            <pc:sldMk cId="0" sldId="262"/>
+            <ac:picMk id="2" creationId="{4FD91975-D364-7710-AC34-2D129A6B8A98}"/>
+          </ac:picMkLst>
+        </pc:picChg>
+        <pc:picChg chg="add del mod">
+          <ac:chgData name="Yevgeny Menaker" userId="cf90ab60ec4b5844" providerId="LiveId" clId="{062F9CD9-FB25-403D-9A82-D3F541407AE9}" dt="2025-08-09T12:00:56.034" v="2369"/>
+          <ac:picMkLst>
+            <pc:docMk/>
+            <pc:sldMk cId="0" sldId="262"/>
+            <ac:picMk id="2" creationId="{7EEA0BE1-4F24-4BBD-B8FC-89DAAD238762}"/>
+          </ac:picMkLst>
+        </pc:picChg>
         <pc:picChg chg="mod">
-          <ac:chgData name="Yevgeny Menaker" userId="cf90ab60ec4b5844" providerId="LiveId" clId="{062F9CD9-FB25-403D-9A82-D3F541407AE9}" dt="2025-08-08T13:34:55.455" v="714" actId="1036"/>
+          <ac:chgData name="Yevgeny Menaker" userId="cf90ab60ec4b5844" providerId="LiveId" clId="{062F9CD9-FB25-403D-9A82-D3F541407AE9}" dt="2025-08-10T16:41:56.921" v="2606" actId="1035"/>
           <ac:picMkLst>
             <pc:docMk/>
             <pc:sldMk cId="0" sldId="262"/>
             <ac:picMk id="3" creationId="{4C593170-16FA-C590-0A49-5EE355FC7C08}"/>
           </ac:picMkLst>
         </pc:picChg>
+        <pc:picChg chg="add del mod">
+          <ac:chgData name="Yevgeny Menaker" userId="cf90ab60ec4b5844" providerId="LiveId" clId="{062F9CD9-FB25-403D-9A82-D3F541407AE9}" dt="2025-08-09T12:11:53.688" v="2390"/>
+          <ac:picMkLst>
+            <pc:docMk/>
+            <pc:sldMk cId="0" sldId="262"/>
+            <ac:picMk id="4" creationId="{3FF45B23-234F-D411-0296-8954AE20D194}"/>
+          </ac:picMkLst>
+        </pc:picChg>
         <pc:picChg chg="mod">
-          <ac:chgData name="Yevgeny Menaker" userId="cf90ab60ec4b5844" providerId="LiveId" clId="{062F9CD9-FB25-403D-9A82-D3F541407AE9}" dt="2025-08-08T13:34:55.455" v="714" actId="1036"/>
+          <ac:chgData name="Yevgeny Menaker" userId="cf90ab60ec4b5844" providerId="LiveId" clId="{062F9CD9-FB25-403D-9A82-D3F541407AE9}" dt="2025-08-10T16:42:01.784" v="2613" actId="1035"/>
           <ac:picMkLst>
             <pc:docMk/>
             <pc:sldMk cId="0" sldId="262"/>
             <ac:picMk id="5" creationId="{7D4FAE8F-18FD-49DB-51A6-A0ABF270FCB5}"/>
           </ac:picMkLst>
         </pc:picChg>
-        <pc:picChg chg="add del mod">
-          <ac:chgData name="Yevgeny Menaker" userId="cf90ab60ec4b5844" providerId="LiveId" clId="{062F9CD9-FB25-403D-9A82-D3F541407AE9}" dt="2025-08-08T16:05:41.004" v="811" actId="478"/>
+        <pc:picChg chg="add del mod ord">
+          <ac:chgData name="Yevgeny Menaker" userId="cf90ab60ec4b5844" providerId="LiveId" clId="{062F9CD9-FB25-403D-9A82-D3F541407AE9}" dt="2025-08-09T12:19:01.771" v="2400"/>
           <ac:picMkLst>
             <pc:docMk/>
             <pc:sldMk cId="0" sldId="262"/>
-            <ac:picMk id="6" creationId="{78664EE1-0300-D782-4442-1A2F0AE8CB32}"/>
+            <ac:picMk id="8" creationId="{9362DEE8-83A2-2DFA-FAD6-99501652076D}"/>
+          </ac:picMkLst>
+        </pc:picChg>
+        <pc:picChg chg="add del mod">
+          <ac:chgData name="Yevgeny Menaker" userId="cf90ab60ec4b5844" providerId="LiveId" clId="{062F9CD9-FB25-403D-9A82-D3F541407AE9}" dt="2025-08-10T16:26:19.047" v="2420" actId="478"/>
+          <ac:picMkLst>
+            <pc:docMk/>
+            <pc:sldMk cId="0" sldId="262"/>
+            <ac:picMk id="9" creationId="{0D9D18B4-4589-4AB9-F7B0-B2AA4F5E0151}"/>
           </ac:picMkLst>
         </pc:picChg>
       </pc:sldChg>
-      <pc:sldChg chg="modSp mod modNotesTx">
-        <pc:chgData name="Yevgeny Menaker" userId="cf90ab60ec4b5844" providerId="LiveId" clId="{062F9CD9-FB25-403D-9A82-D3F541407AE9}" dt="2025-08-08T14:31:07.725" v="751" actId="34807"/>
+      <pc:sldChg chg="addSp modSp mod modTransition modShow modNotesTx">
+        <pc:chgData name="Yevgeny Menaker" userId="cf90ab60ec4b5844" providerId="LiveId" clId="{062F9CD9-FB25-403D-9A82-D3F541407AE9}" dt="2025-08-10T16:43:03.933" v="2636" actId="14100"/>
         <pc:sldMkLst>
           <pc:docMk/>
           <pc:sldMk cId="0" sldId="263"/>
         </pc:sldMkLst>
+        <pc:spChg chg="mod">
+          <ac:chgData name="Yevgeny Menaker" userId="cf90ab60ec4b5844" providerId="LiveId" clId="{062F9CD9-FB25-403D-9A82-D3F541407AE9}" dt="2025-08-10T16:43:03.933" v="2636" actId="14100"/>
+          <ac:spMkLst>
+            <pc:docMk/>
+            <pc:sldMk cId="0" sldId="263"/>
+            <ac:spMk id="11" creationId="{670C9440-043D-C57F-A2CB-15422D00211B}"/>
+          </ac:spMkLst>
+        </pc:spChg>
         <pc:spChg chg="mod">
           <ac:chgData name="Yevgeny Menaker" userId="cf90ab60ec4b5844" providerId="LiveId" clId="{062F9CD9-FB25-403D-9A82-D3F541407AE9}" dt="2025-08-08T13:18:13.280" v="432" actId="404"/>
           <ac:spMkLst>
@@ -1194,15 +1274,55 @@
             <ac:spMk id="231" creationId="{00000000-0000-0000-0000-000000000000}"/>
           </ac:spMkLst>
         </pc:spChg>
+        <pc:picChg chg="add mod">
+          <ac:chgData name="Yevgeny Menaker" userId="cf90ab60ec4b5844" providerId="LiveId" clId="{062F9CD9-FB25-403D-9A82-D3F541407AE9}" dt="2025-08-10T16:30:05.922" v="2503"/>
+          <ac:picMkLst>
+            <pc:docMk/>
+            <pc:sldMk cId="0" sldId="263"/>
+            <ac:picMk id="2" creationId="{B79E09BF-DA0D-6222-233A-E0338A9DD024}"/>
+          </ac:picMkLst>
+        </pc:picChg>
+        <pc:picChg chg="mod">
+          <ac:chgData name="Yevgeny Menaker" userId="cf90ab60ec4b5844" providerId="LiveId" clId="{062F9CD9-FB25-403D-9A82-D3F541407AE9}" dt="2025-08-10T16:42:47.105" v="2634" actId="1038"/>
+          <ac:picMkLst>
+            <pc:docMk/>
+            <pc:sldMk cId="0" sldId="263"/>
+            <ac:picMk id="3" creationId="{F7C0FE9D-9626-000A-64E9-BFC38C611D64}"/>
+          </ac:picMkLst>
+        </pc:picChg>
+        <pc:picChg chg="mod">
+          <ac:chgData name="Yevgeny Menaker" userId="cf90ab60ec4b5844" providerId="LiveId" clId="{062F9CD9-FB25-403D-9A82-D3F541407AE9}" dt="2025-08-10T16:42:20.196" v="2614" actId="14100"/>
+          <ac:picMkLst>
+            <pc:docMk/>
+            <pc:sldMk cId="0" sldId="263"/>
+            <ac:picMk id="7" creationId="{F9483D58-51F4-CF0B-1F07-5330C8F37BE6}"/>
+          </ac:picMkLst>
+        </pc:picChg>
       </pc:sldChg>
-      <pc:sldChg chg="addSp delSp modSp mod delAnim modNotesTx">
-        <pc:chgData name="Yevgeny Menaker" userId="cf90ab60ec4b5844" providerId="LiveId" clId="{062F9CD9-FB25-403D-9A82-D3F541407AE9}" dt="2025-08-08T16:06:05.894" v="813" actId="478"/>
+      <pc:sldChg chg="addSp delSp modSp mod modTransition delAnim modAnim modNotesTx">
+        <pc:chgData name="Yevgeny Menaker" userId="cf90ab60ec4b5844" providerId="LiveId" clId="{062F9CD9-FB25-403D-9A82-D3F541407AE9}" dt="2025-08-10T16:47:17.768" v="2683" actId="20577"/>
         <pc:sldMkLst>
           <pc:docMk/>
           <pc:sldMk cId="0" sldId="264"/>
         </pc:sldMkLst>
         <pc:spChg chg="mod">
-          <ac:chgData name="Yevgeny Menaker" userId="cf90ab60ec4b5844" providerId="LiveId" clId="{062F9CD9-FB25-403D-9A82-D3F541407AE9}" dt="2025-08-08T13:26:04.134" v="691" actId="20577"/>
+          <ac:chgData name="Yevgeny Menaker" userId="cf90ab60ec4b5844" providerId="LiveId" clId="{062F9CD9-FB25-403D-9A82-D3F541407AE9}" dt="2025-08-10T16:43:48.924" v="2659" actId="1038"/>
+          <ac:spMkLst>
+            <pc:docMk/>
+            <pc:sldMk cId="0" sldId="264"/>
+            <ac:spMk id="4" creationId="{E77D8EE1-743C-1F90-8F04-82FE18913185}"/>
+          </ac:spMkLst>
+        </pc:spChg>
+        <pc:spChg chg="mod">
+          <ac:chgData name="Yevgeny Menaker" userId="cf90ab60ec4b5844" providerId="LiveId" clId="{062F9CD9-FB25-403D-9A82-D3F541407AE9}" dt="2025-08-10T16:47:04.790" v="2680" actId="403"/>
+          <ac:spMkLst>
+            <pc:docMk/>
+            <pc:sldMk cId="0" sldId="264"/>
+            <ac:spMk id="6" creationId="{20262357-D59A-F403-8C0B-F0A41F4AF2EE}"/>
+          </ac:spMkLst>
+        </pc:spChg>
+        <pc:spChg chg="mod">
+          <ac:chgData name="Yevgeny Menaker" userId="cf90ab60ec4b5844" providerId="LiveId" clId="{062F9CD9-FB25-403D-9A82-D3F541407AE9}" dt="2025-08-10T16:47:17.768" v="2683" actId="20577"/>
           <ac:spMkLst>
             <pc:docMk/>
             <pc:sldMk cId="0" sldId="264"/>
@@ -1217,6 +1337,22 @@
             <ac:spMk id="233" creationId="{00000000-0000-0000-0000-000000000000}"/>
           </ac:spMkLst>
         </pc:spChg>
+        <pc:picChg chg="add mod">
+          <ac:chgData name="Yevgeny Menaker" userId="cf90ab60ec4b5844" providerId="LiveId" clId="{062F9CD9-FB25-403D-9A82-D3F541407AE9}" dt="2025-08-10T16:30:13.234" v="2505"/>
+          <ac:picMkLst>
+            <pc:docMk/>
+            <pc:sldMk cId="0" sldId="264"/>
+            <ac:picMk id="2" creationId="{5D9A58CE-CFC6-7ECC-515F-6DC2AED9F267}"/>
+          </ac:picMkLst>
+        </pc:picChg>
+        <pc:picChg chg="add del mod">
+          <ac:chgData name="Yevgeny Menaker" userId="cf90ab60ec4b5844" providerId="LiveId" clId="{062F9CD9-FB25-403D-9A82-D3F541407AE9}" dt="2025-08-09T12:02:47.337" v="2371"/>
+          <ac:picMkLst>
+            <pc:docMk/>
+            <pc:sldMk cId="0" sldId="264"/>
+            <ac:picMk id="2" creationId="{DFCAD57A-3DF3-5862-A80E-FC6209D891C9}"/>
+          </ac:picMkLst>
+        </pc:picChg>
         <pc:picChg chg="mod">
           <ac:chgData name="Yevgeny Menaker" userId="cf90ab60ec4b5844" providerId="LiveId" clId="{062F9CD9-FB25-403D-9A82-D3F541407AE9}" dt="2025-08-08T13:21:29.449" v="510" actId="1037"/>
           <ac:picMkLst>
@@ -1225,20 +1361,20 @@
             <ac:picMk id="3" creationId="{11E99070-675F-276A-FA61-4D7E38FBCE55}"/>
           </ac:picMkLst>
         </pc:picChg>
+        <pc:picChg chg="add del mod">
+          <ac:chgData name="Yevgeny Menaker" userId="cf90ab60ec4b5844" providerId="LiveId" clId="{062F9CD9-FB25-403D-9A82-D3F541407AE9}" dt="2025-08-09T12:11:53.688" v="2390"/>
+          <ac:picMkLst>
+            <pc:docMk/>
+            <pc:sldMk cId="0" sldId="264"/>
+            <ac:picMk id="4" creationId="{E77D2974-DB9C-C7ED-583D-76A1F5814BD7}"/>
+          </ac:picMkLst>
+        </pc:picChg>
         <pc:picChg chg="mod">
           <ac:chgData name="Yevgeny Menaker" userId="cf90ab60ec4b5844" providerId="LiveId" clId="{062F9CD9-FB25-403D-9A82-D3F541407AE9}" dt="2025-08-08T13:21:29.449" v="510" actId="1037"/>
           <ac:picMkLst>
             <pc:docMk/>
             <pc:sldMk cId="0" sldId="264"/>
             <ac:picMk id="5" creationId="{B743BD53-D8E1-8D08-DDF0-20ED909CE807}"/>
-          </ac:picMkLst>
-        </pc:picChg>
-        <pc:picChg chg="add del mod">
-          <ac:chgData name="Yevgeny Menaker" userId="cf90ab60ec4b5844" providerId="LiveId" clId="{062F9CD9-FB25-403D-9A82-D3F541407AE9}" dt="2025-08-08T16:06:05.894" v="813" actId="478"/>
-          <ac:picMkLst>
-            <pc:docMk/>
-            <pc:sldMk cId="0" sldId="264"/>
-            <ac:picMk id="6" creationId="{B767E737-BD26-1806-6E3D-99406868F082}"/>
           </ac:picMkLst>
         </pc:picChg>
         <pc:picChg chg="mod">
@@ -1257,13 +1393,37 @@
             <ac:picMk id="9" creationId="{6848B290-BEE9-CA79-D35F-0F8BD060730A}"/>
           </ac:picMkLst>
         </pc:picChg>
+        <pc:picChg chg="add del mod ord">
+          <ac:chgData name="Yevgeny Menaker" userId="cf90ab60ec4b5844" providerId="LiveId" clId="{062F9CD9-FB25-403D-9A82-D3F541407AE9}" dt="2025-08-09T12:19:01.771" v="2400"/>
+          <ac:picMkLst>
+            <pc:docMk/>
+            <pc:sldMk cId="0" sldId="264"/>
+            <ac:picMk id="11" creationId="{A3076B57-6ED4-2955-005F-A28637D85DF9}"/>
+          </ac:picMkLst>
+        </pc:picChg>
+        <pc:picChg chg="add del mod">
+          <ac:chgData name="Yevgeny Menaker" userId="cf90ab60ec4b5844" providerId="LiveId" clId="{062F9CD9-FB25-403D-9A82-D3F541407AE9}" dt="2025-08-10T16:26:26.359" v="2422" actId="478"/>
+          <ac:picMkLst>
+            <pc:docMk/>
+            <pc:sldMk cId="0" sldId="264"/>
+            <ac:picMk id="12" creationId="{034C2F8B-9F03-881C-F58F-FF6CC51D31B4}"/>
+          </ac:picMkLst>
+        </pc:picChg>
       </pc:sldChg>
       <pc:sldChg chg="addSp delSp modSp mod modTransition delAnim modAnim modNotesTx">
-        <pc:chgData name="Yevgeny Menaker" userId="cf90ab60ec4b5844" providerId="LiveId" clId="{062F9CD9-FB25-403D-9A82-D3F541407AE9}" dt="2025-08-08T16:06:13.199" v="815" actId="478"/>
+        <pc:chgData name="Yevgeny Menaker" userId="cf90ab60ec4b5844" providerId="LiveId" clId="{062F9CD9-FB25-403D-9A82-D3F541407AE9}" dt="2025-08-10T16:46:36.006" v="2676" actId="404"/>
         <pc:sldMkLst>
           <pc:docMk/>
           <pc:sldMk cId="0" sldId="265"/>
         </pc:sldMkLst>
+        <pc:spChg chg="mod">
+          <ac:chgData name="Yevgeny Menaker" userId="cf90ab60ec4b5844" providerId="LiveId" clId="{062F9CD9-FB25-403D-9A82-D3F541407AE9}" dt="2025-08-10T16:46:36.006" v="2676" actId="404"/>
+          <ac:spMkLst>
+            <pc:docMk/>
+            <pc:sldMk cId="0" sldId="265"/>
+            <ac:spMk id="4" creationId="{5DBB28C1-EE07-1585-9476-E921E38D03F7}"/>
+          </ac:spMkLst>
+        </pc:spChg>
         <pc:spChg chg="mod">
           <ac:chgData name="Yevgeny Menaker" userId="cf90ab60ec4b5844" providerId="LiveId" clId="{062F9CD9-FB25-403D-9A82-D3F541407AE9}" dt="2025-08-08T13:40:46.978" v="750" actId="20577"/>
           <ac:spMkLst>
@@ -1280,28 +1440,36 @@
             <ac:spMk id="235" creationId="{00000000-0000-0000-0000-000000000000}"/>
           </ac:spMkLst>
         </pc:spChg>
-        <pc:picChg chg="del">
-          <ac:chgData name="Yevgeny Menaker" userId="cf90ab60ec4b5844" providerId="LiveId" clId="{062F9CD9-FB25-403D-9A82-D3F541407AE9}" dt="2025-08-08T13:01:31.488" v="213" actId="478"/>
+        <pc:picChg chg="add del mod">
+          <ac:chgData name="Yevgeny Menaker" userId="cf90ab60ec4b5844" providerId="LiveId" clId="{062F9CD9-FB25-403D-9A82-D3F541407AE9}" dt="2025-08-09T12:03:50.330" v="2373"/>
           <ac:picMkLst>
             <pc:docMk/>
             <pc:sldMk cId="0" sldId="265"/>
-            <ac:picMk id="3" creationId="{05DE2371-B314-394A-4AAB-4C5A4BFFEC72}"/>
+            <ac:picMk id="2" creationId="{31D672CC-3CE3-CFA5-C326-983325F5D28A}"/>
+          </ac:picMkLst>
+        </pc:picChg>
+        <pc:picChg chg="add mod">
+          <ac:chgData name="Yevgeny Menaker" userId="cf90ab60ec4b5844" providerId="LiveId" clId="{062F9CD9-FB25-403D-9A82-D3F541407AE9}" dt="2025-08-10T16:30:20.241" v="2507"/>
+          <ac:picMkLst>
+            <pc:docMk/>
+            <pc:sldMk cId="0" sldId="265"/>
+            <ac:picMk id="2" creationId="{D734C383-3F87-E30D-681F-B8FB85CF736B}"/>
           </ac:picMkLst>
         </pc:picChg>
         <pc:picChg chg="add del mod">
-          <ac:chgData name="Yevgeny Menaker" userId="cf90ab60ec4b5844" providerId="LiveId" clId="{062F9CD9-FB25-403D-9A82-D3F541407AE9}" dt="2025-08-08T13:01:47.981" v="230" actId="478"/>
+          <ac:chgData name="Yevgeny Menaker" userId="cf90ab60ec4b5844" providerId="LiveId" clId="{062F9CD9-FB25-403D-9A82-D3F541407AE9}" dt="2025-08-09T12:11:53.688" v="2390"/>
           <ac:picMkLst>
             <pc:docMk/>
             <pc:sldMk cId="0" sldId="265"/>
-            <ac:picMk id="4" creationId="{CAF1F211-B5A4-BFEE-AE94-C8530E6ED600}"/>
+            <ac:picMk id="3" creationId="{998B5DB4-84A5-3C4A-C73B-B379E2E62054}"/>
           </ac:picMkLst>
         </pc:picChg>
-        <pc:picChg chg="del">
-          <ac:chgData name="Yevgeny Menaker" userId="cf90ab60ec4b5844" providerId="LiveId" clId="{062F9CD9-FB25-403D-9A82-D3F541407AE9}" dt="2025-08-08T12:55:43.468" v="205" actId="478"/>
+        <pc:picChg chg="add del mod ord">
+          <ac:chgData name="Yevgeny Menaker" userId="cf90ab60ec4b5844" providerId="LiveId" clId="{062F9CD9-FB25-403D-9A82-D3F541407AE9}" dt="2025-08-09T12:19:01.771" v="2400"/>
           <ac:picMkLst>
             <pc:docMk/>
             <pc:sldMk cId="0" sldId="265"/>
-            <ac:picMk id="5" creationId="{D988F6FE-E7CA-502D-C6F0-C06E7D3ADBB2}"/>
+            <ac:picMk id="7" creationId="{E7912FBD-FFD9-0F24-B706-DF75733E6A41}"/>
           </ac:picMkLst>
         </pc:picChg>
         <pc:picChg chg="add mod">
@@ -1312,6 +1480,14 @@
             <ac:picMk id="8" creationId="{95CBF11F-2287-9717-0517-A2A3565A4FD1}"/>
           </ac:picMkLst>
         </pc:picChg>
+        <pc:picChg chg="add del mod">
+          <ac:chgData name="Yevgeny Menaker" userId="cf90ab60ec4b5844" providerId="LiveId" clId="{062F9CD9-FB25-403D-9A82-D3F541407AE9}" dt="2025-08-10T16:26:31.091" v="2424" actId="478"/>
+          <ac:picMkLst>
+            <pc:docMk/>
+            <pc:sldMk cId="0" sldId="265"/>
+            <ac:picMk id="9" creationId="{5B090E2E-9052-F431-1A4D-1FEDC62A7DC3}"/>
+          </ac:picMkLst>
+        </pc:picChg>
         <pc:picChg chg="add mod">
           <ac:chgData name="Yevgeny Menaker" userId="cf90ab60ec4b5844" providerId="LiveId" clId="{062F9CD9-FB25-403D-9A82-D3F541407AE9}" dt="2025-08-08T13:15:36.279" v="406" actId="1036"/>
           <ac:picMkLst>
@@ -1320,37 +1496,21 @@
             <ac:picMk id="10" creationId="{E6BD38BF-09FB-3791-2BF5-59A0C3FD70CB}"/>
           </ac:picMkLst>
         </pc:picChg>
-        <pc:picChg chg="add del mod">
-          <ac:chgData name="Yevgeny Menaker" userId="cf90ab60ec4b5844" providerId="LiveId" clId="{062F9CD9-FB25-403D-9A82-D3F541407AE9}" dt="2025-08-08T15:25:33.007" v="804"/>
-          <ac:picMkLst>
-            <pc:docMk/>
-            <pc:sldMk cId="0" sldId="265"/>
-            <ac:picMk id="13" creationId="{88BECADA-B07F-1F09-EC3A-0FC55E9219E9}"/>
-          </ac:picMkLst>
-        </pc:picChg>
-        <pc:picChg chg="add del mod ord">
-          <ac:chgData name="Yevgeny Menaker" userId="cf90ab60ec4b5844" providerId="LiveId" clId="{062F9CD9-FB25-403D-9A82-D3F541407AE9}" dt="2025-08-08T15:25:51.389" v="805"/>
-          <ac:picMkLst>
-            <pc:docMk/>
-            <pc:sldMk cId="0" sldId="265"/>
-            <ac:picMk id="16" creationId="{CAF132E2-128D-D38D-3414-23A3C3815214}"/>
-          </ac:picMkLst>
-        </pc:picChg>
-        <pc:picChg chg="add del mod">
-          <ac:chgData name="Yevgeny Menaker" userId="cf90ab60ec4b5844" providerId="LiveId" clId="{062F9CD9-FB25-403D-9A82-D3F541407AE9}" dt="2025-08-08T16:06:13.199" v="815" actId="478"/>
-          <ac:picMkLst>
-            <pc:docMk/>
-            <pc:sldMk cId="0" sldId="265"/>
-            <ac:picMk id="17" creationId="{A121F8E0-79BC-3930-463B-476B84A6BAEB}"/>
-          </ac:picMkLst>
-        </pc:picChg>
       </pc:sldChg>
-      <pc:sldChg chg="addSp delSp modSp mod delAnim modNotesTx">
-        <pc:chgData name="Yevgeny Menaker" userId="cf90ab60ec4b5844" providerId="LiveId" clId="{062F9CD9-FB25-403D-9A82-D3F541407AE9}" dt="2025-08-08T16:06:16.322" v="816" actId="478"/>
+      <pc:sldChg chg="addSp delSp modSp mod modTransition delAnim modAnim modNotesTx">
+        <pc:chgData name="Yevgeny Menaker" userId="cf90ab60ec4b5844" providerId="LiveId" clId="{062F9CD9-FB25-403D-9A82-D3F541407AE9}" dt="2025-08-10T16:46:44.133" v="2677" actId="404"/>
         <pc:sldMkLst>
           <pc:docMk/>
           <pc:sldMk cId="0" sldId="266"/>
         </pc:sldMkLst>
+        <pc:spChg chg="mod">
+          <ac:chgData name="Yevgeny Menaker" userId="cf90ab60ec4b5844" providerId="LiveId" clId="{062F9CD9-FB25-403D-9A82-D3F541407AE9}" dt="2025-08-10T16:46:44.133" v="2677" actId="404"/>
+          <ac:spMkLst>
+            <pc:docMk/>
+            <pc:sldMk cId="0" sldId="266"/>
+            <ac:spMk id="4" creationId="{69BEDCCE-68CF-5D7C-DD2B-D7512EC3510F}"/>
+          </ac:spMkLst>
+        </pc:spChg>
         <pc:spChg chg="mod">
           <ac:chgData name="Yevgeny Menaker" userId="cf90ab60ec4b5844" providerId="LiveId" clId="{062F9CD9-FB25-403D-9A82-D3F541407AE9}" dt="2025-08-08T13:18:33.424" v="434" actId="14100"/>
           <ac:spMkLst>
@@ -1367,17 +1527,113 @@
             <ac:spMk id="238" creationId="{00000000-0000-0000-0000-000000000000}"/>
           </ac:spMkLst>
         </pc:spChg>
-        <pc:picChg chg="add del mod">
-          <ac:chgData name="Yevgeny Menaker" userId="cf90ab60ec4b5844" providerId="LiveId" clId="{062F9CD9-FB25-403D-9A82-D3F541407AE9}" dt="2025-08-08T16:06:16.322" v="816" actId="478"/>
+        <pc:picChg chg="add mod">
+          <ac:chgData name="Yevgeny Menaker" userId="cf90ab60ec4b5844" providerId="LiveId" clId="{062F9CD9-FB25-403D-9A82-D3F541407AE9}" dt="2025-08-10T16:30:23.100" v="2508"/>
           <ac:picMkLst>
             <pc:docMk/>
             <pc:sldMk cId="0" sldId="266"/>
-            <ac:picMk id="4" creationId="{5CDA5E7F-BC2D-3121-4807-68994C0F6ECA}"/>
+            <ac:picMk id="2" creationId="{BB32EDE6-F6A1-7515-F5CB-F4C166F7E915}"/>
+          </ac:picMkLst>
+        </pc:picChg>
+        <pc:picChg chg="add del mod">
+          <ac:chgData name="Yevgeny Menaker" userId="cf90ab60ec4b5844" providerId="LiveId" clId="{062F9CD9-FB25-403D-9A82-D3F541407AE9}" dt="2025-08-09T12:04:08.544" v="2374"/>
+          <ac:picMkLst>
+            <pc:docMk/>
+            <pc:sldMk cId="0" sldId="266"/>
+            <ac:picMk id="2" creationId="{E4298611-DD00-3B43-19E8-ECDA17F633B2}"/>
+          </ac:picMkLst>
+        </pc:picChg>
+        <pc:picChg chg="add del mod">
+          <ac:chgData name="Yevgeny Menaker" userId="cf90ab60ec4b5844" providerId="LiveId" clId="{062F9CD9-FB25-403D-9A82-D3F541407AE9}" dt="2025-08-09T12:04:12.651" v="2376"/>
+          <ac:picMkLst>
+            <pc:docMk/>
+            <pc:sldMk cId="0" sldId="266"/>
+            <ac:picMk id="3" creationId="{8FECD382-2B9F-3DD6-66F8-3649F82F6397}"/>
+          </ac:picMkLst>
+        </pc:picChg>
+        <pc:picChg chg="add del mod ord">
+          <ac:chgData name="Yevgeny Menaker" userId="cf90ab60ec4b5844" providerId="LiveId" clId="{062F9CD9-FB25-403D-9A82-D3F541407AE9}" dt="2025-08-09T12:04:53.191" v="2377"/>
+          <ac:picMkLst>
+            <pc:docMk/>
+            <pc:sldMk cId="0" sldId="266"/>
+            <ac:picMk id="6" creationId="{417A0CD6-6D1B-67E4-9AC5-05A35E61A6DD}"/>
+          </ac:picMkLst>
+        </pc:picChg>
+        <pc:picChg chg="add del mod">
+          <ac:chgData name="Yevgeny Menaker" userId="cf90ab60ec4b5844" providerId="LiveId" clId="{062F9CD9-FB25-403D-9A82-D3F541407AE9}" dt="2025-08-09T12:11:53.688" v="2390"/>
+          <ac:picMkLst>
+            <pc:docMk/>
+            <pc:sldMk cId="0" sldId="266"/>
+            <ac:picMk id="7" creationId="{1C37AB09-F38E-5D76-A6A3-5285F2E0F901}"/>
+          </ac:picMkLst>
+        </pc:picChg>
+        <pc:picChg chg="add del mod ord">
+          <ac:chgData name="Yevgeny Menaker" userId="cf90ab60ec4b5844" providerId="LiveId" clId="{062F9CD9-FB25-403D-9A82-D3F541407AE9}" dt="2025-08-09T12:19:01.771" v="2400"/>
+          <ac:picMkLst>
+            <pc:docMk/>
+            <pc:sldMk cId="0" sldId="266"/>
+            <ac:picMk id="10" creationId="{E23A6D79-37C2-875A-E5E7-6769F79B9301}"/>
+          </ac:picMkLst>
+        </pc:picChg>
+        <pc:picChg chg="add del mod">
+          <ac:chgData name="Yevgeny Menaker" userId="cf90ab60ec4b5844" providerId="LiveId" clId="{062F9CD9-FB25-403D-9A82-D3F541407AE9}" dt="2025-08-09T12:19:06.927" v="2402"/>
+          <ac:picMkLst>
+            <pc:docMk/>
+            <pc:sldMk cId="0" sldId="266"/>
+            <ac:picMk id="11" creationId="{99790C1C-B573-6ACD-0CB7-E73649F14CD9}"/>
+          </ac:picMkLst>
+        </pc:picChg>
+        <pc:picChg chg="add del mod ord">
+          <ac:chgData name="Yevgeny Menaker" userId="cf90ab60ec4b5844" providerId="LiveId" clId="{062F9CD9-FB25-403D-9A82-D3F541407AE9}" dt="2025-08-09T12:19:26.597" v="2403"/>
+          <ac:picMkLst>
+            <pc:docMk/>
+            <pc:sldMk cId="0" sldId="266"/>
+            <ac:picMk id="14" creationId="{5935897C-301E-60F4-E2E8-89B5D3D7CCC5}"/>
+          </ac:picMkLst>
+        </pc:picChg>
+        <pc:picChg chg="add del mod">
+          <ac:chgData name="Yevgeny Menaker" userId="cf90ab60ec4b5844" providerId="LiveId" clId="{062F9CD9-FB25-403D-9A82-D3F541407AE9}" dt="2025-08-09T12:19:31.186" v="2405"/>
+          <ac:picMkLst>
+            <pc:docMk/>
+            <pc:sldMk cId="0" sldId="266"/>
+            <ac:picMk id="15" creationId="{EA00DDA5-C03E-8BDB-B08B-215800E09913}"/>
+          </ac:picMkLst>
+        </pc:picChg>
+        <pc:picChg chg="add del mod ord">
+          <ac:chgData name="Yevgeny Menaker" userId="cf90ab60ec4b5844" providerId="LiveId" clId="{062F9CD9-FB25-403D-9A82-D3F541407AE9}" dt="2025-08-09T12:19:39.274" v="2406"/>
+          <ac:picMkLst>
+            <pc:docMk/>
+            <pc:sldMk cId="0" sldId="266"/>
+            <ac:picMk id="18" creationId="{CDFCBB27-FA1B-F1E7-4446-1AA2509E3123}"/>
+          </ac:picMkLst>
+        </pc:picChg>
+        <pc:picChg chg="add del mod">
+          <ac:chgData name="Yevgeny Menaker" userId="cf90ab60ec4b5844" providerId="LiveId" clId="{062F9CD9-FB25-403D-9A82-D3F541407AE9}" dt="2025-08-09T12:19:41.638" v="2408"/>
+          <ac:picMkLst>
+            <pc:docMk/>
+            <pc:sldMk cId="0" sldId="266"/>
+            <ac:picMk id="19" creationId="{9124A785-0679-0A0D-66A3-0ABFD32AF2C9}"/>
+          </ac:picMkLst>
+        </pc:picChg>
+        <pc:picChg chg="add del mod ord">
+          <ac:chgData name="Yevgeny Menaker" userId="cf90ab60ec4b5844" providerId="LiveId" clId="{062F9CD9-FB25-403D-9A82-D3F541407AE9}" dt="2025-08-09T12:20:20.205" v="2409"/>
+          <ac:picMkLst>
+            <pc:docMk/>
+            <pc:sldMk cId="0" sldId="266"/>
+            <ac:picMk id="22" creationId="{94584E68-A18D-12C3-B061-761EE4D68168}"/>
+          </ac:picMkLst>
+        </pc:picChg>
+        <pc:picChg chg="add del mod">
+          <ac:chgData name="Yevgeny Menaker" userId="cf90ab60ec4b5844" providerId="LiveId" clId="{062F9CD9-FB25-403D-9A82-D3F541407AE9}" dt="2025-08-10T16:26:34.590" v="2425" actId="478"/>
+          <ac:picMkLst>
+            <pc:docMk/>
+            <pc:sldMk cId="0" sldId="266"/>
+            <ac:picMk id="23" creationId="{9E345A2A-1B34-3AC2-506B-95FA68CBEF87}"/>
           </ac:picMkLst>
         </pc:picChg>
       </pc:sldChg>
-      <pc:sldChg chg="modSp mod modNotesTx">
-        <pc:chgData name="Yevgeny Menaker" userId="cf90ab60ec4b5844" providerId="LiveId" clId="{062F9CD9-FB25-403D-9A82-D3F541407AE9}" dt="2025-08-08T14:31:07.725" v="751" actId="34807"/>
+      <pc:sldChg chg="addSp delSp modSp mod modTransition modShow modNotesTx">
+        <pc:chgData name="Yevgeny Menaker" userId="cf90ab60ec4b5844" providerId="LiveId" clId="{062F9CD9-FB25-403D-9A82-D3F541407AE9}" dt="2025-08-10T16:29:18.347" v="2493" actId="1037"/>
         <pc:sldMkLst>
           <pc:docMk/>
           <pc:sldMk cId="576253988" sldId="268"/>
@@ -1398,9 +1654,25 @@
             <ac:spMk id="3" creationId="{3FAB9AC4-1098-05A5-D102-672F57A67E57}"/>
           </ac:spMkLst>
         </pc:spChg>
+        <pc:picChg chg="add del mod">
+          <ac:chgData name="Yevgeny Menaker" userId="cf90ab60ec4b5844" providerId="LiveId" clId="{062F9CD9-FB25-403D-9A82-D3F541407AE9}" dt="2025-08-10T16:29:07.400" v="2480" actId="478"/>
+          <ac:picMkLst>
+            <pc:docMk/>
+            <pc:sldMk cId="576253988" sldId="268"/>
+            <ac:picMk id="4" creationId="{B8D53959-3F4A-0CA3-DD50-63BE2D45A98B}"/>
+          </ac:picMkLst>
+        </pc:picChg>
+        <pc:picChg chg="add mod">
+          <ac:chgData name="Yevgeny Menaker" userId="cf90ab60ec4b5844" providerId="LiveId" clId="{062F9CD9-FB25-403D-9A82-D3F541407AE9}" dt="2025-08-10T16:29:18.347" v="2493" actId="1037"/>
+          <ac:picMkLst>
+            <pc:docMk/>
+            <pc:sldMk cId="576253988" sldId="268"/>
+            <ac:picMk id="5" creationId="{5912B2F0-6B83-5BB9-497D-826A712EE5BD}"/>
+          </ac:picMkLst>
+        </pc:picChg>
       </pc:sldChg>
-      <pc:sldChg chg="addSp delSp modSp mod delAnim modNotesTx">
-        <pc:chgData name="Yevgeny Menaker" userId="cf90ab60ec4b5844" providerId="LiveId" clId="{062F9CD9-FB25-403D-9A82-D3F541407AE9}" dt="2025-08-08T16:05:48.464" v="812" actId="478"/>
+      <pc:sldChg chg="addSp delSp modSp mod modTransition delAnim modAnim modNotesTx">
+        <pc:chgData name="Yevgeny Menaker" userId="cf90ab60ec4b5844" providerId="LiveId" clId="{062F9CD9-FB25-403D-9A82-D3F541407AE9}" dt="2025-08-10T16:30:09.121" v="2504"/>
         <pc:sldMkLst>
           <pc:docMk/>
           <pc:sldMk cId="3979091466" sldId="269"/>
@@ -1429,6 +1701,30 @@
             <ac:spMk id="10" creationId="{AE42DD81-9E69-AE50-4B2D-E51048E1B210}"/>
           </ac:spMkLst>
         </pc:spChg>
+        <pc:picChg chg="add del mod">
+          <ac:chgData name="Yevgeny Menaker" userId="cf90ab60ec4b5844" providerId="LiveId" clId="{062F9CD9-FB25-403D-9A82-D3F541407AE9}" dt="2025-08-09T12:02:23.635" v="2370"/>
+          <ac:picMkLst>
+            <pc:docMk/>
+            <pc:sldMk cId="3979091466" sldId="269"/>
+            <ac:picMk id="3" creationId="{CD788F85-8CC3-F9B4-1692-82AFE3305AA8}"/>
+          </ac:picMkLst>
+        </pc:picChg>
+        <pc:picChg chg="add mod">
+          <ac:chgData name="Yevgeny Menaker" userId="cf90ab60ec4b5844" providerId="LiveId" clId="{062F9CD9-FB25-403D-9A82-D3F541407AE9}" dt="2025-08-10T16:30:09.121" v="2504"/>
+          <ac:picMkLst>
+            <pc:docMk/>
+            <pc:sldMk cId="3979091466" sldId="269"/>
+            <ac:picMk id="3" creationId="{E46D52D4-92E9-A996-E904-6310447DA14B}"/>
+          </ac:picMkLst>
+        </pc:picChg>
+        <pc:picChg chg="add del mod">
+          <ac:chgData name="Yevgeny Menaker" userId="cf90ab60ec4b5844" providerId="LiveId" clId="{062F9CD9-FB25-403D-9A82-D3F541407AE9}" dt="2025-08-09T12:11:53.688" v="2390"/>
+          <ac:picMkLst>
+            <pc:docMk/>
+            <pc:sldMk cId="3979091466" sldId="269"/>
+            <ac:picMk id="4" creationId="{587F60A1-65FC-EE70-4ACF-2F52E8E93A75}"/>
+          </ac:picMkLst>
+        </pc:picChg>
         <pc:picChg chg="mod">
           <ac:chgData name="Yevgeny Menaker" userId="cf90ab60ec4b5844" providerId="LiveId" clId="{062F9CD9-FB25-403D-9A82-D3F541407AE9}" dt="2025-08-08T13:36:34.556" v="746" actId="1036"/>
           <ac:picMkLst>
@@ -1445,14 +1741,6 @@
             <ac:picMk id="6" creationId="{4324D7EF-62C9-918C-387F-49D3B8B0D0BB}"/>
           </ac:picMkLst>
         </pc:picChg>
-        <pc:picChg chg="add del mod">
-          <ac:chgData name="Yevgeny Menaker" userId="cf90ab60ec4b5844" providerId="LiveId" clId="{062F9CD9-FB25-403D-9A82-D3F541407AE9}" dt="2025-08-08T16:05:48.464" v="812" actId="478"/>
-          <ac:picMkLst>
-            <pc:docMk/>
-            <pc:sldMk cId="3979091466" sldId="269"/>
-            <ac:picMk id="7" creationId="{40FA054E-3E1B-A5DD-8D96-C0487F3A4182}"/>
-          </ac:picMkLst>
-        </pc:picChg>
         <pc:picChg chg="mod">
           <ac:chgData name="Yevgeny Menaker" userId="cf90ab60ec4b5844" providerId="LiveId" clId="{062F9CD9-FB25-403D-9A82-D3F541407AE9}" dt="2025-08-08T13:35:39.612" v="734" actId="1036"/>
           <ac:picMkLst>
@@ -1461,9 +1749,25 @@
             <ac:picMk id="8" creationId="{9F3D4FD4-3ED9-282A-C5BE-965282EFD726}"/>
           </ac:picMkLst>
         </pc:picChg>
+        <pc:picChg chg="add del mod ord">
+          <ac:chgData name="Yevgeny Menaker" userId="cf90ab60ec4b5844" providerId="LiveId" clId="{062F9CD9-FB25-403D-9A82-D3F541407AE9}" dt="2025-08-09T12:19:01.771" v="2400"/>
+          <ac:picMkLst>
+            <pc:docMk/>
+            <pc:sldMk cId="3979091466" sldId="269"/>
+            <ac:picMk id="12" creationId="{BF21B53B-5E69-DD78-0862-CFF77926377F}"/>
+          </ac:picMkLst>
+        </pc:picChg>
+        <pc:picChg chg="add del mod">
+          <ac:chgData name="Yevgeny Menaker" userId="cf90ab60ec4b5844" providerId="LiveId" clId="{062F9CD9-FB25-403D-9A82-D3F541407AE9}" dt="2025-08-10T16:26:22.870" v="2421" actId="478"/>
+          <ac:picMkLst>
+            <pc:docMk/>
+            <pc:sldMk cId="3979091466" sldId="269"/>
+            <ac:picMk id="13" creationId="{D3D40A59-90E5-0861-0999-C67D8044F7A6}"/>
+          </ac:picMkLst>
+        </pc:picChg>
       </pc:sldChg>
-      <pc:sldChg chg="addSp delSp modSp mod delAnim modNotesTx">
-        <pc:chgData name="Yevgeny Menaker" userId="cf90ab60ec4b5844" providerId="LiveId" clId="{062F9CD9-FB25-403D-9A82-D3F541407AE9}" dt="2025-08-08T16:06:09.634" v="814" actId="478"/>
+      <pc:sldChg chg="addSp delSp modSp mod modTransition delAnim modAnim modNotesTx">
+        <pc:chgData name="Yevgeny Menaker" userId="cf90ab60ec4b5844" providerId="LiveId" clId="{062F9CD9-FB25-403D-9A82-D3F541407AE9}" dt="2025-08-10T16:46:57.053" v="2679" actId="403"/>
         <pc:sldMkLst>
           <pc:docMk/>
           <pc:sldMk cId="901845363" sldId="270"/>
@@ -1477,27 +1781,51 @@
           </ac:spMkLst>
         </pc:spChg>
         <pc:spChg chg="mod">
-          <ac:chgData name="Yevgeny Menaker" userId="cf90ab60ec4b5844" providerId="LiveId" clId="{062F9CD9-FB25-403D-9A82-D3F541407AE9}" dt="2025-08-08T13:15:00.335" v="388" actId="1037"/>
+          <ac:chgData name="Yevgeny Menaker" userId="cf90ab60ec4b5844" providerId="LiveId" clId="{062F9CD9-FB25-403D-9A82-D3F541407AE9}" dt="2025-08-10T16:46:57.053" v="2679" actId="403"/>
+          <ac:spMkLst>
+            <pc:docMk/>
+            <pc:sldMk cId="901845363" sldId="270"/>
+            <ac:spMk id="4" creationId="{E4F1863C-EBBD-D359-3583-4B15F96A4A2C}"/>
+          </ac:spMkLst>
+        </pc:spChg>
+        <pc:spChg chg="mod">
+          <ac:chgData name="Yevgeny Menaker" userId="cf90ab60ec4b5844" providerId="LiveId" clId="{062F9CD9-FB25-403D-9A82-D3F541407AE9}" dt="2025-08-10T16:46:20.443" v="2673" actId="20577"/>
           <ac:spMkLst>
             <pc:docMk/>
             <pc:sldMk cId="901845363" sldId="270"/>
             <ac:spMk id="18" creationId="{23EA8291-04A1-2036-5EBF-3E72DD916385}"/>
           </ac:spMkLst>
         </pc:spChg>
+        <pc:picChg chg="add mod">
+          <ac:chgData name="Yevgeny Menaker" userId="cf90ab60ec4b5844" providerId="LiveId" clId="{062F9CD9-FB25-403D-9A82-D3F541407AE9}" dt="2025-08-10T16:30:18.097" v="2506"/>
+          <ac:picMkLst>
+            <pc:docMk/>
+            <pc:sldMk cId="901845363" sldId="270"/>
+            <ac:picMk id="3" creationId="{0133861F-F3F8-1ED8-0FAD-B1420A1686BA}"/>
+          </ac:picMkLst>
+        </pc:picChg>
+        <pc:picChg chg="add del mod">
+          <ac:chgData name="Yevgeny Menaker" userId="cf90ab60ec4b5844" providerId="LiveId" clId="{062F9CD9-FB25-403D-9A82-D3F541407AE9}" dt="2025-08-09T12:03:19.613" v="2372"/>
+          <ac:picMkLst>
+            <pc:docMk/>
+            <pc:sldMk cId="901845363" sldId="270"/>
+            <ac:picMk id="3" creationId="{B0BDCDA3-2211-D3BE-881F-331366981456}"/>
+          </ac:picMkLst>
+        </pc:picChg>
+        <pc:picChg chg="add del mod">
+          <ac:chgData name="Yevgeny Menaker" userId="cf90ab60ec4b5844" providerId="LiveId" clId="{062F9CD9-FB25-403D-9A82-D3F541407AE9}" dt="2025-08-09T12:11:53.688" v="2390"/>
+          <ac:picMkLst>
+            <pc:docMk/>
+            <pc:sldMk cId="901845363" sldId="270"/>
+            <ac:picMk id="4" creationId="{661DDF35-1B3D-9873-BB35-E6AC07BDDFC3}"/>
+          </ac:picMkLst>
+        </pc:picChg>
         <pc:picChg chg="mod">
           <ac:chgData name="Yevgeny Menaker" userId="cf90ab60ec4b5844" providerId="LiveId" clId="{062F9CD9-FB25-403D-9A82-D3F541407AE9}" dt="2025-08-08T13:15:00.335" v="388" actId="1037"/>
           <ac:picMkLst>
             <pc:docMk/>
             <pc:sldMk cId="901845363" sldId="270"/>
             <ac:picMk id="5" creationId="{11A7C961-3EA1-1C0A-FFCA-37EB1F16E1B5}"/>
-          </ac:picMkLst>
-        </pc:picChg>
-        <pc:picChg chg="add del mod">
-          <ac:chgData name="Yevgeny Menaker" userId="cf90ab60ec4b5844" providerId="LiveId" clId="{062F9CD9-FB25-403D-9A82-D3F541407AE9}" dt="2025-08-08T16:06:09.634" v="814" actId="478"/>
-          <ac:picMkLst>
-            <pc:docMk/>
-            <pc:sldMk cId="901845363" sldId="270"/>
-            <ac:picMk id="6" creationId="{0247AA99-A7EE-F829-27CF-F2A3086689F5}"/>
           </ac:picMkLst>
         </pc:picChg>
         <pc:picChg chg="mod">
@@ -1516,12 +1844,28 @@
             <ac:picMk id="9" creationId="{AE8562AD-15DE-15A1-4058-C4A3255EABD1}"/>
           </ac:picMkLst>
         </pc:picChg>
+        <pc:picChg chg="add del mod ord">
+          <ac:chgData name="Yevgeny Menaker" userId="cf90ab60ec4b5844" providerId="LiveId" clId="{062F9CD9-FB25-403D-9A82-D3F541407AE9}" dt="2025-08-09T12:19:01.771" v="2400"/>
+          <ac:picMkLst>
+            <pc:docMk/>
+            <pc:sldMk cId="901845363" sldId="270"/>
+            <ac:picMk id="10" creationId="{F2E3D7E1-7AEA-5A74-8CAE-C6118E1C7A48}"/>
+          </ac:picMkLst>
+        </pc:picChg>
         <pc:picChg chg="mod">
           <ac:chgData name="Yevgeny Menaker" userId="cf90ab60ec4b5844" providerId="LiveId" clId="{062F9CD9-FB25-403D-9A82-D3F541407AE9}" dt="2025-08-08T13:15:00.335" v="388" actId="1037"/>
           <ac:picMkLst>
             <pc:docMk/>
             <pc:sldMk cId="901845363" sldId="270"/>
             <ac:picMk id="11" creationId="{5A94FD8C-D884-DF90-BB96-FCDB10B2A889}"/>
+          </ac:picMkLst>
+        </pc:picChg>
+        <pc:picChg chg="add del mod">
+          <ac:chgData name="Yevgeny Menaker" userId="cf90ab60ec4b5844" providerId="LiveId" clId="{062F9CD9-FB25-403D-9A82-D3F541407AE9}" dt="2025-08-10T16:26:28.733" v="2423" actId="478"/>
+          <ac:picMkLst>
+            <pc:docMk/>
+            <pc:sldMk cId="901845363" sldId="270"/>
+            <ac:picMk id="12" creationId="{459DA4F2-2C9F-EE5A-2242-8398A4E77A0A}"/>
           </ac:picMkLst>
         </pc:picChg>
         <pc:picChg chg="mod">
@@ -1541,8 +1885,8 @@
           </ac:picMkLst>
         </pc:picChg>
       </pc:sldChg>
-      <pc:sldChg chg="modSp new mod modNotesTx">
-        <pc:chgData name="Yevgeny Menaker" userId="cf90ab60ec4b5844" providerId="LiveId" clId="{062F9CD9-FB25-403D-9A82-D3F541407AE9}" dt="2025-08-08T14:31:07.725" v="751" actId="34807"/>
+      <pc:sldChg chg="addSp delSp modSp new mod modTransition delAnim modAnim modNotesTx">
+        <pc:chgData name="Yevgeny Menaker" userId="cf90ab60ec4b5844" providerId="LiveId" clId="{062F9CD9-FB25-403D-9A82-D3F541407AE9}" dt="2025-08-10T16:46:49.253" v="2678" actId="404"/>
         <pc:sldMkLst>
           <pc:docMk/>
           <pc:sldMk cId="2822173111" sldId="271"/>
@@ -1563,7 +1907,232 @@
             <ac:spMk id="3" creationId="{BF0A3A7F-A8CC-F06D-9E35-5C1FC8911F73}"/>
           </ac:spMkLst>
         </pc:spChg>
+        <pc:spChg chg="mod">
+          <ac:chgData name="Yevgeny Menaker" userId="cf90ab60ec4b5844" providerId="LiveId" clId="{062F9CD9-FB25-403D-9A82-D3F541407AE9}" dt="2025-08-10T16:46:49.253" v="2678" actId="404"/>
+          <ac:spMkLst>
+            <pc:docMk/>
+            <pc:sldMk cId="2822173111" sldId="271"/>
+            <ac:spMk id="5" creationId="{D11E7830-B9BF-5118-D9A8-D306C4F9FDE4}"/>
+          </ac:spMkLst>
+        </pc:spChg>
+        <pc:picChg chg="add mod">
+          <ac:chgData name="Yevgeny Menaker" userId="cf90ab60ec4b5844" providerId="LiveId" clId="{062F9CD9-FB25-403D-9A82-D3F541407AE9}" dt="2025-08-10T16:30:24.609" v="2509"/>
+          <ac:picMkLst>
+            <pc:docMk/>
+            <pc:sldMk cId="2822173111" sldId="271"/>
+            <ac:picMk id="4" creationId="{826995B6-9934-0214-2F63-5F3B93AA3856}"/>
+          </ac:picMkLst>
+        </pc:picChg>
+        <pc:picChg chg="add del mod">
+          <ac:chgData name="Yevgeny Menaker" userId="cf90ab60ec4b5844" providerId="LiveId" clId="{062F9CD9-FB25-403D-9A82-D3F541407AE9}" dt="2025-08-09T12:11:53.688" v="2390"/>
+          <ac:picMkLst>
+            <pc:docMk/>
+            <pc:sldMk cId="2822173111" sldId="271"/>
+            <ac:picMk id="7" creationId="{E42D6B04-D405-BAB2-BDEC-D76725F9E1DC}"/>
+          </ac:picMkLst>
+        </pc:picChg>
+        <pc:picChg chg="add del mod ord">
+          <ac:chgData name="Yevgeny Menaker" userId="cf90ab60ec4b5844" providerId="LiveId" clId="{062F9CD9-FB25-403D-9A82-D3F541407AE9}" dt="2025-08-09T12:20:30.245" v="2410"/>
+          <ac:picMkLst>
+            <pc:docMk/>
+            <pc:sldMk cId="2822173111" sldId="271"/>
+            <ac:picMk id="10" creationId="{8BF9AAFA-7D44-7881-5798-FBD30DD9FFE6}"/>
+          </ac:picMkLst>
+        </pc:picChg>
+        <pc:picChg chg="add del mod">
+          <ac:chgData name="Yevgeny Menaker" userId="cf90ab60ec4b5844" providerId="LiveId" clId="{062F9CD9-FB25-403D-9A82-D3F541407AE9}" dt="2025-08-09T12:21:06.462" v="2412"/>
+          <ac:picMkLst>
+            <pc:docMk/>
+            <pc:sldMk cId="2822173111" sldId="271"/>
+            <ac:picMk id="11" creationId="{B5B9AF70-40D6-F0AC-673A-77B5F730DB1C}"/>
+          </ac:picMkLst>
+        </pc:picChg>
+        <pc:picChg chg="add del mod ord">
+          <ac:chgData name="Yevgeny Menaker" userId="cf90ab60ec4b5844" providerId="LiveId" clId="{062F9CD9-FB25-403D-9A82-D3F541407AE9}" dt="2025-08-09T12:21:14.505" v="2413"/>
+          <ac:picMkLst>
+            <pc:docMk/>
+            <pc:sldMk cId="2822173111" sldId="271"/>
+            <ac:picMk id="18" creationId="{3B196EA3-F9ED-C12F-5260-925277732F3C}"/>
+          </ac:picMkLst>
+        </pc:picChg>
+        <pc:picChg chg="add del mod">
+          <ac:chgData name="Yevgeny Menaker" userId="cf90ab60ec4b5844" providerId="LiveId" clId="{062F9CD9-FB25-403D-9A82-D3F541407AE9}" dt="2025-08-10T16:26:52.769" v="2426" actId="478"/>
+          <ac:picMkLst>
+            <pc:docMk/>
+            <pc:sldMk cId="2822173111" sldId="271"/>
+            <ac:picMk id="19" creationId="{7A2B8D82-5583-B51E-ACF6-5FFE83B5F535}"/>
+          </ac:picMkLst>
+        </pc:picChg>
       </pc:sldChg>
+      <pc:sldMasterChg chg="modSp">
+        <pc:chgData name="Yevgeny Menaker" userId="cf90ab60ec4b5844" providerId="LiveId" clId="{062F9CD9-FB25-403D-9A82-D3F541407AE9}" dt="2025-08-10T16:37:21.173" v="2512"/>
+        <pc:sldMasterMkLst>
+          <pc:docMk/>
+          <pc:sldMasterMk cId="0" sldId="2147483648"/>
+        </pc:sldMasterMkLst>
+        <pc:spChg chg="mod">
+          <ac:chgData name="Yevgeny Menaker" userId="cf90ab60ec4b5844" providerId="LiveId" clId="{062F9CD9-FB25-403D-9A82-D3F541407AE9}" dt="2025-08-10T16:37:21.173" v="2512"/>
+          <ac:spMkLst>
+            <pc:docMk/>
+            <pc:sldMasterMk cId="0" sldId="2147483648"/>
+            <ac:spMk id="23" creationId="{00000000-0000-0000-0000-000000000000}"/>
+          </ac:spMkLst>
+        </pc:spChg>
+      </pc:sldMasterChg>
+      <pc:sldMasterChg chg="modSldLayout">
+        <pc:chgData name="Yevgeny Menaker" userId="cf90ab60ec4b5844" providerId="LiveId" clId="{062F9CD9-FB25-403D-9A82-D3F541407AE9}" dt="2025-08-10T16:37:03.526" v="2511" actId="21"/>
+        <pc:sldMasterMkLst>
+          <pc:docMk/>
+          <pc:sldMasterMk cId="0" sldId="2147483651"/>
+        </pc:sldMasterMkLst>
+        <pc:sldLayoutChg chg="modSp mod">
+          <pc:chgData name="Yevgeny Menaker" userId="cf90ab60ec4b5844" providerId="LiveId" clId="{062F9CD9-FB25-403D-9A82-D3F541407AE9}" dt="2025-08-10T16:37:03.526" v="2511" actId="21"/>
+          <pc:sldLayoutMkLst>
+            <pc:docMk/>
+            <pc:sldMasterMk cId="0" sldId="2147483651"/>
+            <pc:sldLayoutMk cId="0" sldId="2147483653"/>
+          </pc:sldLayoutMkLst>
+          <pc:spChg chg="mod">
+            <ac:chgData name="Yevgeny Menaker" userId="cf90ab60ec4b5844" providerId="LiveId" clId="{062F9CD9-FB25-403D-9A82-D3F541407AE9}" dt="2025-08-10T16:37:03.526" v="2511" actId="21"/>
+            <ac:spMkLst>
+              <pc:docMk/>
+              <pc:sldMasterMk cId="0" sldId="2147483651"/>
+              <pc:sldLayoutMk cId="0" sldId="2147483653"/>
+              <ac:spMk id="4" creationId="{00000000-0000-0000-0000-000000000000}"/>
+            </ac:spMkLst>
+          </pc:spChg>
+        </pc:sldLayoutChg>
+      </pc:sldMasterChg>
+      <pc:sldMasterChg chg="add del addSldLayout delSldLayout">
+        <pc:chgData name="Yevgeny Menaker" userId="cf90ab60ec4b5844" providerId="LiveId" clId="{062F9CD9-FB25-403D-9A82-D3F541407AE9}" dt="2025-08-10T16:45:19.091" v="2662" actId="700"/>
+        <pc:sldMasterMkLst>
+          <pc:docMk/>
+          <pc:sldMasterMk cId="0" sldId="2147483654"/>
+        </pc:sldMasterMkLst>
+        <pc:sldLayoutChg chg="add del">
+          <pc:chgData name="Yevgeny Menaker" userId="cf90ab60ec4b5844" providerId="LiveId" clId="{062F9CD9-FB25-403D-9A82-D3F541407AE9}" dt="2025-08-10T16:45:19.091" v="2662" actId="700"/>
+          <pc:sldLayoutMkLst>
+            <pc:docMk/>
+            <pc:sldMasterMk cId="0" sldId="2147483654"/>
+            <pc:sldLayoutMk cId="0" sldId="2147483655"/>
+          </pc:sldLayoutMkLst>
+        </pc:sldLayoutChg>
+      </pc:sldMasterChg>
+      <pc:sldMasterChg chg="add del addSldLayout delSldLayout">
+        <pc:chgData name="Yevgeny Menaker" userId="cf90ab60ec4b5844" providerId="LiveId" clId="{062F9CD9-FB25-403D-9A82-D3F541407AE9}" dt="2025-08-10T16:45:19.091" v="2662" actId="700"/>
+        <pc:sldMasterMkLst>
+          <pc:docMk/>
+          <pc:sldMasterMk cId="0" sldId="2147483656"/>
+        </pc:sldMasterMkLst>
+        <pc:sldLayoutChg chg="add del">
+          <pc:chgData name="Yevgeny Menaker" userId="cf90ab60ec4b5844" providerId="LiveId" clId="{062F9CD9-FB25-403D-9A82-D3F541407AE9}" dt="2025-08-10T16:45:19.091" v="2662" actId="700"/>
+          <pc:sldLayoutMkLst>
+            <pc:docMk/>
+            <pc:sldMasterMk cId="0" sldId="2147483656"/>
+            <pc:sldLayoutMk cId="0" sldId="2147483657"/>
+          </pc:sldLayoutMkLst>
+        </pc:sldLayoutChg>
+        <pc:sldLayoutChg chg="add del">
+          <pc:chgData name="Yevgeny Menaker" userId="cf90ab60ec4b5844" providerId="LiveId" clId="{062F9CD9-FB25-403D-9A82-D3F541407AE9}" dt="2025-08-10T16:45:19.091" v="2662" actId="700"/>
+          <pc:sldLayoutMkLst>
+            <pc:docMk/>
+            <pc:sldMasterMk cId="0" sldId="2147483656"/>
+            <pc:sldLayoutMk cId="0" sldId="2147483658"/>
+          </pc:sldLayoutMkLst>
+        </pc:sldLayoutChg>
+      </pc:sldMasterChg>
+      <pc:sldMasterChg chg="add del addSldLayout delSldLayout">
+        <pc:chgData name="Yevgeny Menaker" userId="cf90ab60ec4b5844" providerId="LiveId" clId="{062F9CD9-FB25-403D-9A82-D3F541407AE9}" dt="2025-08-10T16:45:19.091" v="2662" actId="700"/>
+        <pc:sldMasterMkLst>
+          <pc:docMk/>
+          <pc:sldMasterMk cId="0" sldId="2147483659"/>
+        </pc:sldMasterMkLst>
+        <pc:sldLayoutChg chg="add del">
+          <pc:chgData name="Yevgeny Menaker" userId="cf90ab60ec4b5844" providerId="LiveId" clId="{062F9CD9-FB25-403D-9A82-D3F541407AE9}" dt="2025-08-10T16:45:19.091" v="2662" actId="700"/>
+          <pc:sldLayoutMkLst>
+            <pc:docMk/>
+            <pc:sldMasterMk cId="0" sldId="2147483659"/>
+            <pc:sldLayoutMk cId="0" sldId="2147483660"/>
+          </pc:sldLayoutMkLst>
+        </pc:sldLayoutChg>
+        <pc:sldLayoutChg chg="add del">
+          <pc:chgData name="Yevgeny Menaker" userId="cf90ab60ec4b5844" providerId="LiveId" clId="{062F9CD9-FB25-403D-9A82-D3F541407AE9}" dt="2025-08-10T16:45:19.091" v="2662" actId="700"/>
+          <pc:sldLayoutMkLst>
+            <pc:docMk/>
+            <pc:sldMasterMk cId="0" sldId="2147483659"/>
+            <pc:sldLayoutMk cId="0" sldId="2147483661"/>
+          </pc:sldLayoutMkLst>
+        </pc:sldLayoutChg>
+      </pc:sldMasterChg>
+      <pc:sldMasterChg chg="add del addSldLayout delSldLayout">
+        <pc:chgData name="Yevgeny Menaker" userId="cf90ab60ec4b5844" providerId="LiveId" clId="{062F9CD9-FB25-403D-9A82-D3F541407AE9}" dt="2025-08-10T16:45:19.091" v="2662" actId="700"/>
+        <pc:sldMasterMkLst>
+          <pc:docMk/>
+          <pc:sldMasterMk cId="0" sldId="2147483662"/>
+        </pc:sldMasterMkLst>
+        <pc:sldLayoutChg chg="add del">
+          <pc:chgData name="Yevgeny Menaker" userId="cf90ab60ec4b5844" providerId="LiveId" clId="{062F9CD9-FB25-403D-9A82-D3F541407AE9}" dt="2025-08-10T16:45:19.091" v="2662" actId="700"/>
+          <pc:sldLayoutMkLst>
+            <pc:docMk/>
+            <pc:sldMasterMk cId="0" sldId="2147483662"/>
+            <pc:sldLayoutMk cId="0" sldId="2147483663"/>
+          </pc:sldLayoutMkLst>
+        </pc:sldLayoutChg>
+        <pc:sldLayoutChg chg="add del">
+          <pc:chgData name="Yevgeny Menaker" userId="cf90ab60ec4b5844" providerId="LiveId" clId="{062F9CD9-FB25-403D-9A82-D3F541407AE9}" dt="2025-08-10T16:45:19.091" v="2662" actId="700"/>
+          <pc:sldLayoutMkLst>
+            <pc:docMk/>
+            <pc:sldMasterMk cId="0" sldId="2147483662"/>
+            <pc:sldLayoutMk cId="0" sldId="2147483664"/>
+          </pc:sldLayoutMkLst>
+        </pc:sldLayoutChg>
+      </pc:sldMasterChg>
+      <pc:sldMasterChg chg="add del addSldLayout delSldLayout">
+        <pc:chgData name="Yevgeny Menaker" userId="cf90ab60ec4b5844" providerId="LiveId" clId="{062F9CD9-FB25-403D-9A82-D3F541407AE9}" dt="2025-08-10T16:45:19.091" v="2662" actId="700"/>
+        <pc:sldMasterMkLst>
+          <pc:docMk/>
+          <pc:sldMasterMk cId="0" sldId="2147483665"/>
+        </pc:sldMasterMkLst>
+        <pc:sldLayoutChg chg="add del">
+          <pc:chgData name="Yevgeny Menaker" userId="cf90ab60ec4b5844" providerId="LiveId" clId="{062F9CD9-FB25-403D-9A82-D3F541407AE9}" dt="2025-08-10T16:45:19.091" v="2662" actId="700"/>
+          <pc:sldLayoutMkLst>
+            <pc:docMk/>
+            <pc:sldMasterMk cId="0" sldId="2147483665"/>
+            <pc:sldLayoutMk cId="0" sldId="2147483666"/>
+          </pc:sldLayoutMkLst>
+        </pc:sldLayoutChg>
+        <pc:sldLayoutChg chg="add del">
+          <pc:chgData name="Yevgeny Menaker" userId="cf90ab60ec4b5844" providerId="LiveId" clId="{062F9CD9-FB25-403D-9A82-D3F541407AE9}" dt="2025-08-10T16:45:19.091" v="2662" actId="700"/>
+          <pc:sldLayoutMkLst>
+            <pc:docMk/>
+            <pc:sldMasterMk cId="0" sldId="2147483665"/>
+            <pc:sldLayoutMk cId="0" sldId="2147483667"/>
+          </pc:sldLayoutMkLst>
+        </pc:sldLayoutChg>
+      </pc:sldMasterChg>
+      <pc:sldMasterChg chg="add del addSldLayout delSldLayout">
+        <pc:chgData name="Yevgeny Menaker" userId="cf90ab60ec4b5844" providerId="LiveId" clId="{062F9CD9-FB25-403D-9A82-D3F541407AE9}" dt="2025-08-10T16:45:19.091" v="2662" actId="700"/>
+        <pc:sldMasterMkLst>
+          <pc:docMk/>
+          <pc:sldMasterMk cId="0" sldId="2147483668"/>
+        </pc:sldMasterMkLst>
+        <pc:sldLayoutChg chg="add del">
+          <pc:chgData name="Yevgeny Menaker" userId="cf90ab60ec4b5844" providerId="LiveId" clId="{062F9CD9-FB25-403D-9A82-D3F541407AE9}" dt="2025-08-10T16:45:19.091" v="2662" actId="700"/>
+          <pc:sldLayoutMkLst>
+            <pc:docMk/>
+            <pc:sldMasterMk cId="0" sldId="2147483668"/>
+            <pc:sldLayoutMk cId="0" sldId="2147483669"/>
+          </pc:sldLayoutMkLst>
+        </pc:sldLayoutChg>
+        <pc:sldLayoutChg chg="add del">
+          <pc:chgData name="Yevgeny Menaker" userId="cf90ab60ec4b5844" providerId="LiveId" clId="{062F9CD9-FB25-403D-9A82-D3F541407AE9}" dt="2025-08-10T16:45:19.091" v="2662" actId="700"/>
+          <pc:sldLayoutMkLst>
+            <pc:docMk/>
+            <pc:sldMasterMk cId="0" sldId="2147483668"/>
+            <pc:sldLayoutMk cId="0" sldId="2147483670"/>
+          </pc:sldLayoutMkLst>
+        </pc:sldLayoutChg>
+      </pc:sldMasterChg>
     </pc:docChg>
   </pc:docChgLst>
 </pc:chgInfo>
@@ -1651,7 +2220,7 @@
           <a:p>
             <a:fld id="{4301C794-9E5D-4977-BAB6-5782CAC0C8DD}" type="datetimeFigureOut">
               <a:rPr lang="en-IL" smtClean="0"/>
-              <a:t>08/08/2025</a:t>
+              <a:t>10/08/2025</a:t>
             </a:fld>
             <a:endParaRPr lang="en-IL"/>
           </a:p>
@@ -1967,25 +2536,53 @@
               <a:buNone/>
             </a:pPr>
             <a:r>
-              <a:rPr lang="en-US"/>
-              <a:t>Generated by Copilot</a:t>
+              <a:rPr lang="en-US" dirty="0"/>
+              <a:t>Hello,</a:t>
             </a:r>
-            <a:br>
-              <a:rPr lang="en-US"/>
-            </a:br>
-            <a:br>
-              <a:rPr lang="en-US"/>
-            </a:br>
+          </a:p>
+          <a:p>
+            <a:pPr>
+              <a:buNone/>
+            </a:pPr>
             <a:r>
-              <a:rPr lang="en-US"/>
-              <a:t>This slide introduces the presentation on "Random Walks and Monte Carlo" as part of the WISER Quantum Projects 2025. The team Quantotto, led by Yevgeny Menaker, is responsible for this work. The minimalist design sets a professional tone, emphasizing the focus on quantum computing techniques applied to stochastic processes like random walks and Monte Carlo simulations, which are foundational in probabilistic modeling and quantum algorithm development. </a:t>
+              <a:rPr lang="en-US" dirty="0"/>
+              <a:t>I’m Yevgeny Menaker from team Quantotto and I'm presenting </a:t>
             </a:r>
-            <a:br>
-              <a:rPr lang="en-US"/>
-            </a:br>
+          </a:p>
+          <a:p>
+            <a:pPr>
+              <a:buNone/>
+            </a:pPr>
             <a:r>
-              <a:rPr lang="en-US"/>
-              <a:t>______</a:t>
+              <a:rPr lang="en-US" dirty="0"/>
+              <a:t>the quantum walks and Monte Carlo project as  part of WISER </a:t>
+            </a:r>
+          </a:p>
+          <a:p>
+            <a:pPr>
+              <a:buNone/>
+            </a:pPr>
+            <a:r>
+              <a:rPr lang="en-US" dirty="0"/>
+              <a:t>Quantum Program 2025. The </a:t>
+            </a:r>
+          </a:p>
+          <a:p>
+            <a:pPr>
+              <a:buNone/>
+            </a:pPr>
+            <a:r>
+              <a:rPr lang="en-US" dirty="0"/>
+              <a:t>project is focusing on applying quantum computing  techniques to statistic processes which are </a:t>
+            </a:r>
+          </a:p>
+          <a:p>
+            <a:pPr>
+              <a:buNone/>
+            </a:pPr>
+            <a:r>
+              <a:rPr lang="en-US" dirty="0"/>
+              <a:t>foundational in quantum algorithm development.</a:t>
             </a:r>
           </a:p>
           <a:p>
@@ -1993,9 +2590,9 @@
               <a:buNone/>
             </a:pPr>
             <a:br>
-              <a:rPr lang="en-US"/>
+              <a:rPr lang="en-US" dirty="0"/>
             </a:br>
-            <a:endParaRPr lang="en-IL"/>
+            <a:endParaRPr lang="en-IL" dirty="0"/>
           </a:p>
         </p:txBody>
       </p:sp>
@@ -2083,24 +2680,23 @@
               <a:buNone/>
             </a:pPr>
             <a:r>
-              <a:rPr lang="en-US"/>
-              <a:t>Generated by Copilot</a:t>
+              <a:rPr lang="en-US" dirty="0"/>
+              <a:t>The circuit was also executed on the real back end IBM Torino and showed very promising results where we can observer the resemblance of the </a:t>
+            </a:r>
+          </a:p>
+          <a:p>
+            <a:pPr>
+              <a:buNone/>
+            </a:pPr>
+            <a:r>
+              <a:rPr lang="en-US" dirty="0"/>
+              <a:t>distributions that we were required to model (Gaussian, Exponential and Hadamard) with 8 levels of Galton board.</a:t>
             </a:r>
             <a:br>
-              <a:rPr lang="en-US"/>
-            </a:br>
-            <a:br>
-              <a:rPr lang="en-US"/>
+              <a:rPr lang="en-US" dirty="0"/>
             </a:br>
             <a:r>
-              <a:rPr lang="en-US"/>
-              <a:t>This slide reports on executing the quantum circuits on a real IBM Torino backend. Although the distributions deviate significantly from ideal references due to noise, the overall shapes remain recognizable, indicating meaningful quantum behavior. Attempts to reduce noise using the M3 package had limited effect, but the backend's performance is still impressive given current hardware limitations. This real-world validation highlights the progress and challenges in running complex quantum algorithms on existing quantum processors. </a:t>
-            </a:r>
-            <a:br>
-              <a:rPr lang="en-US"/>
-            </a:br>
-            <a:r>
-              <a:rPr lang="en-US"/>
+              <a:rPr lang="en-US" dirty="0"/>
               <a:t>______</a:t>
             </a:r>
           </a:p>
@@ -2109,9 +2705,9 @@
               <a:buNone/>
             </a:pPr>
             <a:br>
-              <a:rPr lang="en-US"/>
+              <a:rPr lang="en-US" dirty="0"/>
             </a:br>
-            <a:endParaRPr lang="en-IL"/>
+            <a:endParaRPr lang="en-IL" dirty="0"/>
           </a:p>
         </p:txBody>
       </p:sp>
@@ -2200,24 +2796,15 @@
             </a:pPr>
             <a:r>
               <a:rPr lang="en-US" dirty="0"/>
-              <a:t>Generated by Copilot</a:t>
+              <a:t>We studied the </a:t>
             </a:r>
-            <a:br>
-              <a:rPr lang="en-US" dirty="0"/>
-            </a:br>
-            <a:br>
-              <a:rPr lang="en-US" dirty="0"/>
-            </a:br>
+            <a:r>
+              <a:rPr lang="en-US" dirty="0" err="1"/>
+              <a:t>transpiled</a:t>
+            </a:r>
             <a:r>
               <a:rPr lang="en-US" dirty="0"/>
-              <a:t>The circuit depth study compares optimized and non-optimized quantum circuits. Optimized circuits maintain a constant depth-to-levels ratio, resulting in a linear increase in depth as levels grow. In contrast, non-optimized circuits exhibit a linearly increasing ratio, leading to quadratic growth in depth. These findings emphasize the importance of circuit optimization to manage resource demands and improve scalability, which is critical for practical quantum computing applications involving complex distributions. </a:t>
-            </a:r>
-            <a:br>
-              <a:rPr lang="en-US" dirty="0"/>
-            </a:br>
-            <a:r>
-              <a:rPr lang="en-US" dirty="0"/>
-              <a:t>______</a:t>
+              <a:t> depth of the circuit for optimized and non-optimized construction and as expected discovered the linear dependency on levels in the optimized case and quadratic otherwise.</a:t>
             </a:r>
           </a:p>
           <a:p>
@@ -2315,25 +2902,48 @@
               <a:buNone/>
             </a:pPr>
             <a:r>
-              <a:rPr lang="en-US"/>
-              <a:t>Generated by Copilot</a:t>
+              <a:rPr lang="en-US" dirty="0"/>
+              <a:t>In conclusion, the project successfully demonstrated a universal distribution simulator. We are proud to reduce the qubit count from 2n+2 to n+3, and circuit depth from quadratic to linear scaling,</a:t>
+            </a:r>
+          </a:p>
+          <a:p>
+            <a:pPr>
+              <a:buNone/>
+            </a:pPr>
+            <a:r>
+              <a:rPr lang="en-US" dirty="0"/>
+              <a:t>Which helped enhancing accuracy, resource efficiency and noise resilience.</a:t>
+            </a:r>
+          </a:p>
+          <a:p>
+            <a:pPr>
+              <a:buNone/>
+            </a:pPr>
+            <a:r>
+              <a:rPr lang="en-US" dirty="0"/>
+              <a:t>Execution on real devices yielded promising results, which supports our optimistic outlook for practical quantum distribution simulations</a:t>
+            </a:r>
+          </a:p>
+          <a:p>
+            <a:pPr>
+              <a:buNone/>
+            </a:pPr>
+            <a:r>
+              <a:rPr lang="en-US" dirty="0"/>
+              <a:t>in the near future. </a:t>
             </a:r>
             <a:br>
-              <a:rPr lang="en-US"/>
+              <a:rPr lang="en-US" dirty="0"/>
             </a:br>
-            <a:br>
-              <a:rPr lang="en-US"/>
-            </a:br>
+            <a:endParaRPr lang="en-US" dirty="0"/>
+          </a:p>
+          <a:p>
+            <a:pPr>
+              <a:buNone/>
+            </a:pPr>
             <a:r>
-              <a:rPr lang="en-US"/>
-              <a:t>In conclusion, the project successfully demonstrated a universal distribution simulator using a superposition of Hamming Weight 1 states. The qubit count was reduced from 2n+2 to n+3, and circuit depth improved from quadratic to linear scaling, enhancing both resource efficiency and noise resilience. The mean squared error remained low across most levels, indicating high accuracy. Execution on real NISQ devices yielded promising results, supporting an optimistic outlook for practical quantum distribution simulations in the near future. </a:t>
-            </a:r>
-            <a:br>
-              <a:rPr lang="en-US"/>
-            </a:br>
-            <a:r>
-              <a:rPr lang="en-US"/>
-              <a:t>______</a:t>
+              <a:rPr lang="en-US" dirty="0"/>
+              <a:t>Thank you very much!</a:t>
             </a:r>
           </a:p>
           <a:p>
@@ -2341,9 +2951,9 @@
               <a:buNone/>
             </a:pPr>
             <a:br>
-              <a:rPr lang="en-US"/>
+              <a:rPr lang="en-US" dirty="0"/>
             </a:br>
-            <a:endParaRPr lang="en-IL"/>
+            <a:endParaRPr lang="en-IL" dirty="0"/>
           </a:p>
         </p:txBody>
       </p:sp>
@@ -2663,24 +3273,74 @@
               <a:buNone/>
             </a:pPr>
             <a:r>
-              <a:rPr lang="en-US"/>
-              <a:t>Generated by Copilot</a:t>
+              <a:rPr lang="en-US" dirty="0"/>
+              <a:t>The work is based on the scientific paper universal statistical simulator where Galton board is taken as the </a:t>
+            </a:r>
+          </a:p>
+          <a:p>
+            <a:pPr>
+              <a:buNone/>
+            </a:pPr>
+            <a:r>
+              <a:rPr lang="en-US" dirty="0"/>
+              <a:t>model and implemented on quantum computer. We can basically view the golden board as a decision </a:t>
+            </a:r>
+          </a:p>
+          <a:p>
+            <a:pPr>
+              <a:buNone/>
+            </a:pPr>
+            <a:r>
+              <a:rPr lang="en-US" dirty="0"/>
+              <a:t>tree more precisely decision direct specific graph  where each node is assigned with probability to go </a:t>
+            </a:r>
+          </a:p>
+          <a:p>
+            <a:pPr>
+              <a:buNone/>
+            </a:pPr>
+            <a:r>
+              <a:rPr lang="en-US" dirty="0"/>
+              <a:t>left and right and this behavior can be modeled on quantum computer. By measuring the tally qubits</a:t>
+            </a:r>
+          </a:p>
+          <a:p>
+            <a:pPr>
+              <a:buNone/>
+            </a:pPr>
+            <a:r>
+              <a:rPr lang="en-US" dirty="0"/>
+              <a:t>We can obtain various distributions.</a:t>
+            </a:r>
+          </a:p>
+          <a:p>
+            <a:pPr>
+              <a:buNone/>
+            </a:pPr>
+            <a:endParaRPr lang="en-US" dirty="0"/>
+          </a:p>
+          <a:p>
+            <a:pPr>
+              <a:buNone/>
+            </a:pPr>
+            <a:r>
+              <a:rPr lang="en-US" dirty="0"/>
+              <a:t>if you set probability p to be equal 1/2 on each node we will obtain the classic Gaussian. With creative</a:t>
+            </a:r>
+          </a:p>
+          <a:p>
+            <a:pPr>
+              <a:buNone/>
+            </a:pPr>
+            <a:r>
+              <a:rPr lang="en-US" dirty="0"/>
+              <a:t>modifications of quantum pegs and probabilities we can control the output distribution.</a:t>
             </a:r>
             <a:br>
-              <a:rPr lang="en-US"/>
-            </a:br>
-            <a:br>
-              <a:rPr lang="en-US"/>
+              <a:rPr lang="en-US" dirty="0"/>
             </a:br>
             <a:r>
-              <a:rPr lang="en-US"/>
-              <a:t>This slide explains the Galton Board as a decision Directed Acyclic Graph (DAG). When the probability p equals 1/2, the tally bins produce a symmetric normal distribution, reflecting the classic binomial outcome. Adjusting the probability p skews the distribution left or right, allowing us to model asymmetric outcomes. The visual diagram helps illustrate how each decision node in the DAG corresponds to a quantum operation, linking classical probability concepts with quantum circuit design. </a:t>
-            </a:r>
-            <a:br>
-              <a:rPr lang="en-US"/>
-            </a:br>
-            <a:r>
-              <a:rPr lang="en-US"/>
+              <a:rPr lang="en-US" dirty="0"/>
               <a:t>______</a:t>
             </a:r>
           </a:p>
@@ -2689,9 +3349,9 @@
               <a:buNone/>
             </a:pPr>
             <a:br>
-              <a:rPr lang="en-US"/>
+              <a:rPr lang="en-US" dirty="0"/>
             </a:br>
-            <a:endParaRPr lang="en-IL"/>
+            <a:endParaRPr lang="en-IL" dirty="0"/>
           </a:p>
         </p:txBody>
       </p:sp>
@@ -2779,24 +3439,41 @@
               <a:buNone/>
             </a:pPr>
             <a:r>
-              <a:rPr lang="en-US"/>
-              <a:t>Generated by Copilot</a:t>
+              <a:rPr lang="en-US" dirty="0"/>
+              <a:t>The implementation as described in the scientific paper does lead to the classic Gaussian distribution as shown </a:t>
+            </a:r>
+          </a:p>
+          <a:p>
+            <a:pPr>
+              <a:buNone/>
+            </a:pPr>
+            <a:r>
+              <a:rPr lang="en-US" dirty="0"/>
+              <a:t>on this picture where we executed the circuit on the noiseless simulator with 12 levels of the </a:t>
+            </a:r>
+          </a:p>
+          <a:p>
+            <a:pPr>
+              <a:buNone/>
+            </a:pPr>
+            <a:r>
+              <a:rPr lang="en-US" dirty="0"/>
+              <a:t>Galton board. Generally the n level Galton board will require 2 n + 2 cubits and the depths of the </a:t>
+            </a:r>
+          </a:p>
+          <a:p>
+            <a:pPr>
+              <a:buNone/>
+            </a:pPr>
+            <a:r>
+              <a:rPr lang="en-US" dirty="0"/>
+              <a:t>circuit will be 2 * n square + n or big O of n^2.</a:t>
             </a:r>
             <a:br>
-              <a:rPr lang="en-US"/>
-            </a:br>
-            <a:br>
-              <a:rPr lang="en-US"/>
+              <a:rPr lang="en-US" dirty="0"/>
             </a:br>
             <a:r>
-              <a:rPr lang="en-US"/>
-              <a:t>We delve into the quantum circuit implementation of an n-level Galton Board. The number of qubits required scales as 2n plus 2, and the circuit depth grows quadratically with n, specifically as 2(n² + n). The diagram for n=3 visually represents the circuit structure and particle distribution. The histogram on the right confirms that the quantum Galton Board closely replicates the expected normal distribution for 12 levels, demonstrating the circuit's effectiveness in simulating classical probabilistic behavior within a quantum framework. </a:t>
-            </a:r>
-            <a:br>
-              <a:rPr lang="en-US"/>
-            </a:br>
-            <a:r>
-              <a:rPr lang="en-US"/>
+              <a:rPr lang="en-US" dirty="0"/>
               <a:t>______</a:t>
             </a:r>
           </a:p>
@@ -2805,9 +3482,9 @@
               <a:buNone/>
             </a:pPr>
             <a:br>
-              <a:rPr lang="en-US"/>
+              <a:rPr lang="en-US" dirty="0"/>
             </a:br>
-            <a:endParaRPr lang="en-IL"/>
+            <a:endParaRPr lang="en-IL" dirty="0"/>
           </a:p>
         </p:txBody>
       </p:sp>
@@ -2895,35 +3572,44 @@
               <a:buNone/>
             </a:pPr>
             <a:r>
-              <a:rPr lang="en-US"/>
-              <a:t>Generated by Copilot</a:t>
-            </a:r>
-            <a:br>
-              <a:rPr lang="en-US"/>
-            </a:br>
-            <a:br>
-              <a:rPr lang="en-US"/>
-            </a:br>
-            <a:r>
-              <a:rPr lang="en-US"/>
-              <a:t>To achieve an exponential distribution, we adjust the probabilities at each level by biasing the quantum coin. This is done by applying controlled RY rotations to the coin qubit, effectively rotating it by a specific angle to favor one outcome. The figure illustrates assigning probabilities only to the rightmost quantum peg, which simplifies the control mechanism. This approach allows us to tailor the quantum walk to produce non-symmetric distributions, expanding the versatility of the quantum Galton Board beyond the symmetric Gaussian case. </a:t>
-            </a:r>
-            <a:br>
-              <a:rPr lang="en-US"/>
-            </a:br>
-            <a:r>
-              <a:rPr lang="en-US"/>
-              <a:t>______</a:t>
+              <a:rPr lang="en-US" dirty="0"/>
+              <a:t>Exponential distribution can be obtained by modifying the quantum pegs. As we can see </a:t>
             </a:r>
           </a:p>
           <a:p>
             <a:pPr>
               <a:buNone/>
             </a:pPr>
+            <a:r>
+              <a:rPr lang="en-US" dirty="0"/>
+              <a:t>the pegs on the right have a probability of 1/e and on the left 1-1/e.</a:t>
+            </a:r>
             <a:br>
-              <a:rPr lang="en-US"/>
+              <a:rPr lang="en-US" dirty="0"/>
             </a:br>
-            <a:endParaRPr lang="en-IL"/>
+            <a:endParaRPr lang="en-US" dirty="0"/>
+          </a:p>
+          <a:p>
+            <a:pPr>
+              <a:buNone/>
+            </a:pPr>
+            <a:r>
+              <a:rPr lang="en-US" dirty="0"/>
+              <a:t>We can achieve that by applying a certain rotation to </a:t>
+            </a:r>
+          </a:p>
+          <a:p>
+            <a:pPr>
+              <a:buNone/>
+            </a:pPr>
+            <a:r>
+              <a:rPr lang="en-US" dirty="0"/>
+              <a:t>the coin cubit that controls the SWAP gates within the circuit.  </a:t>
+            </a:r>
+            <a:br>
+              <a:rPr lang="en-US" dirty="0"/>
+            </a:br>
+            <a:endParaRPr lang="en-IL" dirty="0"/>
           </a:p>
         </p:txBody>
       </p:sp>
@@ -3011,35 +3697,49 @@
               <a:buNone/>
             </a:pPr>
             <a:r>
-              <a:rPr lang="en-US"/>
-              <a:t>Generated by Copilot</a:t>
-            </a:r>
-            <a:br>
-              <a:rPr lang="en-US"/>
-            </a:br>
-            <a:br>
-              <a:rPr lang="en-US"/>
-            </a:br>
-            <a:r>
-              <a:rPr lang="en-US"/>
-              <a:t>This slide covers the Hadamard Random Walk, which produces a bi-modal distribution through quantum superposition and interference. Key to this process is maintaining the walk in superposition by alternating control values for each CSWAP gate, simulating steps without collapsing the quantum state. Importantly, the coin state is not reset between steps to preserve interference effects. A final swap operation ensures the resulting distribution is symmetric. The diagram and graph illustrate how these quantum operations lead to the characteristic bi-modal distribution, highlighting the unique quantum behavior compared to classical random walks. </a:t>
-            </a:r>
-            <a:br>
-              <a:rPr lang="en-US"/>
-            </a:br>
-            <a:r>
-              <a:rPr lang="en-US"/>
-              <a:t>______</a:t>
+              <a:rPr lang="en-US" dirty="0"/>
+              <a:t>Hadamard random walk or bi modal distribution is slightly more involved. It requires stepping in super-position and as </a:t>
             </a:r>
           </a:p>
           <a:p>
             <a:pPr>
               <a:buNone/>
             </a:pPr>
+            <a:r>
+              <a:rPr lang="en-US" dirty="0"/>
+              <a:t>you can see in the circuit we do not make any coin qubit resets between the levels. However, to achieve the </a:t>
+            </a:r>
+          </a:p>
+          <a:p>
+            <a:pPr>
+              <a:buNone/>
+            </a:pPr>
+            <a:r>
+              <a:rPr lang="en-US" dirty="0"/>
+              <a:t>symmetric view of the distribution, we do need to perform a final swap between the symmetric </a:t>
+            </a:r>
+          </a:p>
+          <a:p>
+            <a:pPr>
+              <a:buNone/>
+            </a:pPr>
+            <a:r>
+              <a:rPr lang="en-US" dirty="0"/>
+              <a:t>qubits to achieve that nice bimodal look. Otherwise, the distribution will be biased to the </a:t>
+            </a:r>
+          </a:p>
+          <a:p>
+            <a:pPr>
+              <a:buNone/>
+            </a:pPr>
+            <a:r>
+              <a:rPr lang="en-US" dirty="0"/>
+              <a:t>left or to the right.</a:t>
+            </a:r>
             <a:br>
-              <a:rPr lang="en-US"/>
+              <a:rPr lang="en-US" dirty="0"/>
             </a:br>
-            <a:endParaRPr lang="en-IL"/>
+            <a:endParaRPr lang="en-IL" dirty="0"/>
           </a:p>
         </p:txBody>
       </p:sp>
@@ -3243,35 +3943,97 @@
               <a:buNone/>
             </a:pPr>
             <a:r>
-              <a:rPr lang="en-US"/>
-              <a:t>Generated by Copilot</a:t>
-            </a:r>
-            <a:br>
-              <a:rPr lang="en-US"/>
-            </a:br>
-            <a:br>
-              <a:rPr lang="en-US"/>
-            </a:br>
-            <a:r>
-              <a:rPr lang="en-US"/>
-              <a:t>This slide presents the construction of an optimal decision tree for any arbitrary distribution given a vector of probabilities. The quantum circuit is designed to ensure that the quantum ball reaches each tally bin with the exact desired probability. The circuit's structure resembles a one-sided decision tree, with rotation angles at each level calculated to match the target distribution. Notably, this approach reduces the qubit count to n plus 3 and achieves a circuit depth linear in n, significantly improving resource efficiency compared to previous designs. </a:t>
-            </a:r>
-            <a:br>
-              <a:rPr lang="en-US"/>
-            </a:br>
-            <a:r>
-              <a:rPr lang="en-US"/>
-              <a:t>______</a:t>
+              <a:rPr lang="en-US" dirty="0"/>
+              <a:t>In order to run the quantum circuit in the noisy environments, optimization </a:t>
             </a:r>
           </a:p>
           <a:p>
             <a:pPr>
               <a:buNone/>
             </a:pPr>
+            <a:r>
+              <a:rPr lang="en-US" dirty="0"/>
+              <a:t>of the circuit construction is required. The solution we offer applies to any distribution.</a:t>
+            </a:r>
+          </a:p>
+          <a:p>
+            <a:pPr>
+              <a:buNone/>
+            </a:pPr>
+            <a:r>
+              <a:rPr lang="en-US" dirty="0"/>
+              <a:t>Given a vector on n+1 probabilities, we can load it using Galton board inspired approach.</a:t>
+            </a:r>
+          </a:p>
+          <a:p>
+            <a:pPr>
+              <a:buNone/>
+            </a:pPr>
+            <a:endParaRPr lang="en-US" dirty="0"/>
+          </a:p>
+          <a:p>
+            <a:pPr>
+              <a:buNone/>
+            </a:pPr>
+            <a:r>
+              <a:rPr lang="en-US" dirty="0"/>
+              <a:t>as you can see on the figure</a:t>
+            </a:r>
+          </a:p>
+          <a:p>
+            <a:pPr>
+              <a:buNone/>
+            </a:pPr>
+            <a:r>
+              <a:rPr lang="en-US" dirty="0"/>
+              <a:t>we got rid of most of the pegs. keeping only the side ones.</a:t>
+            </a:r>
+          </a:p>
+          <a:p>
+            <a:pPr>
+              <a:buNone/>
+            </a:pPr>
+            <a:endParaRPr lang="en-US" dirty="0"/>
+          </a:p>
+          <a:p>
+            <a:pPr>
+              <a:buNone/>
+            </a:pPr>
+            <a:r>
+              <a:rPr lang="en-US" dirty="0"/>
+              <a:t>knowing the probability vector, we are about to load, we can carefully</a:t>
+            </a:r>
+          </a:p>
+          <a:p>
+            <a:pPr>
+              <a:buNone/>
+            </a:pPr>
+            <a:r>
+              <a:rPr lang="en-US" dirty="0"/>
+              <a:t>calculate the rotation angles on each level and assure that the quantum ball reaches each </a:t>
+            </a:r>
+          </a:p>
+          <a:p>
+            <a:pPr>
+              <a:buNone/>
+            </a:pPr>
+            <a:r>
+              <a:rPr lang="en-US" dirty="0"/>
+              <a:t>tally bin with the required probability.</a:t>
+            </a:r>
+          </a:p>
+          <a:p>
+            <a:pPr>
+              <a:buNone/>
+            </a:pPr>
+            <a:r>
+              <a:rPr lang="en-US" dirty="0"/>
+              <a:t>this reduces the number of qubits required from 2n + 2  to n + 3 and the depth is on 4n or Big O of (n).</a:t>
+            </a:r>
             <a:br>
-              <a:rPr lang="en-US"/>
+              <a:rPr lang="en-US" dirty="0"/>
             </a:br>
-            <a:endParaRPr lang="en-IL"/>
+            <a:endParaRPr lang="en-IL" dirty="0"/>
           </a:p>
         </p:txBody>
       </p:sp>
@@ -3359,24 +4121,14 @@
               <a:buNone/>
             </a:pPr>
             <a:r>
-              <a:rPr lang="en-US"/>
-              <a:t>Generated by Copilot</a:t>
+              <a:rPr lang="en-US" dirty="0"/>
+              <a:t>This approach has led to much more accurate simulation in the noisy environment and much faster execution of those simulations.</a:t>
             </a:r>
             <a:br>
-              <a:rPr lang="en-US"/>
-            </a:br>
-            <a:br>
-              <a:rPr lang="en-US"/>
+              <a:rPr lang="en-US" dirty="0"/>
             </a:br>
             <a:r>
-              <a:rPr lang="en-US"/>
-              <a:t>Noisy simulations demonstrate the robustness of the optimized Galton Board circuits. The exponential distribution, in particular, shows the greatest accuracy improvement after optimization. By reducing qubit requirements and circuit depth, the circuits maintain results close to reference values despite noise. The histograms and line graph illustrate that the visual similarity of distributions is preserved up to 14 levels, confirming that the optimizations enhance noise resilience and make these quantum simulations more practical on current noisy intermediate-scale quantum (NISQ) devices. </a:t>
-            </a:r>
-            <a:br>
-              <a:rPr lang="en-US"/>
-            </a:br>
-            <a:r>
-              <a:rPr lang="en-US"/>
+              <a:rPr lang="en-US" dirty="0"/>
               <a:t>______</a:t>
             </a:r>
           </a:p>
@@ -3385,9 +4137,9 @@
               <a:buNone/>
             </a:pPr>
             <a:br>
-              <a:rPr lang="en-US"/>
+              <a:rPr lang="en-US" dirty="0"/>
             </a:br>
-            <a:endParaRPr lang="en-IL"/>
+            <a:endParaRPr lang="en-IL" dirty="0"/>
           </a:p>
         </p:txBody>
       </p:sp>
@@ -3545,8 +4297,10 @@
           <a:lstStyle/>
           <a:p>
             <a:r>
-              <a:t>Footer</a:t>
+              <a:rPr lang="en-US"/>
+              <a:t>WISER Quantum Project</a:t>
             </a:r>
+            <a:endParaRPr/>
           </a:p>
         </p:txBody>
       </p:sp>
@@ -3717,8 +4471,10 @@
           <a:lstStyle/>
           <a:p>
             <a:r>
-              <a:t>Footer</a:t>
+              <a:rPr lang="en-US"/>
+              <a:t>WISER Quantum Project</a:t>
             </a:r>
+            <a:endParaRPr/>
           </a:p>
         </p:txBody>
       </p:sp>
@@ -3804,8 +4560,10 @@
           <a:lstStyle/>
           <a:p>
             <a:r>
-              <a:t>Footer</a:t>
+              <a:rPr lang="en-US"/>
+              <a:t>WISER Quantum Project</a:t>
             </a:r>
+            <a:endParaRPr/>
           </a:p>
         </p:txBody>
       </p:sp>
@@ -3976,8 +4734,10 @@
           <a:lstStyle/>
           <a:p>
             <a:r>
-              <a:t>Footer</a:t>
+              <a:rPr lang="en-US"/>
+              <a:t>WISER Quantum Project</a:t>
             </a:r>
+            <a:endParaRPr/>
           </a:p>
         </p:txBody>
       </p:sp>
@@ -4063,8 +4823,10 @@
           <a:lstStyle/>
           <a:p>
             <a:r>
-              <a:t>Footer</a:t>
+              <a:rPr lang="en-US"/>
+              <a:t>WISER Quantum Project</a:t>
             </a:r>
+            <a:endParaRPr/>
           </a:p>
         </p:txBody>
       </p:sp>
@@ -4235,8 +4997,10 @@
           <a:lstStyle/>
           <a:p>
             <a:r>
-              <a:t>Footer</a:t>
+              <a:rPr lang="en-US"/>
+              <a:t>WISER Quantum Project</a:t>
             </a:r>
+            <a:endParaRPr/>
           </a:p>
         </p:txBody>
       </p:sp>
@@ -4363,8 +5127,10 @@
           <a:lstStyle/>
           <a:p>
             <a:r>
-              <a:t>Footer</a:t>
+              <a:rPr lang="en-US"/>
+              <a:t>WISER Quantum Project</a:t>
             </a:r>
+            <a:endParaRPr/>
           </a:p>
         </p:txBody>
       </p:sp>
@@ -4532,8 +5298,10 @@
           <a:lstStyle/>
           <a:p>
             <a:r>
-              <a:t>Footer</a:t>
+              <a:rPr lang="en-US"/>
+              <a:t>WISER Quantum Project</a:t>
             </a:r>
+            <a:endParaRPr/>
           </a:p>
         </p:txBody>
       </p:sp>
@@ -4704,8 +5472,10 @@
           <a:lstStyle/>
           <a:p>
             <a:r>
-              <a:t>Footer</a:t>
+              <a:rPr lang="en-US"/>
+              <a:t>WISER Quantum Project</a:t>
             </a:r>
+            <a:endParaRPr/>
           </a:p>
         </p:txBody>
       </p:sp>
@@ -4870,11 +5640,19 @@
         <p:spPr/>
         <p:txBody>
           <a:bodyPr/>
-          <a:lstStyle/>
+          <a:lstStyle>
+            <a:lvl1pPr>
+              <a:defRPr lang="en-US" b="0" i="0" smtClean="0">
+                <a:effectLst/>
+              </a:defRPr>
+            </a:lvl1pPr>
+          </a:lstStyle>
           <a:p>
             <a:r>
-              <a:t>Footer</a:t>
+              <a:rPr lang="en-US"/>
+              <a:t>WISER Quantum Project</a:t>
             </a:r>
+            <a:endParaRPr lang="en-US" dirty="0"/>
           </a:p>
         </p:txBody>
       </p:sp>
@@ -5045,8 +5823,10 @@
           <a:lstStyle/>
           <a:p>
             <a:r>
-              <a:t>Footer</a:t>
+              <a:rPr lang="en-US"/>
+              <a:t>WISER Quantum Project</a:t>
             </a:r>
+            <a:endParaRPr/>
           </a:p>
         </p:txBody>
       </p:sp>
@@ -5217,8 +5997,10 @@
           <a:lstStyle/>
           <a:p>
             <a:r>
-              <a:t>Footer</a:t>
+              <a:rPr lang="en-US"/>
+              <a:t>WISER Quantum Project</a:t>
             </a:r>
+            <a:endParaRPr/>
           </a:p>
         </p:txBody>
       </p:sp>
@@ -5304,8 +6086,10 @@
           <a:lstStyle/>
           <a:p>
             <a:r>
-              <a:t>Footer</a:t>
+              <a:rPr lang="en-US"/>
+              <a:t>WISER Quantum Project</a:t>
             </a:r>
+            <a:endParaRPr/>
           </a:p>
         </p:txBody>
       </p:sp>
@@ -5476,8 +6260,10 @@
           <a:lstStyle/>
           <a:p>
             <a:r>
-              <a:t>Footer</a:t>
+              <a:rPr lang="en-US"/>
+              <a:t>WISER Quantum Project</a:t>
             </a:r>
+            <a:endParaRPr/>
           </a:p>
         </p:txBody>
       </p:sp>
@@ -5563,8 +6349,10 @@
           <a:lstStyle/>
           <a:p>
             <a:r>
-              <a:t>Footer</a:t>
+              <a:rPr lang="en-US"/>
+              <a:t>WISER Quantum Project</a:t>
             </a:r>
+            <a:endParaRPr/>
           </a:p>
         </p:txBody>
       </p:sp>
@@ -6844,15 +7632,12 @@
             <a:pPr indent="0">
               <a:buNone/>
             </a:pPr>
-            <a:r>
-              <a:rPr lang="en-US" sz="1400" b="0" strike="noStrike" spc="-1">
-                <a:solidFill>
-                  <a:srgbClr val="000000"/>
-                </a:solidFill>
-                <a:latin typeface="Noto Sans"/>
-              </a:rPr>
-              <a:t>&lt;date/time&gt;</a:t>
-            </a:r>
+            <a:endParaRPr lang="en-US" sz="1400" b="0" strike="noStrike" spc="-1">
+              <a:solidFill>
+                <a:srgbClr val="000000"/>
+              </a:solidFill>
+              <a:latin typeface="Noto Sans"/>
+            </a:endParaRPr>
           </a:p>
         </p:txBody>
       </p:sp>
@@ -6895,17 +7680,9 @@
             </a:lvl1pPr>
           </a:lstStyle>
           <a:p>
-            <a:pPr indent="0" algn="ctr">
-              <a:buNone/>
-            </a:pPr>
             <a:r>
-              <a:rPr lang="en-US" sz="1400" b="0" strike="noStrike" spc="-1">
-                <a:solidFill>
-                  <a:srgbClr val="000000"/>
-                </a:solidFill>
-                <a:latin typeface="Noto Sans"/>
-              </a:rPr>
-              <a:t>&lt;footer&gt;</a:t>
+              <a:rPr lang="en-US" dirty="0"/>
+              <a:t>WISER Quantum Project</a:t>
             </a:r>
           </a:p>
         </p:txBody>
@@ -6977,6 +7754,7 @@
     <p:sldLayoutId id="2147483649" r:id="rId1"/>
     <p:sldLayoutId id="2147483650" r:id="rId2"/>
   </p:sldLayoutIdLst>
+  <p:hf sldNum="0" hdr="0" dt="0"/>
   <p:txStyles>
     <p:titleStyle>
       <a:lvl1pPr algn="l" defTabSz="914400" rtl="0" eaLnBrk="1" latinLnBrk="0" hangingPunct="1">
@@ -7702,15 +8480,12 @@
             <a:pPr indent="0">
               <a:buNone/>
             </a:pPr>
-            <a:r>
-              <a:rPr lang="en-US" sz="1400" b="0" strike="noStrike" spc="-1">
-                <a:solidFill>
-                  <a:srgbClr val="000000"/>
-                </a:solidFill>
-                <a:latin typeface="Noto Sans"/>
-              </a:rPr>
-              <a:t>&lt;date/time&gt;</a:t>
-            </a:r>
+            <a:endParaRPr lang="en-US" sz="1400" b="0" strike="noStrike" spc="-1">
+              <a:solidFill>
+                <a:srgbClr val="000000"/>
+              </a:solidFill>
+              <a:latin typeface="Noto Sans"/>
+            </a:endParaRPr>
           </a:p>
         </p:txBody>
       </p:sp>
@@ -7763,7 +8538,7 @@
                 </a:solidFill>
                 <a:latin typeface="Noto Sans"/>
               </a:rPr>
-              <a:t>&lt;footer&gt;</a:t>
+              <a:t>WISER Quantum Project</a:t>
             </a:r>
           </a:p>
         </p:txBody>
@@ -7835,6 +8610,7 @@
     <p:sldLayoutId id="2147483652" r:id="rId1"/>
     <p:sldLayoutId id="2147483653" r:id="rId2"/>
   </p:sldLayoutIdLst>
+  <p:hf sldNum="0" hdr="0" dt="0"/>
   <p:txStyles>
     <p:titleStyle>
       <a:lvl1pPr algn="l" defTabSz="914400" rtl="0" eaLnBrk="1" latinLnBrk="0" hangingPunct="1">
@@ -9076,15 +9852,12 @@
             <a:pPr indent="0">
               <a:buNone/>
             </a:pPr>
-            <a:r>
-              <a:rPr lang="en-US" sz="1400" b="0" strike="noStrike" spc="-1">
-                <a:solidFill>
-                  <a:srgbClr val="000000"/>
-                </a:solidFill>
-                <a:latin typeface="Noto Sans"/>
-              </a:rPr>
-              <a:t>&lt;date/time&gt;</a:t>
-            </a:r>
+            <a:endParaRPr lang="en-US" sz="1400" b="0" strike="noStrike" spc="-1">
+              <a:solidFill>
+                <a:srgbClr val="000000"/>
+              </a:solidFill>
+              <a:latin typeface="Noto Sans"/>
+            </a:endParaRPr>
           </a:p>
         </p:txBody>
       </p:sp>
@@ -9137,7 +9910,7 @@
                 </a:solidFill>
                 <a:latin typeface="Noto Sans"/>
               </a:rPr>
-              <a:t>&lt;footer&gt;</a:t>
+              <a:t>WISER Quantum Project</a:t>
             </a:r>
           </a:p>
         </p:txBody>
@@ -9208,6 +9981,7 @@
   <p:sldLayoutIdLst>
     <p:sldLayoutId id="2147483655" r:id="rId1"/>
   </p:sldLayoutIdLst>
+  <p:hf sldNum="0" hdr="0" dt="0"/>
   <p:txStyles>
     <p:titleStyle>
       <a:lvl1pPr algn="l" defTabSz="914400" rtl="0" eaLnBrk="1" latinLnBrk="0" hangingPunct="1">
@@ -10268,15 +11042,12 @@
             <a:pPr indent="0">
               <a:buNone/>
             </a:pPr>
-            <a:r>
-              <a:rPr lang="en-US" sz="1400" b="0" strike="noStrike" spc="-1">
-                <a:solidFill>
-                  <a:srgbClr val="000000"/>
-                </a:solidFill>
-                <a:latin typeface="Noto Sans"/>
-              </a:rPr>
-              <a:t>&lt;date/time&gt;</a:t>
-            </a:r>
+            <a:endParaRPr lang="en-US" sz="1400" b="0" strike="noStrike" spc="-1">
+              <a:solidFill>
+                <a:srgbClr val="000000"/>
+              </a:solidFill>
+              <a:latin typeface="Noto Sans"/>
+            </a:endParaRPr>
           </a:p>
         </p:txBody>
       </p:sp>
@@ -10329,7 +11100,7 @@
                 </a:solidFill>
                 <a:latin typeface="Noto Sans"/>
               </a:rPr>
-              <a:t>&lt;footer&gt;</a:t>
+              <a:t>WISER Quantum Project</a:t>
             </a:r>
           </a:p>
         </p:txBody>
@@ -10401,6 +11172,7 @@
     <p:sldLayoutId id="2147483657" r:id="rId1"/>
     <p:sldLayoutId id="2147483658" r:id="rId2"/>
   </p:sldLayoutIdLst>
+  <p:hf sldNum="0" hdr="0" dt="0"/>
   <p:txStyles>
     <p:titleStyle>
       <a:lvl1pPr algn="l" defTabSz="914400" rtl="0" eaLnBrk="1" latinLnBrk="0" hangingPunct="1">
@@ -11491,15 +12263,12 @@
             <a:pPr indent="0">
               <a:buNone/>
             </a:pPr>
-            <a:r>
-              <a:rPr lang="en-US" sz="1400" b="0" strike="noStrike" spc="-1">
-                <a:solidFill>
-                  <a:srgbClr val="000000"/>
-                </a:solidFill>
-                <a:latin typeface="Noto Sans"/>
-              </a:rPr>
-              <a:t>&lt;date/time&gt;</a:t>
-            </a:r>
+            <a:endParaRPr lang="en-US" sz="1400" b="0" strike="noStrike" spc="-1">
+              <a:solidFill>
+                <a:srgbClr val="000000"/>
+              </a:solidFill>
+              <a:latin typeface="Noto Sans"/>
+            </a:endParaRPr>
           </a:p>
         </p:txBody>
       </p:sp>
@@ -11552,7 +12321,7 @@
                 </a:solidFill>
                 <a:latin typeface="Noto Sans"/>
               </a:rPr>
-              <a:t>&lt;footer&gt;</a:t>
+              <a:t>WISER Quantum Project</a:t>
             </a:r>
           </a:p>
         </p:txBody>
@@ -11624,6 +12393,7 @@
     <p:sldLayoutId id="2147483660" r:id="rId1"/>
     <p:sldLayoutId id="2147483661" r:id="rId2"/>
   </p:sldLayoutIdLst>
+  <p:hf sldNum="0" hdr="0" dt="0"/>
   <p:txStyles>
     <p:titleStyle>
       <a:lvl1pPr algn="l" defTabSz="914400" rtl="0" eaLnBrk="1" latinLnBrk="0" hangingPunct="1">
@@ -12760,15 +13530,12 @@
             <a:pPr indent="0">
               <a:buNone/>
             </a:pPr>
-            <a:r>
-              <a:rPr lang="en-US" sz="1400" b="0" strike="noStrike" spc="-1">
-                <a:solidFill>
-                  <a:srgbClr val="000000"/>
-                </a:solidFill>
-                <a:latin typeface="Noto Sans"/>
-              </a:rPr>
-              <a:t>&lt;date/time&gt;</a:t>
-            </a:r>
+            <a:endParaRPr lang="en-US" sz="1400" b="0" strike="noStrike" spc="-1">
+              <a:solidFill>
+                <a:srgbClr val="000000"/>
+              </a:solidFill>
+              <a:latin typeface="Noto Sans"/>
+            </a:endParaRPr>
           </a:p>
         </p:txBody>
       </p:sp>
@@ -12821,7 +13588,7 @@
                 </a:solidFill>
                 <a:latin typeface="Noto Sans"/>
               </a:rPr>
-              <a:t>&lt;footer&gt;</a:t>
+              <a:t>WISER Quantum Project</a:t>
             </a:r>
           </a:p>
         </p:txBody>
@@ -12893,6 +13660,7 @@
     <p:sldLayoutId id="2147483663" r:id="rId1"/>
     <p:sldLayoutId id="2147483664" r:id="rId2"/>
   </p:sldLayoutIdLst>
+  <p:hf sldNum="0" hdr="0" dt="0"/>
   <p:txStyles>
     <p:titleStyle>
       <a:lvl1pPr algn="l" defTabSz="914400" rtl="0" eaLnBrk="1" latinLnBrk="0" hangingPunct="1">
@@ -27707,15 +28475,12 @@
             <a:pPr indent="0">
               <a:buNone/>
             </a:pPr>
-            <a:r>
-              <a:rPr lang="en-US" sz="1400" b="0" strike="noStrike" spc="-1">
-                <a:solidFill>
-                  <a:srgbClr val="000000"/>
-                </a:solidFill>
-                <a:latin typeface="Noto Sans"/>
-              </a:rPr>
-              <a:t>&lt;date/time&gt;</a:t>
-            </a:r>
+            <a:endParaRPr lang="en-US" sz="1400" b="0" strike="noStrike" spc="-1">
+              <a:solidFill>
+                <a:srgbClr val="000000"/>
+              </a:solidFill>
+              <a:latin typeface="Noto Sans"/>
+            </a:endParaRPr>
           </a:p>
         </p:txBody>
       </p:sp>
@@ -27768,7 +28533,7 @@
                 </a:solidFill>
                 <a:latin typeface="Noto Sans"/>
               </a:rPr>
-              <a:t>&lt;footer&gt;</a:t>
+              <a:t>WISER Quantum Project</a:t>
             </a:r>
           </a:p>
         </p:txBody>
@@ -27840,6 +28605,7 @@
     <p:sldLayoutId id="2147483666" r:id="rId1"/>
     <p:sldLayoutId id="2147483667" r:id="rId2"/>
   </p:sldLayoutIdLst>
+  <p:hf sldNum="0" hdr="0" dt="0"/>
   <p:txStyles>
     <p:titleStyle>
       <a:lvl1pPr algn="l" defTabSz="914400" rtl="0" eaLnBrk="1" latinLnBrk="0" hangingPunct="1">
@@ -29963,15 +30729,12 @@
             <a:pPr indent="0">
               <a:buNone/>
             </a:pPr>
-            <a:r>
-              <a:rPr lang="en-US" sz="1400" b="0" strike="noStrike" spc="-1">
-                <a:solidFill>
-                  <a:srgbClr val="000000"/>
-                </a:solidFill>
-                <a:latin typeface="Noto Sans"/>
-              </a:rPr>
-              <a:t>&lt;date/time&gt;</a:t>
-            </a:r>
+            <a:endParaRPr lang="en-US" sz="1400" b="0" strike="noStrike" spc="-1">
+              <a:solidFill>
+                <a:srgbClr val="000000"/>
+              </a:solidFill>
+              <a:latin typeface="Noto Sans"/>
+            </a:endParaRPr>
           </a:p>
         </p:txBody>
       </p:sp>
@@ -30024,7 +30787,7 @@
                 </a:solidFill>
                 <a:latin typeface="Noto Sans"/>
               </a:rPr>
-              <a:t>&lt;footer&gt;</a:t>
+              <a:t>WISER Quantum Project</a:t>
             </a:r>
           </a:p>
         </p:txBody>
@@ -30096,6 +30859,7 @@
     <p:sldLayoutId id="2147483669" r:id="rId1"/>
     <p:sldLayoutId id="2147483670" r:id="rId2"/>
   </p:sldLayoutIdLst>
+  <p:hf sldNum="0" hdr="0" dt="0"/>
   <p:txStyles>
     <p:titleStyle>
       <a:lvl1pPr algn="l" defTabSz="914400" rtl="0" eaLnBrk="1" latinLnBrk="0" hangingPunct="1">
@@ -30585,6 +31349,42 @@
           </a:p>
         </p:txBody>
       </p:sp>
+      <p:pic>
+        <p:nvPicPr>
+          <p:cNvPr id="4" name="Picture 3" descr="A black background with a black letter w&#10;&#10;AI-generated content may be incorrect.">
+            <a:extLst>
+              <a:ext uri="{FF2B5EF4-FFF2-40B4-BE49-F238E27FC236}">
+                <a16:creationId xmlns:a16="http://schemas.microsoft.com/office/drawing/2014/main" id="{6C91CEA8-8353-E1ED-3027-3587FBE9E1AB}"/>
+              </a:ext>
+            </a:extLst>
+          </p:cNvPr>
+          <p:cNvPicPr>
+            <a:picLocks noChangeAspect="1"/>
+          </p:cNvPicPr>
+          <p:nvPr/>
+        </p:nvPicPr>
+        <p:blipFill>
+          <a:blip r:embed="rId3">
+            <a:extLst>
+              <a:ext uri="{28A0092B-C50C-407E-A947-70E740481C1C}">
+                <a14:useLocalDpi xmlns:a14="http://schemas.microsoft.com/office/drawing/2010/main" val="0"/>
+              </a:ext>
+            </a:extLst>
+          </a:blip>
+          <a:stretch>
+            <a:fillRect/>
+          </a:stretch>
+        </p:blipFill>
+        <p:spPr>
+          <a:xfrm>
+            <a:off x="0" y="-141404"/>
+            <a:ext cx="974634" cy="974634"/>
+          </a:xfrm>
+          <a:prstGeom prst="rect">
+            <a:avLst/>
+          </a:prstGeom>
+        </p:spPr>
+      </p:pic>
     </p:spTree>
   </p:cSld>
   <p:clrMapOvr>
@@ -30592,10 +31392,10 @@
   </p:clrMapOvr>
   <mc:AlternateContent xmlns:mc="http://schemas.openxmlformats.org/markup-compatibility/2006" xmlns:p14="http://schemas.microsoft.com/office/powerpoint/2010/main">
     <mc:Choice Requires="p14">
-      <p:transition spd="slow" p14:dur="2000" advTm="22664"/>
+      <p:transition spd="slow" p14:dur="2000" advTm="19994"/>
     </mc:Choice>
     <mc:Fallback xmlns="">
-      <p:transition spd="slow" advTm="22664"/>
+      <p:transition spd="slow" advTm="19994"/>
     </mc:Fallback>
   </mc:AlternateContent>
 </p:sld>
@@ -30847,7 +31647,7 @@
         <p:spPr>
           <a:xfrm>
             <a:off x="394408" y="4559422"/>
-            <a:ext cx="8898421" cy="1015663"/>
+            <a:ext cx="8898421" cy="646331"/>
           </a:xfrm>
           <a:prstGeom prst="rect">
             <a:avLst/>
@@ -30874,19 +31674,6 @@
               </a:rPr>
               <a:t>Despite large distances from the reference, the distribution shapes are identifiable</a:t>
             </a:r>
-          </a:p>
-          <a:p>
-            <a:pPr marL="171450" indent="-171450">
-              <a:buFont typeface="Arial" panose="020B0604020202020204" pitchFamily="34" charset="0"/>
-              <a:buChar char="•"/>
-            </a:pPr>
-            <a:endParaRPr lang="en-US" sz="1200" dirty="0">
-              <a:solidFill>
-                <a:srgbClr val="000000"/>
-              </a:solidFill>
-              <a:effectLst/>
-              <a:latin typeface="Arial" panose="020B0604020202020204" pitchFamily="34" charset="0"/>
-            </a:endParaRPr>
           </a:p>
           <a:p>
             <a:pPr marL="171450" indent="-171450">
@@ -30918,19 +31705,6 @@
               <a:buFont typeface="Arial" panose="020B0604020202020204" pitchFamily="34" charset="0"/>
               <a:buChar char="•"/>
             </a:pPr>
-            <a:endParaRPr lang="en-US" sz="1200" dirty="0">
-              <a:solidFill>
-                <a:srgbClr val="000000"/>
-              </a:solidFill>
-              <a:effectLst/>
-              <a:latin typeface="Arial" panose="020B0604020202020204" pitchFamily="34" charset="0"/>
-            </a:endParaRPr>
-          </a:p>
-          <a:p>
-            <a:pPr marL="171450" indent="-171450">
-              <a:buFont typeface="Arial" panose="020B0604020202020204" pitchFamily="34" charset="0"/>
-              <a:buChar char="•"/>
-            </a:pPr>
             <a:r>
               <a:rPr lang="en-US" sz="1200" dirty="0">
                 <a:solidFill>
@@ -30942,6 +31716,70 @@
               <a:t>Overall, the IBM Torino backend performed impressively!!! 🎉🎉🎉</a:t>
             </a:r>
             <a:endParaRPr lang="en-IL" sz="1200" dirty="0"/>
+          </a:p>
+        </p:txBody>
+      </p:sp>
+      <p:pic>
+        <p:nvPicPr>
+          <p:cNvPr id="3" name="Picture 2" descr="A black background with a black letter w&#10;&#10;AI-generated content may be incorrect.">
+            <a:extLst>
+              <a:ext uri="{FF2B5EF4-FFF2-40B4-BE49-F238E27FC236}">
+                <a16:creationId xmlns:a16="http://schemas.microsoft.com/office/drawing/2014/main" id="{0133861F-F3F8-1ED8-0FAD-B1420A1686BA}"/>
+              </a:ext>
+            </a:extLst>
+          </p:cNvPr>
+          <p:cNvPicPr>
+            <a:picLocks noChangeAspect="1"/>
+          </p:cNvPicPr>
+          <p:nvPr/>
+        </p:nvPicPr>
+        <p:blipFill>
+          <a:blip r:embed="rId9">
+            <a:extLst>
+              <a:ext uri="{28A0092B-C50C-407E-A947-70E740481C1C}">
+                <a14:useLocalDpi xmlns:a14="http://schemas.microsoft.com/office/drawing/2010/main" val="0"/>
+              </a:ext>
+            </a:extLst>
+          </a:blip>
+          <a:stretch>
+            <a:fillRect/>
+          </a:stretch>
+        </p:blipFill>
+        <p:spPr>
+          <a:xfrm>
+            <a:off x="9068072" y="0"/>
+            <a:ext cx="974634" cy="974634"/>
+          </a:xfrm>
+          <a:prstGeom prst="rect">
+            <a:avLst/>
+          </a:prstGeom>
+        </p:spPr>
+      </p:pic>
+      <p:sp>
+        <p:nvSpPr>
+          <p:cNvPr id="4" name="Footer Placeholder 3">
+            <a:extLst>
+              <a:ext uri="{FF2B5EF4-FFF2-40B4-BE49-F238E27FC236}">
+                <a16:creationId xmlns:a16="http://schemas.microsoft.com/office/drawing/2014/main" id="{E4F1863C-EBBD-D359-3583-4B15F96A4A2C}"/>
+              </a:ext>
+            </a:extLst>
+          </p:cNvPr>
+          <p:cNvSpPr>
+            <a:spLocks noGrp="1"/>
+          </p:cNvSpPr>
+          <p:nvPr>
+            <p:ph type="ftr" idx="5"/>
+          </p:nvPr>
+        </p:nvSpPr>
+        <p:spPr/>
+        <p:txBody>
+          <a:bodyPr/>
+          <a:lstStyle/>
+          <a:p>
+            <a:r>
+              <a:rPr lang="en-US" sz="1200" dirty="0"/>
+              <a:t>WISER Quantum Project</a:t>
+            </a:r>
           </a:p>
         </p:txBody>
       </p:sp>
@@ -30957,10 +31795,10 @@
   </p:clrMapOvr>
   <mc:AlternateContent xmlns:mc="http://schemas.openxmlformats.org/markup-compatibility/2006" xmlns:p14="http://schemas.microsoft.com/office/powerpoint/2010/main">
     <mc:Choice Requires="p14">
-      <p:transition spd="slow" p14:dur="2000" advTm="21811"/>
+      <p:transition spd="slow" p14:dur="2000" advTm="19532"/>
     </mc:Choice>
     <mc:Fallback xmlns="">
-      <p:transition spd="slow" advTm="21811"/>
+      <p:transition spd="slow" advTm="19532"/>
     </mc:Fallback>
   </mc:AlternateContent>
 </p:sld>
@@ -31253,6 +32091,70 @@
           </a:prstGeom>
         </p:spPr>
       </p:pic>
+      <p:pic>
+        <p:nvPicPr>
+          <p:cNvPr id="2" name="Picture 1" descr="A black background with a black letter w&#10;&#10;AI-generated content may be incorrect.">
+            <a:extLst>
+              <a:ext uri="{FF2B5EF4-FFF2-40B4-BE49-F238E27FC236}">
+                <a16:creationId xmlns:a16="http://schemas.microsoft.com/office/drawing/2014/main" id="{D734C383-3F87-E30D-681F-B8FB85CF736B}"/>
+              </a:ext>
+            </a:extLst>
+          </p:cNvPr>
+          <p:cNvPicPr>
+            <a:picLocks noChangeAspect="1"/>
+          </p:cNvPicPr>
+          <p:nvPr/>
+        </p:nvPicPr>
+        <p:blipFill>
+          <a:blip r:embed="rId5">
+            <a:extLst>
+              <a:ext uri="{28A0092B-C50C-407E-A947-70E740481C1C}">
+                <a14:useLocalDpi xmlns:a14="http://schemas.microsoft.com/office/drawing/2010/main" val="0"/>
+              </a:ext>
+            </a:extLst>
+          </a:blip>
+          <a:stretch>
+            <a:fillRect/>
+          </a:stretch>
+        </p:blipFill>
+        <p:spPr>
+          <a:xfrm>
+            <a:off x="9068072" y="0"/>
+            <a:ext cx="974634" cy="974634"/>
+          </a:xfrm>
+          <a:prstGeom prst="rect">
+            <a:avLst/>
+          </a:prstGeom>
+        </p:spPr>
+      </p:pic>
+      <p:sp>
+        <p:nvSpPr>
+          <p:cNvPr id="4" name="Footer Placeholder 3">
+            <a:extLst>
+              <a:ext uri="{FF2B5EF4-FFF2-40B4-BE49-F238E27FC236}">
+                <a16:creationId xmlns:a16="http://schemas.microsoft.com/office/drawing/2014/main" id="{5DBB28C1-EE07-1585-9476-E921E38D03F7}"/>
+              </a:ext>
+            </a:extLst>
+          </p:cNvPr>
+          <p:cNvSpPr>
+            <a:spLocks noGrp="1"/>
+          </p:cNvSpPr>
+          <p:nvPr>
+            <p:ph type="ftr" idx="5"/>
+          </p:nvPr>
+        </p:nvSpPr>
+        <p:spPr/>
+        <p:txBody>
+          <a:bodyPr/>
+          <a:lstStyle/>
+          <a:p>
+            <a:r>
+              <a:rPr lang="en-US" sz="1200" dirty="0"/>
+              <a:t>WISER Quantum Project</a:t>
+            </a:r>
+          </a:p>
+        </p:txBody>
+      </p:sp>
     </p:spTree>
   </p:cSld>
   <p:clrMapOvr>
@@ -31260,10 +32162,10 @@
   </p:clrMapOvr>
   <mc:AlternateContent xmlns:mc="http://schemas.openxmlformats.org/markup-compatibility/2006" xmlns:p14="http://schemas.microsoft.com/office/powerpoint/2010/main">
     <mc:Choice Requires="p14">
-      <p:transition spd="slow" p14:dur="2000" advTm="15524"/>
+      <p:transition spd="slow" p14:dur="2000" advTm="16898"/>
     </mc:Choice>
     <mc:Fallback xmlns="">
-      <p:transition spd="slow" advTm="15524"/>
+      <p:transition spd="slow" advTm="16898"/>
     </mc:Fallback>
   </mc:AlternateContent>
 </p:sld>
@@ -31539,6 +32441,70 @@
           </a:p>
         </p:txBody>
       </p:sp>
+      <p:pic>
+        <p:nvPicPr>
+          <p:cNvPr id="2" name="Picture 1" descr="A black background with a black letter w&#10;&#10;AI-generated content may be incorrect.">
+            <a:extLst>
+              <a:ext uri="{FF2B5EF4-FFF2-40B4-BE49-F238E27FC236}">
+                <a16:creationId xmlns:a16="http://schemas.microsoft.com/office/drawing/2014/main" id="{BB32EDE6-F6A1-7515-F5CB-F4C166F7E915}"/>
+              </a:ext>
+            </a:extLst>
+          </p:cNvPr>
+          <p:cNvPicPr>
+            <a:picLocks noChangeAspect="1"/>
+          </p:cNvPicPr>
+          <p:nvPr/>
+        </p:nvPicPr>
+        <p:blipFill>
+          <a:blip r:embed="rId4">
+            <a:extLst>
+              <a:ext uri="{28A0092B-C50C-407E-A947-70E740481C1C}">
+                <a14:useLocalDpi xmlns:a14="http://schemas.microsoft.com/office/drawing/2010/main" val="0"/>
+              </a:ext>
+            </a:extLst>
+          </a:blip>
+          <a:stretch>
+            <a:fillRect/>
+          </a:stretch>
+        </p:blipFill>
+        <p:spPr>
+          <a:xfrm>
+            <a:off x="9068072" y="0"/>
+            <a:ext cx="974634" cy="974634"/>
+          </a:xfrm>
+          <a:prstGeom prst="rect">
+            <a:avLst/>
+          </a:prstGeom>
+        </p:spPr>
+      </p:pic>
+      <p:sp>
+        <p:nvSpPr>
+          <p:cNvPr id="4" name="Footer Placeholder 3">
+            <a:extLst>
+              <a:ext uri="{FF2B5EF4-FFF2-40B4-BE49-F238E27FC236}">
+                <a16:creationId xmlns:a16="http://schemas.microsoft.com/office/drawing/2014/main" id="{69BEDCCE-68CF-5D7C-DD2B-D7512EC3510F}"/>
+              </a:ext>
+            </a:extLst>
+          </p:cNvPr>
+          <p:cNvSpPr>
+            <a:spLocks noGrp="1"/>
+          </p:cNvSpPr>
+          <p:nvPr>
+            <p:ph type="ftr" idx="5"/>
+          </p:nvPr>
+        </p:nvSpPr>
+        <p:spPr/>
+        <p:txBody>
+          <a:bodyPr/>
+          <a:lstStyle/>
+          <a:p>
+            <a:r>
+              <a:rPr lang="en-US" sz="1200" dirty="0"/>
+              <a:t>WISER Quantum Project</a:t>
+            </a:r>
+          </a:p>
+        </p:txBody>
+      </p:sp>
     </p:spTree>
   </p:cSld>
   <p:clrMapOvr>
@@ -31546,10 +32512,10 @@
   </p:clrMapOvr>
   <mc:AlternateContent xmlns:mc="http://schemas.openxmlformats.org/markup-compatibility/2006" xmlns:p14="http://schemas.microsoft.com/office/powerpoint/2010/main">
     <mc:Choice Requires="p14">
-      <p:transition spd="slow" p14:dur="2000" advTm="44953"/>
+      <p:transition spd="slow" p14:dur="2000" advTm="34915"/>
     </mc:Choice>
     <mc:Fallback xmlns="">
-      <p:transition spd="slow" advTm="44953"/>
+      <p:transition spd="slow" advTm="34915"/>
     </mc:Fallback>
   </mc:AlternateContent>
 </p:sld>
@@ -31710,6 +32676,70 @@
           </a:p>
         </p:txBody>
       </p:sp>
+      <p:pic>
+        <p:nvPicPr>
+          <p:cNvPr id="4" name="Picture 3" descr="A black background with a black letter w&#10;&#10;AI-generated content may be incorrect.">
+            <a:extLst>
+              <a:ext uri="{FF2B5EF4-FFF2-40B4-BE49-F238E27FC236}">
+                <a16:creationId xmlns:a16="http://schemas.microsoft.com/office/drawing/2014/main" id="{826995B6-9934-0214-2F63-5F3B93AA3856}"/>
+              </a:ext>
+            </a:extLst>
+          </p:cNvPr>
+          <p:cNvPicPr>
+            <a:picLocks noChangeAspect="1"/>
+          </p:cNvPicPr>
+          <p:nvPr/>
+        </p:nvPicPr>
+        <p:blipFill>
+          <a:blip r:embed="rId3">
+            <a:extLst>
+              <a:ext uri="{28A0092B-C50C-407E-A947-70E740481C1C}">
+                <a14:useLocalDpi xmlns:a14="http://schemas.microsoft.com/office/drawing/2010/main" val="0"/>
+              </a:ext>
+            </a:extLst>
+          </a:blip>
+          <a:stretch>
+            <a:fillRect/>
+          </a:stretch>
+        </p:blipFill>
+        <p:spPr>
+          <a:xfrm>
+            <a:off x="9068072" y="0"/>
+            <a:ext cx="974634" cy="974634"/>
+          </a:xfrm>
+          <a:prstGeom prst="rect">
+            <a:avLst/>
+          </a:prstGeom>
+        </p:spPr>
+      </p:pic>
+      <p:sp>
+        <p:nvSpPr>
+          <p:cNvPr id="5" name="Footer Placeholder 4">
+            <a:extLst>
+              <a:ext uri="{FF2B5EF4-FFF2-40B4-BE49-F238E27FC236}">
+                <a16:creationId xmlns:a16="http://schemas.microsoft.com/office/drawing/2014/main" id="{D11E7830-B9BF-5118-D9A8-D306C4F9FDE4}"/>
+              </a:ext>
+            </a:extLst>
+          </p:cNvPr>
+          <p:cNvSpPr>
+            <a:spLocks noGrp="1"/>
+          </p:cNvSpPr>
+          <p:nvPr>
+            <p:ph type="ftr" idx="5"/>
+          </p:nvPr>
+        </p:nvSpPr>
+        <p:spPr/>
+        <p:txBody>
+          <a:bodyPr/>
+          <a:lstStyle/>
+          <a:p>
+            <a:r>
+              <a:rPr lang="en-US" sz="1200" dirty="0"/>
+              <a:t>WISER Quantum Project</a:t>
+            </a:r>
+          </a:p>
+        </p:txBody>
+      </p:sp>
     </p:spTree>
     <p:extLst>
       <p:ext uri="{BB962C8B-B14F-4D97-AF65-F5344CB8AC3E}">
@@ -31720,6 +32750,14 @@
   <p:clrMapOvr>
     <a:masterClrMapping/>
   </p:clrMapOvr>
+  <mc:AlternateContent xmlns:mc="http://schemas.openxmlformats.org/markup-compatibility/2006" xmlns:p14="http://schemas.microsoft.com/office/powerpoint/2010/main">
+    <mc:Choice Requires="p14">
+      <p:transition spd="slow" p14:dur="2000" advTm="4752"/>
+    </mc:Choice>
+    <mc:Fallback xmlns="">
+      <p:transition spd="slow" advTm="4752"/>
+    </mc:Fallback>
+  </mc:AlternateContent>
 </p:sld>
 </file>
 
@@ -31959,6 +32997,71 @@
               <a:t>Real Backend Runs: Execute Resulting Circuits on physical QPUs and observe the results</a:t>
             </a:r>
             <a:endParaRPr lang="en-IL" sz="1600" dirty="0"/>
+          </a:p>
+        </p:txBody>
+      </p:sp>
+      <p:pic>
+        <p:nvPicPr>
+          <p:cNvPr id="5" name="Picture 4" descr="A black background with a black letter w&#10;&#10;AI-generated content may be incorrect.">
+            <a:extLst>
+              <a:ext uri="{FF2B5EF4-FFF2-40B4-BE49-F238E27FC236}">
+                <a16:creationId xmlns:a16="http://schemas.microsoft.com/office/drawing/2014/main" id="{5912B2F0-6B83-5BB9-497D-826A712EE5BD}"/>
+              </a:ext>
+            </a:extLst>
+          </p:cNvPr>
+          <p:cNvPicPr>
+            <a:picLocks noChangeAspect="1"/>
+          </p:cNvPicPr>
+          <p:nvPr/>
+        </p:nvPicPr>
+        <p:blipFill>
+          <a:blip r:embed="rId3">
+            <a:extLst>
+              <a:ext uri="{28A0092B-C50C-407E-A947-70E740481C1C}">
+                <a14:useLocalDpi xmlns:a14="http://schemas.microsoft.com/office/drawing/2010/main" val="0"/>
+              </a:ext>
+            </a:extLst>
+          </a:blip>
+          <a:stretch>
+            <a:fillRect/>
+          </a:stretch>
+        </p:blipFill>
+        <p:spPr>
+          <a:xfrm>
+            <a:off x="9068072" y="0"/>
+            <a:ext cx="974634" cy="974634"/>
+          </a:xfrm>
+          <a:prstGeom prst="rect">
+            <a:avLst/>
+          </a:prstGeom>
+        </p:spPr>
+      </p:pic>
+      <p:sp>
+        <p:nvSpPr>
+          <p:cNvPr id="6" name="Footer Placeholder 5">
+            <a:extLst>
+              <a:ext uri="{FF2B5EF4-FFF2-40B4-BE49-F238E27FC236}">
+                <a16:creationId xmlns:a16="http://schemas.microsoft.com/office/drawing/2014/main" id="{20D52B17-D3A7-196C-1053-CCB8C7C63B0F}"/>
+              </a:ext>
+            </a:extLst>
+          </p:cNvPr>
+          <p:cNvSpPr>
+            <a:spLocks noGrp="1"/>
+          </p:cNvSpPr>
+          <p:nvPr>
+            <p:ph type="ftr" idx="5"/>
+          </p:nvPr>
+        </p:nvSpPr>
+        <p:spPr/>
+        <p:txBody>
+          <a:bodyPr/>
+          <a:lstStyle/>
+          <a:p>
+            <a:r>
+              <a:rPr lang="en-US"/>
+              <a:t>WISER Quantum Project</a:t>
+            </a:r>
+            <a:endParaRPr lang="en-US" dirty="0"/>
           </a:p>
         </p:txBody>
       </p:sp>
@@ -32143,6 +33246,70 @@
           </a:p>
         </p:txBody>
       </p:sp>
+      <p:pic>
+        <p:nvPicPr>
+          <p:cNvPr id="4" name="Picture 3" descr="A black background with a black letter w&#10;&#10;AI-generated content may be incorrect.">
+            <a:extLst>
+              <a:ext uri="{FF2B5EF4-FFF2-40B4-BE49-F238E27FC236}">
+                <a16:creationId xmlns:a16="http://schemas.microsoft.com/office/drawing/2014/main" id="{00971688-3B64-DC4C-3655-06B69C4C3C75}"/>
+              </a:ext>
+            </a:extLst>
+          </p:cNvPr>
+          <p:cNvPicPr>
+            <a:picLocks noChangeAspect="1"/>
+          </p:cNvPicPr>
+          <p:nvPr/>
+        </p:nvPicPr>
+        <p:blipFill>
+          <a:blip r:embed="rId4">
+            <a:extLst>
+              <a:ext uri="{28A0092B-C50C-407E-A947-70E740481C1C}">
+                <a14:useLocalDpi xmlns:a14="http://schemas.microsoft.com/office/drawing/2010/main" val="0"/>
+              </a:ext>
+            </a:extLst>
+          </a:blip>
+          <a:stretch>
+            <a:fillRect/>
+          </a:stretch>
+        </p:blipFill>
+        <p:spPr>
+          <a:xfrm>
+            <a:off x="9068072" y="0"/>
+            <a:ext cx="974634" cy="974634"/>
+          </a:xfrm>
+          <a:prstGeom prst="rect">
+            <a:avLst/>
+          </a:prstGeom>
+        </p:spPr>
+      </p:pic>
+      <p:sp>
+        <p:nvSpPr>
+          <p:cNvPr id="7" name="Footer Placeholder 6">
+            <a:extLst>
+              <a:ext uri="{FF2B5EF4-FFF2-40B4-BE49-F238E27FC236}">
+                <a16:creationId xmlns:a16="http://schemas.microsoft.com/office/drawing/2014/main" id="{1439DABD-0B96-97E8-62E7-97337D399B29}"/>
+              </a:ext>
+            </a:extLst>
+          </p:cNvPr>
+          <p:cNvSpPr>
+            <a:spLocks noGrp="1"/>
+          </p:cNvSpPr>
+          <p:nvPr>
+            <p:ph type="ftr" idx="5"/>
+          </p:nvPr>
+        </p:nvSpPr>
+        <p:spPr/>
+        <p:txBody>
+          <a:bodyPr/>
+          <a:lstStyle/>
+          <a:p>
+            <a:r>
+              <a:rPr lang="en-US"/>
+              <a:t>WISER Quantum Project</a:t>
+            </a:r>
+          </a:p>
+        </p:txBody>
+      </p:sp>
     </p:spTree>
   </p:cSld>
   <p:clrMapOvr>
@@ -32150,10 +33317,10 @@
   </p:clrMapOvr>
   <mc:AlternateContent xmlns:mc="http://schemas.openxmlformats.org/markup-compatibility/2006" xmlns:p14="http://schemas.microsoft.com/office/powerpoint/2010/main">
     <mc:Choice Requires="p14">
-      <p:transition spd="slow" p14:dur="2000" advTm="77121"/>
+      <p:transition spd="slow" p14:dur="2000" advTm="49320"/>
     </mc:Choice>
     <mc:Fallback xmlns="">
-      <p:transition spd="slow" advTm="77121"/>
+      <p:transition spd="slow" advTm="49320"/>
     </mc:Fallback>
   </mc:AlternateContent>
 </p:sld>
@@ -32374,6 +33541,70 @@
           </a:prstGeom>
         </p:spPr>
       </p:pic>
+      <p:pic>
+        <p:nvPicPr>
+          <p:cNvPr id="7" name="Picture 6" descr="A black background with a black letter w&#10;&#10;AI-generated content may be incorrect.">
+            <a:extLst>
+              <a:ext uri="{FF2B5EF4-FFF2-40B4-BE49-F238E27FC236}">
+                <a16:creationId xmlns:a16="http://schemas.microsoft.com/office/drawing/2014/main" id="{30D71D0F-54B5-44AC-9E79-AD0067525B4C}"/>
+              </a:ext>
+            </a:extLst>
+          </p:cNvPr>
+          <p:cNvPicPr>
+            <a:picLocks noChangeAspect="1"/>
+          </p:cNvPicPr>
+          <p:nvPr/>
+        </p:nvPicPr>
+        <p:blipFill>
+          <a:blip r:embed="rId5">
+            <a:extLst>
+              <a:ext uri="{28A0092B-C50C-407E-A947-70E740481C1C}">
+                <a14:useLocalDpi xmlns:a14="http://schemas.microsoft.com/office/drawing/2010/main" val="0"/>
+              </a:ext>
+            </a:extLst>
+          </a:blip>
+          <a:stretch>
+            <a:fillRect/>
+          </a:stretch>
+        </p:blipFill>
+        <p:spPr>
+          <a:xfrm>
+            <a:off x="9068072" y="0"/>
+            <a:ext cx="974634" cy="974634"/>
+          </a:xfrm>
+          <a:prstGeom prst="rect">
+            <a:avLst/>
+          </a:prstGeom>
+        </p:spPr>
+      </p:pic>
+      <p:sp>
+        <p:nvSpPr>
+          <p:cNvPr id="9" name="Footer Placeholder 8">
+            <a:extLst>
+              <a:ext uri="{FF2B5EF4-FFF2-40B4-BE49-F238E27FC236}">
+                <a16:creationId xmlns:a16="http://schemas.microsoft.com/office/drawing/2014/main" id="{DF3DD9E2-6560-DDB4-3C59-5E44DB7DC3C4}"/>
+              </a:ext>
+            </a:extLst>
+          </p:cNvPr>
+          <p:cNvSpPr>
+            <a:spLocks noGrp="1"/>
+          </p:cNvSpPr>
+          <p:nvPr>
+            <p:ph type="ftr" idx="5"/>
+          </p:nvPr>
+        </p:nvSpPr>
+        <p:spPr/>
+        <p:txBody>
+          <a:bodyPr/>
+          <a:lstStyle/>
+          <a:p>
+            <a:r>
+              <a:rPr lang="en-US"/>
+              <a:t>WISER Quantum Project</a:t>
+            </a:r>
+          </a:p>
+        </p:txBody>
+      </p:sp>
     </p:spTree>
   </p:cSld>
   <p:clrMapOvr>
@@ -32381,10 +33612,10 @@
   </p:clrMapOvr>
   <mc:AlternateContent xmlns:mc="http://schemas.openxmlformats.org/markup-compatibility/2006" xmlns:p14="http://schemas.microsoft.com/office/powerpoint/2010/main">
     <mc:Choice Requires="p14">
-      <p:transition spd="slow" p14:dur="2000" advTm="34790"/>
+      <p:transition spd="slow" p14:dur="2000" advTm="28619"/>
     </mc:Choice>
     <mc:Fallback xmlns="">
-      <p:transition spd="slow" advTm="34790"/>
+      <p:transition spd="slow" advTm="28619"/>
     </mc:Fallback>
   </mc:AlternateContent>
 </p:sld>
@@ -32437,7 +33668,7 @@
           <a:lstStyle/>
           <a:p>
             <a:r>
-              <a:rPr lang="en-US" sz="3200" dirty="0"/>
+              <a:rPr lang="en-US" sz="2800" dirty="0"/>
               <a:t>Exponential Distribution</a:t>
             </a:r>
           </a:p>
@@ -32499,8 +33730,8 @@
         </p:nvSpPr>
         <p:spPr>
           <a:xfrm>
-            <a:off x="5115697" y="820390"/>
-            <a:ext cx="4728519" cy="2308324"/>
+            <a:off x="4483865" y="721237"/>
+            <a:ext cx="5272215" cy="2123658"/>
           </a:xfrm>
           <a:prstGeom prst="rect">
             <a:avLst/>
@@ -32639,7 +33870,7 @@
         </p:blipFill>
         <p:spPr>
           <a:xfrm>
-            <a:off x="7721928" y="2785817"/>
+            <a:off x="7119972" y="2505234"/>
             <a:ext cx="1183175" cy="341058"/>
           </a:xfrm>
           <a:prstGeom prst="rect">
@@ -32669,7 +33900,7 @@
         </p:blipFill>
         <p:spPr>
           <a:xfrm>
-            <a:off x="5511547" y="3151589"/>
+            <a:off x="4883584" y="2865147"/>
             <a:ext cx="3706596" cy="2456484"/>
           </a:xfrm>
           <a:prstGeom prst="rect">
@@ -32677,6 +33908,70 @@
           </a:prstGeom>
         </p:spPr>
       </p:pic>
+      <p:pic>
+        <p:nvPicPr>
+          <p:cNvPr id="5" name="Picture 4" descr="A black background with a black letter w&#10;&#10;AI-generated content may be incorrect.">
+            <a:extLst>
+              <a:ext uri="{FF2B5EF4-FFF2-40B4-BE49-F238E27FC236}">
+                <a16:creationId xmlns:a16="http://schemas.microsoft.com/office/drawing/2014/main" id="{A3777C46-E55E-4FDF-1627-1A8C160C1AA1}"/>
+              </a:ext>
+            </a:extLst>
+          </p:cNvPr>
+          <p:cNvPicPr>
+            <a:picLocks noChangeAspect="1"/>
+          </p:cNvPicPr>
+          <p:nvPr/>
+        </p:nvPicPr>
+        <p:blipFill>
+          <a:blip r:embed="rId6">
+            <a:extLst>
+              <a:ext uri="{28A0092B-C50C-407E-A947-70E740481C1C}">
+                <a14:useLocalDpi xmlns:a14="http://schemas.microsoft.com/office/drawing/2010/main" val="0"/>
+              </a:ext>
+            </a:extLst>
+          </a:blip>
+          <a:stretch>
+            <a:fillRect/>
+          </a:stretch>
+        </p:blipFill>
+        <p:spPr>
+          <a:xfrm>
+            <a:off x="9068072" y="0"/>
+            <a:ext cx="974634" cy="974634"/>
+          </a:xfrm>
+          <a:prstGeom prst="rect">
+            <a:avLst/>
+          </a:prstGeom>
+        </p:spPr>
+      </p:pic>
+      <p:sp>
+        <p:nvSpPr>
+          <p:cNvPr id="9" name="Footer Placeholder 8">
+            <a:extLst>
+              <a:ext uri="{FF2B5EF4-FFF2-40B4-BE49-F238E27FC236}">
+                <a16:creationId xmlns:a16="http://schemas.microsoft.com/office/drawing/2014/main" id="{4FBEEA59-16F3-3DAF-FE62-388C590CB7AD}"/>
+              </a:ext>
+            </a:extLst>
+          </p:cNvPr>
+          <p:cNvSpPr>
+            <a:spLocks noGrp="1"/>
+          </p:cNvSpPr>
+          <p:nvPr>
+            <p:ph type="ftr" idx="5"/>
+          </p:nvPr>
+        </p:nvSpPr>
+        <p:spPr/>
+        <p:txBody>
+          <a:bodyPr/>
+          <a:lstStyle/>
+          <a:p>
+            <a:r>
+              <a:rPr lang="en-US" sz="1200" dirty="0"/>
+              <a:t>WISER Quantum Project</a:t>
+            </a:r>
+          </a:p>
+        </p:txBody>
+      </p:sp>
     </p:spTree>
   </p:cSld>
   <p:clrMapOvr>
@@ -32684,10 +33979,10 @@
   </p:clrMapOvr>
   <mc:AlternateContent xmlns:mc="http://schemas.openxmlformats.org/markup-compatibility/2006" xmlns:p14="http://schemas.microsoft.com/office/powerpoint/2010/main">
     <mc:Choice Requires="p14">
-      <p:transition spd="slow" p14:dur="2000" advTm="28475"/>
+      <p:transition spd="slow" p14:dur="2000" advTm="24172"/>
     </mc:Choice>
     <mc:Fallback xmlns="">
-      <p:transition spd="slow" advTm="28475"/>
+      <p:transition spd="slow" advTm="24172"/>
     </mc:Fallback>
   </mc:AlternateContent>
 </p:sld>
@@ -32905,7 +34200,7 @@
         </p:blipFill>
         <p:spPr>
           <a:xfrm>
-            <a:off x="4349578" y="929693"/>
+            <a:off x="4349578" y="863591"/>
             <a:ext cx="5651437" cy="1885007"/>
           </a:xfrm>
           <a:prstGeom prst="rect">
@@ -32935,7 +34230,7 @@
         </p:blipFill>
         <p:spPr>
           <a:xfrm>
-            <a:off x="4967416" y="2771264"/>
+            <a:off x="4967416" y="2694145"/>
             <a:ext cx="4415481" cy="2631070"/>
           </a:xfrm>
           <a:prstGeom prst="rect">
@@ -32943,6 +34238,70 @@
           </a:prstGeom>
         </p:spPr>
       </p:pic>
+      <p:pic>
+        <p:nvPicPr>
+          <p:cNvPr id="2" name="Picture 1" descr="A black background with a black letter w&#10;&#10;AI-generated content may be incorrect.">
+            <a:extLst>
+              <a:ext uri="{FF2B5EF4-FFF2-40B4-BE49-F238E27FC236}">
+                <a16:creationId xmlns:a16="http://schemas.microsoft.com/office/drawing/2014/main" id="{4FD91975-D364-7710-AC34-2D129A6B8A98}"/>
+              </a:ext>
+            </a:extLst>
+          </p:cNvPr>
+          <p:cNvPicPr>
+            <a:picLocks noChangeAspect="1"/>
+          </p:cNvPicPr>
+          <p:nvPr/>
+        </p:nvPicPr>
+        <p:blipFill>
+          <a:blip r:embed="rId5">
+            <a:extLst>
+              <a:ext uri="{28A0092B-C50C-407E-A947-70E740481C1C}">
+                <a14:useLocalDpi xmlns:a14="http://schemas.microsoft.com/office/drawing/2010/main" val="0"/>
+              </a:ext>
+            </a:extLst>
+          </a:blip>
+          <a:stretch>
+            <a:fillRect/>
+          </a:stretch>
+        </p:blipFill>
+        <p:spPr>
+          <a:xfrm>
+            <a:off x="122276" y="4695916"/>
+            <a:ext cx="974634" cy="974634"/>
+          </a:xfrm>
+          <a:prstGeom prst="rect">
+            <a:avLst/>
+          </a:prstGeom>
+        </p:spPr>
+      </p:pic>
+      <p:sp>
+        <p:nvSpPr>
+          <p:cNvPr id="6" name="Footer Placeholder 5">
+            <a:extLst>
+              <a:ext uri="{FF2B5EF4-FFF2-40B4-BE49-F238E27FC236}">
+                <a16:creationId xmlns:a16="http://schemas.microsoft.com/office/drawing/2014/main" id="{EE7688D6-814B-EB94-85EA-CC09E31FF3D2}"/>
+              </a:ext>
+            </a:extLst>
+          </p:cNvPr>
+          <p:cNvSpPr>
+            <a:spLocks noGrp="1"/>
+          </p:cNvSpPr>
+          <p:nvPr>
+            <p:ph type="ftr" idx="5"/>
+          </p:nvPr>
+        </p:nvSpPr>
+        <p:spPr/>
+        <p:txBody>
+          <a:bodyPr/>
+          <a:lstStyle/>
+          <a:p>
+            <a:r>
+              <a:rPr lang="en-US" sz="1200" dirty="0"/>
+              <a:t>WISER Quantum Project</a:t>
+            </a:r>
+          </a:p>
+        </p:txBody>
+      </p:sp>
     </p:spTree>
   </p:cSld>
   <p:clrMapOvr>
@@ -32950,10 +34309,10 @@
   </p:clrMapOvr>
   <mc:AlternateContent xmlns:mc="http://schemas.openxmlformats.org/markup-compatibility/2006" xmlns:p14="http://schemas.microsoft.com/office/powerpoint/2010/main">
     <mc:Choice Requires="p14">
-      <p:transition spd="slow" p14:dur="2000" advTm="37569"/>
+      <p:transition spd="slow" p14:dur="2000" advTm="33061"/>
     </mc:Choice>
     <mc:Fallback xmlns="">
-      <p:transition spd="slow" advTm="37569"/>
+      <p:transition spd="slow" advTm="33061"/>
     </mc:Fallback>
   </mc:AlternateContent>
 </p:sld>
@@ -33046,8 +34405,8 @@
         </p:blipFill>
         <p:spPr>
           <a:xfrm>
-            <a:off x="6204238" y="926341"/>
-            <a:ext cx="2420778" cy="4126136"/>
+            <a:off x="6777115" y="926341"/>
+            <a:ext cx="2221316" cy="3786160"/>
           </a:xfrm>
           <a:prstGeom prst="rect">
             <a:avLst/>
@@ -33087,7 +34446,7 @@
         <p:spPr>
           <a:xfrm>
             <a:off x="411901" y="957834"/>
-            <a:ext cx="3239872" cy="4013701"/>
+            <a:ext cx="3030779" cy="3754667"/>
           </a:xfrm>
           <a:prstGeom prst="rect">
             <a:avLst/>
@@ -33154,8 +34513,8 @@
         </p:nvSpPr>
         <p:spPr>
           <a:xfrm>
-            <a:off x="727131" y="5148649"/>
-            <a:ext cx="8756770" cy="369332"/>
+            <a:off x="3888716" y="3382254"/>
+            <a:ext cx="3194999" cy="923330"/>
           </a:xfrm>
           <a:prstGeom prst="rect">
             <a:avLst/>
@@ -33173,6 +34532,70 @@
               <a:t>The thinking was inspired by observing the Exponential Distribution decision DAG</a:t>
             </a:r>
             <a:endParaRPr lang="en-IL" dirty="0"/>
+          </a:p>
+        </p:txBody>
+      </p:sp>
+      <p:pic>
+        <p:nvPicPr>
+          <p:cNvPr id="2" name="Picture 1" descr="A black background with a black letter w&#10;&#10;AI-generated content may be incorrect.">
+            <a:extLst>
+              <a:ext uri="{FF2B5EF4-FFF2-40B4-BE49-F238E27FC236}">
+                <a16:creationId xmlns:a16="http://schemas.microsoft.com/office/drawing/2014/main" id="{B79E09BF-DA0D-6222-233A-E0338A9DD024}"/>
+              </a:ext>
+            </a:extLst>
+          </p:cNvPr>
+          <p:cNvPicPr>
+            <a:picLocks noChangeAspect="1"/>
+          </p:cNvPicPr>
+          <p:nvPr/>
+        </p:nvPicPr>
+        <p:blipFill>
+          <a:blip r:embed="rId5">
+            <a:extLst>
+              <a:ext uri="{28A0092B-C50C-407E-A947-70E740481C1C}">
+                <a14:useLocalDpi xmlns:a14="http://schemas.microsoft.com/office/drawing/2010/main" val="0"/>
+              </a:ext>
+            </a:extLst>
+          </a:blip>
+          <a:stretch>
+            <a:fillRect/>
+          </a:stretch>
+        </p:blipFill>
+        <p:spPr>
+          <a:xfrm>
+            <a:off x="9068072" y="0"/>
+            <a:ext cx="974634" cy="974634"/>
+          </a:xfrm>
+          <a:prstGeom prst="rect">
+            <a:avLst/>
+          </a:prstGeom>
+        </p:spPr>
+      </p:pic>
+      <p:sp>
+        <p:nvSpPr>
+          <p:cNvPr id="5" name="Footer Placeholder 4">
+            <a:extLst>
+              <a:ext uri="{FF2B5EF4-FFF2-40B4-BE49-F238E27FC236}">
+                <a16:creationId xmlns:a16="http://schemas.microsoft.com/office/drawing/2014/main" id="{83753A4C-ACBB-E24A-6737-A44BB89F1F64}"/>
+              </a:ext>
+            </a:extLst>
+          </p:cNvPr>
+          <p:cNvSpPr>
+            <a:spLocks noGrp="1"/>
+          </p:cNvSpPr>
+          <p:nvPr>
+            <p:ph type="ftr" idx="5"/>
+          </p:nvPr>
+        </p:nvSpPr>
+        <p:spPr/>
+        <p:txBody>
+          <a:bodyPr/>
+          <a:lstStyle/>
+          <a:p>
+            <a:r>
+              <a:rPr lang="en-US"/>
+              <a:t>WISER Quantum Project</a:t>
+            </a:r>
           </a:p>
         </p:txBody>
       </p:sp>
@@ -33483,6 +34906,71 @@
           </a:p>
         </p:txBody>
       </p:sp>
+      <p:pic>
+        <p:nvPicPr>
+          <p:cNvPr id="3" name="Picture 2" descr="A black background with a black letter w&#10;&#10;AI-generated content may be incorrect.">
+            <a:extLst>
+              <a:ext uri="{FF2B5EF4-FFF2-40B4-BE49-F238E27FC236}">
+                <a16:creationId xmlns:a16="http://schemas.microsoft.com/office/drawing/2014/main" id="{E46D52D4-92E9-A996-E904-6310447DA14B}"/>
+              </a:ext>
+            </a:extLst>
+          </p:cNvPr>
+          <p:cNvPicPr>
+            <a:picLocks noChangeAspect="1"/>
+          </p:cNvPicPr>
+          <p:nvPr/>
+        </p:nvPicPr>
+        <p:blipFill>
+          <a:blip r:embed="rId6">
+            <a:extLst>
+              <a:ext uri="{28A0092B-C50C-407E-A947-70E740481C1C}">
+                <a14:useLocalDpi xmlns:a14="http://schemas.microsoft.com/office/drawing/2010/main" val="0"/>
+              </a:ext>
+            </a:extLst>
+          </a:blip>
+          <a:stretch>
+            <a:fillRect/>
+          </a:stretch>
+        </p:blipFill>
+        <p:spPr>
+          <a:xfrm>
+            <a:off x="9068072" y="0"/>
+            <a:ext cx="974634" cy="974634"/>
+          </a:xfrm>
+          <a:prstGeom prst="rect">
+            <a:avLst/>
+          </a:prstGeom>
+        </p:spPr>
+      </p:pic>
+      <p:sp>
+        <p:nvSpPr>
+          <p:cNvPr id="4" name="Footer Placeholder 3">
+            <a:extLst>
+              <a:ext uri="{FF2B5EF4-FFF2-40B4-BE49-F238E27FC236}">
+                <a16:creationId xmlns:a16="http://schemas.microsoft.com/office/drawing/2014/main" id="{91B95A70-84E7-A066-1954-5E316AB70990}"/>
+              </a:ext>
+            </a:extLst>
+          </p:cNvPr>
+          <p:cNvSpPr>
+            <a:spLocks noGrp="1"/>
+          </p:cNvSpPr>
+          <p:nvPr>
+            <p:ph type="ftr" idx="5"/>
+          </p:nvPr>
+        </p:nvSpPr>
+        <p:spPr/>
+        <p:txBody>
+          <a:bodyPr/>
+          <a:lstStyle/>
+          <a:p>
+            <a:r>
+              <a:rPr lang="en-US"/>
+              <a:t>WISER Quantum Project</a:t>
+            </a:r>
+            <a:endParaRPr lang="en-US" dirty="0"/>
+          </a:p>
+        </p:txBody>
+      </p:sp>
     </p:spTree>
     <p:extLst>
       <p:ext uri="{BB962C8B-B14F-4D97-AF65-F5344CB8AC3E}">
@@ -33495,10 +34983,10 @@
   </p:clrMapOvr>
   <mc:AlternateContent xmlns:mc="http://schemas.openxmlformats.org/markup-compatibility/2006" xmlns:p14="http://schemas.microsoft.com/office/powerpoint/2010/main">
     <mc:Choice Requires="p14">
-      <p:transition spd="slow" p14:dur="2000" advTm="59036"/>
+      <p:transition spd="slow" p14:dur="2000" advTm="57906"/>
     </mc:Choice>
     <mc:Fallback xmlns="">
-      <p:transition spd="slow" advTm="59036"/>
+      <p:transition spd="slow" advTm="57906"/>
     </mc:Fallback>
   </mc:AlternateContent>
 </p:sld>
@@ -33691,7 +35179,7 @@
         </p:nvSpPr>
         <p:spPr>
           <a:xfrm>
-            <a:off x="3447459" y="3207054"/>
+            <a:off x="3436442" y="3118918"/>
             <a:ext cx="5940141" cy="2226250"/>
           </a:xfrm>
           <a:prstGeom prst="rect">
@@ -33763,6 +35251,70 @@
           </a:p>
         </p:txBody>
       </p:sp>
+      <p:pic>
+        <p:nvPicPr>
+          <p:cNvPr id="2" name="Picture 1" descr="A black background with a black letter w&#10;&#10;AI-generated content may be incorrect.">
+            <a:extLst>
+              <a:ext uri="{FF2B5EF4-FFF2-40B4-BE49-F238E27FC236}">
+                <a16:creationId xmlns:a16="http://schemas.microsoft.com/office/drawing/2014/main" id="{5D9A58CE-CFC6-7ECC-515F-6DC2AED9F267}"/>
+              </a:ext>
+            </a:extLst>
+          </p:cNvPr>
+          <p:cNvPicPr>
+            <a:picLocks noChangeAspect="1"/>
+          </p:cNvPicPr>
+          <p:nvPr/>
+        </p:nvPicPr>
+        <p:blipFill>
+          <a:blip r:embed="rId7">
+            <a:extLst>
+              <a:ext uri="{28A0092B-C50C-407E-A947-70E740481C1C}">
+                <a14:useLocalDpi xmlns:a14="http://schemas.microsoft.com/office/drawing/2010/main" val="0"/>
+              </a:ext>
+            </a:extLst>
+          </a:blip>
+          <a:stretch>
+            <a:fillRect/>
+          </a:stretch>
+        </p:blipFill>
+        <p:spPr>
+          <a:xfrm>
+            <a:off x="9068072" y="0"/>
+            <a:ext cx="974634" cy="974634"/>
+          </a:xfrm>
+          <a:prstGeom prst="rect">
+            <a:avLst/>
+          </a:prstGeom>
+        </p:spPr>
+      </p:pic>
+      <p:sp>
+        <p:nvSpPr>
+          <p:cNvPr id="6" name="Footer Placeholder 5">
+            <a:extLst>
+              <a:ext uri="{FF2B5EF4-FFF2-40B4-BE49-F238E27FC236}">
+                <a16:creationId xmlns:a16="http://schemas.microsoft.com/office/drawing/2014/main" id="{20262357-D59A-F403-8C0B-F0A41F4AF2EE}"/>
+              </a:ext>
+            </a:extLst>
+          </p:cNvPr>
+          <p:cNvSpPr>
+            <a:spLocks noGrp="1"/>
+          </p:cNvSpPr>
+          <p:nvPr>
+            <p:ph type="ftr" idx="5"/>
+          </p:nvPr>
+        </p:nvSpPr>
+        <p:spPr/>
+        <p:txBody>
+          <a:bodyPr/>
+          <a:lstStyle/>
+          <a:p>
+            <a:r>
+              <a:rPr lang="en-US" sz="1200" dirty="0"/>
+              <a:t>WISER Quantum Project</a:t>
+            </a:r>
+          </a:p>
+        </p:txBody>
+      </p:sp>
     </p:spTree>
   </p:cSld>
   <p:clrMapOvr>
@@ -33770,10 +35322,10 @@
   </p:clrMapOvr>
   <mc:AlternateContent xmlns:mc="http://schemas.openxmlformats.org/markup-compatibility/2006" xmlns:p14="http://schemas.microsoft.com/office/powerpoint/2010/main">
     <mc:Choice Requires="p14">
-      <p:transition spd="slow" p14:dur="2000" advTm="10336"/>
+      <p:transition spd="slow" p14:dur="2000" advTm="11529"/>
     </mc:Choice>
     <mc:Fallback xmlns="">
-      <p:transition spd="slow" advTm="10336"/>
+      <p:transition spd="slow" advTm="11529"/>
     </mc:Fallback>
   </mc:AlternateContent>
 </p:sld>

</xml_diff>